<commit_message>
Presentatie merge + discussie/conclusie
</commit_message>
<xml_diff>
--- a/Presentations/Proteasen - Final presentation.pptx
+++ b/Presentations/Proteasen - Final presentation.pptx
@@ -15,7 +15,7 @@
     <p:sldId id="260" r:id="rId9"/>
     <p:sldId id="332" r:id="rId10"/>
     <p:sldId id="310" r:id="rId11"/>
-    <p:sldId id="304" r:id="rId12"/>
+    <p:sldId id="349" r:id="rId12"/>
     <p:sldId id="347" r:id="rId13"/>
     <p:sldId id="348" r:id="rId14"/>
     <p:sldId id="299" r:id="rId15"/>
@@ -143,7 +143,7 @@
   </p:defaultTextStyle>
   <p:extLst>
     <p:ext uri="{EFAFB233-063F-42B5-8137-9DF3F51BA10A}">
-      <p15:sldGuideLst xmlns:p15="http://schemas.microsoft.com/office/powerpoint/2012/main" xmlns="">
+      <p15:sldGuideLst xmlns="" xmlns:p15="http://schemas.microsoft.com/office/powerpoint/2012/main">
         <p15:guide id="1" orient="horz" pos="2160">
           <p15:clr>
             <a:srgbClr val="A4A3A4"/>
@@ -201,7 +201,7 @@
               <a:lum bright="70000" contrast="-70000"/>
               <a:extLst>
                 <a:ext uri="{BEBA8EAE-BF5A-486C-A8C5-ECC9F3942E4B}">
-                  <a14:imgProps xmlns:a14="http://schemas.microsoft.com/office/drawing/2010/main" xmlns="">
+                  <a14:imgProps xmlns:a14="http://schemas.microsoft.com/office/drawing/2010/main">
                     <a14:imgLayer r:embed="rId3">
                       <a14:imgEffect>
                         <a14:sharpenSoften amount="61000"/>
@@ -210,7 +210,7 @@
                   </a14:imgProps>
                 </a:ext>
                 <a:ext uri="{28A0092B-C50C-407E-A947-70E740481C1C}">
-                  <a14:useLocalDpi xmlns:a14="http://schemas.microsoft.com/office/drawing/2010/main" xmlns="" val="0"/>
+                  <a14:useLocalDpi xmlns:a14="http://schemas.microsoft.com/office/drawing/2010/main" val="0"/>
                 </a:ext>
               </a:extLst>
             </a:blip>
@@ -258,7 +258,7 @@
               <a:lum bright="70000" contrast="-70000"/>
               <a:extLst>
                 <a:ext uri="{BEBA8EAE-BF5A-486C-A8C5-ECC9F3942E4B}">
-                  <a14:imgProps xmlns:a14="http://schemas.microsoft.com/office/drawing/2010/main" xmlns="">
+                  <a14:imgProps xmlns:a14="http://schemas.microsoft.com/office/drawing/2010/main">
                     <a14:imgLayer r:embed="rId3">
                       <a14:imgEffect>
                         <a14:sharpenSoften amount="61000"/>
@@ -267,7 +267,7 @@
                   </a14:imgProps>
                 </a:ext>
                 <a:ext uri="{28A0092B-C50C-407E-A947-70E740481C1C}">
-                  <a14:useLocalDpi xmlns:a14="http://schemas.microsoft.com/office/drawing/2010/main" xmlns="" val="0"/>
+                  <a14:useLocalDpi xmlns:a14="http://schemas.microsoft.com/office/drawing/2010/main" val="0"/>
                 </a:ext>
               </a:extLst>
             </a:blip>
@@ -315,7 +315,7 @@
               <a:lum bright="70000" contrast="-70000"/>
               <a:extLst>
                 <a:ext uri="{BEBA8EAE-BF5A-486C-A8C5-ECC9F3942E4B}">
-                  <a14:imgProps xmlns:a14="http://schemas.microsoft.com/office/drawing/2010/main" xmlns="">
+                  <a14:imgProps xmlns:a14="http://schemas.microsoft.com/office/drawing/2010/main">
                     <a14:imgLayer r:embed="rId3">
                       <a14:imgEffect>
                         <a14:sharpenSoften amount="61000"/>
@@ -324,7 +324,7 @@
                   </a14:imgProps>
                 </a:ext>
                 <a:ext uri="{28A0092B-C50C-407E-A947-70E740481C1C}">
-                  <a14:useLocalDpi xmlns:a14="http://schemas.microsoft.com/office/drawing/2010/main" xmlns="" val="0"/>
+                  <a14:useLocalDpi xmlns:a14="http://schemas.microsoft.com/office/drawing/2010/main" val="0"/>
                 </a:ext>
               </a:extLst>
             </a:blip>
@@ -391,7 +391,7 @@
                 </a:duotone>
                 <a:extLst>
                   <a:ext uri="{BEBA8EAE-BF5A-486C-A8C5-ECC9F3942E4B}">
-                    <a14:imgProps xmlns:a14="http://schemas.microsoft.com/office/drawing/2010/main" xmlns="">
+                    <a14:imgProps xmlns:a14="http://schemas.microsoft.com/office/drawing/2010/main">
                       <a14:imgLayer r:embed="rId5">
                         <a14:imgEffect>
                           <a14:saturation sat="95000"/>
@@ -620,7 +620,7 @@
             <a:fld id="{1C1C122E-05CA-4289-A26B-D14C5EAD5EFF}" type="slidenum">
               <a:rPr lang="nl-NL" smtClean="0"/>
               <a:pPr/>
-              <a:t>‹nr.›</a:t>
+              <a:t>‹#›</a:t>
             </a:fld>
             <a:endParaRPr lang="nl-NL"/>
           </a:p>
@@ -629,7 +629,7 @@
     </p:spTree>
     <p:extLst>
       <p:ext uri="{BB962C8B-B14F-4D97-AF65-F5344CB8AC3E}">
-        <p14:creationId xmlns:p14="http://schemas.microsoft.com/office/powerpoint/2010/main" xmlns="" val="2388146589"/>
+        <p14:creationId xmlns:p14="http://schemas.microsoft.com/office/powerpoint/2010/main" val="2388146589"/>
       </p:ext>
     </p:extLst>
   </p:cSld>
@@ -792,7 +792,7 @@
             <a:fld id="{1C1C122E-05CA-4289-A26B-D14C5EAD5EFF}" type="slidenum">
               <a:rPr lang="nl-NL" smtClean="0"/>
               <a:pPr/>
-              <a:t>‹nr.›</a:t>
+              <a:t>‹#›</a:t>
             </a:fld>
             <a:endParaRPr lang="nl-NL"/>
           </a:p>
@@ -801,7 +801,7 @@
     </p:spTree>
     <p:extLst>
       <p:ext uri="{BB962C8B-B14F-4D97-AF65-F5344CB8AC3E}">
-        <p14:creationId xmlns:p14="http://schemas.microsoft.com/office/powerpoint/2010/main" xmlns="" val="3051035437"/>
+        <p14:creationId xmlns:p14="http://schemas.microsoft.com/office/powerpoint/2010/main" val="3051035437"/>
       </p:ext>
     </p:extLst>
   </p:cSld>
@@ -974,7 +974,7 @@
             <a:fld id="{1C1C122E-05CA-4289-A26B-D14C5EAD5EFF}" type="slidenum">
               <a:rPr lang="nl-NL" smtClean="0"/>
               <a:pPr/>
-              <a:t>‹nr.›</a:t>
+              <a:t>‹#›</a:t>
             </a:fld>
             <a:endParaRPr lang="nl-NL"/>
           </a:p>
@@ -983,7 +983,7 @@
     </p:spTree>
     <p:extLst>
       <p:ext uri="{BB962C8B-B14F-4D97-AF65-F5344CB8AC3E}">
-        <p14:creationId xmlns:p14="http://schemas.microsoft.com/office/powerpoint/2010/main" xmlns="" val="3510516640"/>
+        <p14:creationId xmlns:p14="http://schemas.microsoft.com/office/powerpoint/2010/main" val="3510516640"/>
       </p:ext>
     </p:extLst>
   </p:cSld>
@@ -1146,7 +1146,7 @@
             <a:fld id="{1C1C122E-05CA-4289-A26B-D14C5EAD5EFF}" type="slidenum">
               <a:rPr lang="nl-NL" smtClean="0"/>
               <a:pPr/>
-              <a:t>‹nr.›</a:t>
+              <a:t>‹#›</a:t>
             </a:fld>
             <a:endParaRPr lang="nl-NL"/>
           </a:p>
@@ -1155,7 +1155,7 @@
     </p:spTree>
     <p:extLst>
       <p:ext uri="{BB962C8B-B14F-4D97-AF65-F5344CB8AC3E}">
-        <p14:creationId xmlns:p14="http://schemas.microsoft.com/office/powerpoint/2010/main" xmlns="" val="3140307130"/>
+        <p14:creationId xmlns:p14="http://schemas.microsoft.com/office/powerpoint/2010/main" val="3140307130"/>
       </p:ext>
     </p:extLst>
   </p:cSld>
@@ -1202,7 +1202,7 @@
               <a:lum bright="70000" contrast="-70000"/>
               <a:extLst>
                 <a:ext uri="{BEBA8EAE-BF5A-486C-A8C5-ECC9F3942E4B}">
-                  <a14:imgProps xmlns:a14="http://schemas.microsoft.com/office/drawing/2010/main" xmlns="">
+                  <a14:imgProps xmlns:a14="http://schemas.microsoft.com/office/drawing/2010/main">
                     <a14:imgLayer r:embed="rId3">
                       <a14:imgEffect>
                         <a14:sharpenSoften amount="61000"/>
@@ -1211,7 +1211,7 @@
                   </a14:imgProps>
                 </a:ext>
                 <a:ext uri="{28A0092B-C50C-407E-A947-70E740481C1C}">
-                  <a14:useLocalDpi xmlns:a14="http://schemas.microsoft.com/office/drawing/2010/main" xmlns="" val="0"/>
+                  <a14:useLocalDpi xmlns:a14="http://schemas.microsoft.com/office/drawing/2010/main" val="0"/>
                 </a:ext>
               </a:extLst>
             </a:blip>
@@ -1487,7 +1487,7 @@
                 </a:duotone>
                 <a:extLst>
                   <a:ext uri="{BEBA8EAE-BF5A-486C-A8C5-ECC9F3942E4B}">
-                    <a14:imgProps xmlns:a14="http://schemas.microsoft.com/office/drawing/2010/main" xmlns="">
+                    <a14:imgProps xmlns:a14="http://schemas.microsoft.com/office/drawing/2010/main">
                       <a14:imgLayer r:embed="rId5">
                         <a14:imgEffect>
                           <a14:saturation sat="95000"/>
@@ -1559,7 +1559,7 @@
             <a:fld id="{1C1C122E-05CA-4289-A26B-D14C5EAD5EFF}" type="slidenum">
               <a:rPr lang="nl-NL" smtClean="0"/>
               <a:pPr/>
-              <a:t>‹nr.›</a:t>
+              <a:t>‹#›</a:t>
             </a:fld>
             <a:endParaRPr lang="nl-NL"/>
           </a:p>
@@ -1568,7 +1568,7 @@
     </p:spTree>
     <p:extLst>
       <p:ext uri="{BB962C8B-B14F-4D97-AF65-F5344CB8AC3E}">
-        <p14:creationId xmlns:p14="http://schemas.microsoft.com/office/powerpoint/2010/main" xmlns="" val="846498064"/>
+        <p14:creationId xmlns:p14="http://schemas.microsoft.com/office/powerpoint/2010/main" val="846498064"/>
       </p:ext>
     </p:extLst>
   </p:cSld>
@@ -1849,7 +1849,7 @@
             <a:fld id="{1C1C122E-05CA-4289-A26B-D14C5EAD5EFF}" type="slidenum">
               <a:rPr lang="nl-NL" smtClean="0"/>
               <a:pPr/>
-              <a:t>‹nr.›</a:t>
+              <a:t>‹#›</a:t>
             </a:fld>
             <a:endParaRPr lang="nl-NL"/>
           </a:p>
@@ -1858,7 +1858,7 @@
     </p:spTree>
     <p:extLst>
       <p:ext uri="{BB962C8B-B14F-4D97-AF65-F5344CB8AC3E}">
-        <p14:creationId xmlns:p14="http://schemas.microsoft.com/office/powerpoint/2010/main" xmlns="" val="4200581216"/>
+        <p14:creationId xmlns:p14="http://schemas.microsoft.com/office/powerpoint/2010/main" val="4200581216"/>
       </p:ext>
     </p:extLst>
   </p:cSld>
@@ -2285,7 +2285,7 @@
             <a:fld id="{1C1C122E-05CA-4289-A26B-D14C5EAD5EFF}" type="slidenum">
               <a:rPr lang="nl-NL" smtClean="0"/>
               <a:pPr/>
-              <a:t>‹nr.›</a:t>
+              <a:t>‹#›</a:t>
             </a:fld>
             <a:endParaRPr lang="nl-NL"/>
           </a:p>
@@ -2294,7 +2294,7 @@
     </p:spTree>
     <p:extLst>
       <p:ext uri="{BB962C8B-B14F-4D97-AF65-F5344CB8AC3E}">
-        <p14:creationId xmlns:p14="http://schemas.microsoft.com/office/powerpoint/2010/main" xmlns="" val="1735751380"/>
+        <p14:creationId xmlns:p14="http://schemas.microsoft.com/office/powerpoint/2010/main" val="1735751380"/>
       </p:ext>
     </p:extLst>
   </p:cSld>
@@ -2405,7 +2405,7 @@
             <a:fld id="{1C1C122E-05CA-4289-A26B-D14C5EAD5EFF}" type="slidenum">
               <a:rPr lang="nl-NL" smtClean="0"/>
               <a:pPr/>
-              <a:t>‹nr.›</a:t>
+              <a:t>‹#›</a:t>
             </a:fld>
             <a:endParaRPr lang="nl-NL"/>
           </a:p>
@@ -2414,7 +2414,7 @@
     </p:spTree>
     <p:extLst>
       <p:ext uri="{BB962C8B-B14F-4D97-AF65-F5344CB8AC3E}">
-        <p14:creationId xmlns:p14="http://schemas.microsoft.com/office/powerpoint/2010/main" xmlns="" val="3428171446"/>
+        <p14:creationId xmlns:p14="http://schemas.microsoft.com/office/powerpoint/2010/main" val="3428171446"/>
       </p:ext>
     </p:extLst>
   </p:cSld>
@@ -2502,7 +2502,7 @@
             <a:fld id="{1C1C122E-05CA-4289-A26B-D14C5EAD5EFF}" type="slidenum">
               <a:rPr lang="nl-NL" smtClean="0"/>
               <a:pPr/>
-              <a:t>‹nr.›</a:t>
+              <a:t>‹#›</a:t>
             </a:fld>
             <a:endParaRPr lang="nl-NL"/>
           </a:p>
@@ -2511,7 +2511,7 @@
     </p:spTree>
     <p:extLst>
       <p:ext uri="{BB962C8B-B14F-4D97-AF65-F5344CB8AC3E}">
-        <p14:creationId xmlns:p14="http://schemas.microsoft.com/office/powerpoint/2010/main" xmlns="" val="1370895258"/>
+        <p14:creationId xmlns:p14="http://schemas.microsoft.com/office/powerpoint/2010/main" val="1370895258"/>
       </p:ext>
     </p:extLst>
   </p:cSld>
@@ -2558,7 +2558,7 @@
               <a:lum bright="70000" contrast="-70000"/>
               <a:extLst>
                 <a:ext uri="{BEBA8EAE-BF5A-486C-A8C5-ECC9F3942E4B}">
-                  <a14:imgProps xmlns:a14="http://schemas.microsoft.com/office/drawing/2010/main" xmlns="">
+                  <a14:imgProps xmlns:a14="http://schemas.microsoft.com/office/drawing/2010/main">
                     <a14:imgLayer r:embed="rId3">
                       <a14:imgEffect>
                         <a14:sharpenSoften amount="61000"/>
@@ -2567,7 +2567,7 @@
                   </a14:imgProps>
                 </a:ext>
                 <a:ext uri="{28A0092B-C50C-407E-A947-70E740481C1C}">
-                  <a14:useLocalDpi xmlns:a14="http://schemas.microsoft.com/office/drawing/2010/main" xmlns="" val="0"/>
+                  <a14:useLocalDpi xmlns:a14="http://schemas.microsoft.com/office/drawing/2010/main" val="0"/>
                 </a:ext>
               </a:extLst>
             </a:blip>
@@ -2877,7 +2877,7 @@
                 </a:duotone>
                 <a:extLst>
                   <a:ext uri="{BEBA8EAE-BF5A-486C-A8C5-ECC9F3942E4B}">
-                    <a14:imgProps xmlns:a14="http://schemas.microsoft.com/office/drawing/2010/main" xmlns="">
+                    <a14:imgProps xmlns:a14="http://schemas.microsoft.com/office/drawing/2010/main">
                       <a14:imgLayer r:embed="rId5">
                         <a14:imgEffect>
                           <a14:saturation sat="95000"/>
@@ -2943,7 +2943,7 @@
             <a:fld id="{1C1C122E-05CA-4289-A26B-D14C5EAD5EFF}" type="slidenum">
               <a:rPr lang="nl-NL" smtClean="0"/>
               <a:pPr/>
-              <a:t>‹nr.›</a:t>
+              <a:t>‹#›</a:t>
             </a:fld>
             <a:endParaRPr lang="nl-NL"/>
           </a:p>
@@ -2952,7 +2952,7 @@
     </p:spTree>
     <p:extLst>
       <p:ext uri="{BB962C8B-B14F-4D97-AF65-F5344CB8AC3E}">
-        <p14:creationId xmlns:p14="http://schemas.microsoft.com/office/powerpoint/2010/main" xmlns="" val="2553767050"/>
+        <p14:creationId xmlns:p14="http://schemas.microsoft.com/office/powerpoint/2010/main" val="2553767050"/>
       </p:ext>
     </p:extLst>
   </p:cSld>
@@ -2999,7 +2999,7 @@
               <a:lum bright="70000" contrast="-70000"/>
               <a:extLst>
                 <a:ext uri="{BEBA8EAE-BF5A-486C-A8C5-ECC9F3942E4B}">
-                  <a14:imgProps xmlns:a14="http://schemas.microsoft.com/office/drawing/2010/main" xmlns="">
+                  <a14:imgProps xmlns:a14="http://schemas.microsoft.com/office/drawing/2010/main">
                     <a14:imgLayer r:embed="rId3">
                       <a14:imgEffect>
                         <a14:sharpenSoften amount="61000"/>
@@ -3008,7 +3008,7 @@
                   </a14:imgProps>
                 </a:ext>
                 <a:ext uri="{28A0092B-C50C-407E-A947-70E740481C1C}">
-                  <a14:useLocalDpi xmlns:a14="http://schemas.microsoft.com/office/drawing/2010/main" xmlns="" val="0"/>
+                  <a14:useLocalDpi xmlns:a14="http://schemas.microsoft.com/office/drawing/2010/main" val="0"/>
                 </a:ext>
               </a:extLst>
             </a:blip>
@@ -3285,7 +3285,7 @@
                 </a:duotone>
                 <a:extLst>
                   <a:ext uri="{BEBA8EAE-BF5A-486C-A8C5-ECC9F3942E4B}">
-                    <a14:imgProps xmlns:a14="http://schemas.microsoft.com/office/drawing/2010/main" xmlns="">
+                    <a14:imgProps xmlns:a14="http://schemas.microsoft.com/office/drawing/2010/main">
                       <a14:imgLayer r:embed="rId5">
                         <a14:imgEffect>
                           <a14:saturation sat="95000"/>
@@ -3351,7 +3351,7 @@
             <a:fld id="{1C1C122E-05CA-4289-A26B-D14C5EAD5EFF}" type="slidenum">
               <a:rPr lang="nl-NL" smtClean="0"/>
               <a:pPr/>
-              <a:t>‹nr.›</a:t>
+              <a:t>‹#›</a:t>
             </a:fld>
             <a:endParaRPr lang="nl-NL"/>
           </a:p>
@@ -3360,7 +3360,7 @@
     </p:spTree>
     <p:extLst>
       <p:ext uri="{BB962C8B-B14F-4D97-AF65-F5344CB8AC3E}">
-        <p14:creationId xmlns:p14="http://schemas.microsoft.com/office/powerpoint/2010/main" xmlns="" val="3698214961"/>
+        <p14:creationId xmlns:p14="http://schemas.microsoft.com/office/powerpoint/2010/main" val="3698214961"/>
       </p:ext>
     </p:extLst>
   </p:cSld>
@@ -3603,7 +3603,7 @@
                 </a:duotone>
                 <a:extLst>
                   <a:ext uri="{BEBA8EAE-BF5A-486C-A8C5-ECC9F3942E4B}">
-                    <a14:imgProps xmlns:a14="http://schemas.microsoft.com/office/drawing/2010/main" xmlns="">
+                    <a14:imgProps xmlns:a14="http://schemas.microsoft.com/office/drawing/2010/main">
                       <a14:imgLayer r:embed="rId14">
                         <a14:imgEffect>
                           <a14:saturation sat="95000"/>
@@ -3686,7 +3686,7 @@
             <a:fld id="{1C1C122E-05CA-4289-A26B-D14C5EAD5EFF}" type="slidenum">
               <a:rPr lang="nl-NL" smtClean="0"/>
               <a:pPr/>
-              <a:t>‹nr.›</a:t>
+              <a:t>‹#›</a:t>
             </a:fld>
             <a:endParaRPr lang="nl-NL"/>
           </a:p>
@@ -3695,7 +3695,7 @@
     </p:spTree>
     <p:extLst>
       <p:ext uri="{BB962C8B-B14F-4D97-AF65-F5344CB8AC3E}">
-        <p14:creationId xmlns:p14="http://schemas.microsoft.com/office/powerpoint/2010/main" xmlns="" val="1128740911"/>
+        <p14:creationId xmlns:p14="http://schemas.microsoft.com/office/powerpoint/2010/main" val="1128740911"/>
       </p:ext>
     </p:extLst>
   </p:cSld>
@@ -3728,7 +3728,7 @@
             <a:blip r:embed="rId15">
               <a:extLst>
                 <a:ext uri="{28A0092B-C50C-407E-A947-70E740481C1C}">
-                  <a14:useLocalDpi xmlns:a14="http://schemas.microsoft.com/office/drawing/2010/main" xmlns="" val="0"/>
+                  <a14:useLocalDpi xmlns:a14="http://schemas.microsoft.com/office/drawing/2010/main" val="0"/>
                 </a:ext>
               </a:extLst>
             </a:blip>
@@ -4103,7 +4103,7 @@
           <p:cNvPr id="2" name="Titel 1">
             <a:extLst>
               <a:ext uri="{FF2B5EF4-FFF2-40B4-BE49-F238E27FC236}">
-                <a16:creationId xmlns:a16="http://schemas.microsoft.com/office/drawing/2014/main" xmlns="" id="{AE205A44-390E-455B-87E1-6D48C073A474}"/>
+                <a16:creationId xmlns="" xmlns:a16="http://schemas.microsoft.com/office/drawing/2014/main" id="{AE205A44-390E-455B-87E1-6D48C073A474}"/>
               </a:ext>
             </a:extLst>
           </p:cNvPr>
@@ -4148,7 +4148,7 @@
           <p:cNvPr id="3" name="Ondertitel 2">
             <a:extLst>
               <a:ext uri="{FF2B5EF4-FFF2-40B4-BE49-F238E27FC236}">
-                <a16:creationId xmlns:a16="http://schemas.microsoft.com/office/drawing/2014/main" xmlns="" id="{E24A4149-DFE7-4EE0-A98A-18326D7AD35D}"/>
+                <a16:creationId xmlns="" xmlns:a16="http://schemas.microsoft.com/office/drawing/2014/main" id="{E24A4149-DFE7-4EE0-A98A-18326D7AD35D}"/>
               </a:ext>
             </a:extLst>
           </p:cNvPr>
@@ -4179,7 +4179,7 @@
     </p:spTree>
     <p:extLst>
       <p:ext uri="{BB962C8B-B14F-4D97-AF65-F5344CB8AC3E}">
-        <p14:creationId xmlns:p14="http://schemas.microsoft.com/office/powerpoint/2010/main" xmlns="" val="1696353441"/>
+        <p14:creationId xmlns:p14="http://schemas.microsoft.com/office/powerpoint/2010/main" val="1696353441"/>
       </p:ext>
     </p:extLst>
   </p:cSld>
@@ -4252,7 +4252,7 @@
           <p:nvPr>
             <p:extLst>
               <p:ext uri="{D42A27DB-BD31-4B8C-83A1-F6EECF244321}">
-                <p14:modId xmlns:p14="http://schemas.microsoft.com/office/powerpoint/2010/main" xmlns="" val="1830958018"/>
+                <p14:modId xmlns:p14="http://schemas.microsoft.com/office/powerpoint/2010/main" val="1830958018"/>
               </p:ext>
             </p:extLst>
           </p:nvPr>
@@ -4271,14 +4271,14 @@
                 <a:gridCol w="2497959">
                   <a:extLst>
                     <a:ext uri="{9D8B030D-6E8A-4147-A177-3AD203B41FA5}">
-                      <a16:colId xmlns:a16="http://schemas.microsoft.com/office/drawing/2014/main" xmlns="" val="20000"/>
+                      <a16:colId xmlns="" xmlns:a16="http://schemas.microsoft.com/office/drawing/2014/main" val="20000"/>
                     </a:ext>
                   </a:extLst>
                 </a:gridCol>
                 <a:gridCol w="7075214">
                   <a:extLst>
                     <a:ext uri="{9D8B030D-6E8A-4147-A177-3AD203B41FA5}">
-                      <a16:colId xmlns:a16="http://schemas.microsoft.com/office/drawing/2014/main" xmlns="" val="20001"/>
+                      <a16:colId xmlns="" xmlns:a16="http://schemas.microsoft.com/office/drawing/2014/main" val="20001"/>
                     </a:ext>
                   </a:extLst>
                 </a:gridCol>
@@ -4314,7 +4314,7 @@
                 </a:tc>
                 <a:extLst>
                   <a:ext uri="{0D108BD9-81ED-4DB2-BD59-A6C34878D82A}">
-                    <a16:rowId xmlns:a16="http://schemas.microsoft.com/office/drawing/2014/main" xmlns="" val="10000"/>
+                    <a16:rowId xmlns="" xmlns:a16="http://schemas.microsoft.com/office/drawing/2014/main" val="10000"/>
                   </a:ext>
                 </a:extLst>
               </a:tr>
@@ -4415,7 +4415,7 @@
                 </a:tc>
                 <a:extLst>
                   <a:ext uri="{0D108BD9-81ED-4DB2-BD59-A6C34878D82A}">
-                    <a16:rowId xmlns:a16="http://schemas.microsoft.com/office/drawing/2014/main" xmlns="" val="10001"/>
+                    <a16:rowId xmlns="" xmlns:a16="http://schemas.microsoft.com/office/drawing/2014/main" val="10001"/>
                   </a:ext>
                 </a:extLst>
               </a:tr>
@@ -4564,7 +4564,7 @@
                 </a:tc>
                 <a:extLst>
                   <a:ext uri="{0D108BD9-81ED-4DB2-BD59-A6C34878D82A}">
-                    <a16:rowId xmlns:a16="http://schemas.microsoft.com/office/drawing/2014/main" xmlns="" val="10002"/>
+                    <a16:rowId xmlns="" xmlns:a16="http://schemas.microsoft.com/office/drawing/2014/main" val="10002"/>
                   </a:ext>
                 </a:extLst>
               </a:tr>
@@ -4969,7 +4969,7 @@
                 </a:tc>
                 <a:extLst>
                   <a:ext uri="{0D108BD9-81ED-4DB2-BD59-A6C34878D82A}">
-                    <a16:rowId xmlns:a16="http://schemas.microsoft.com/office/drawing/2014/main" xmlns="" val="10003"/>
+                    <a16:rowId xmlns="" xmlns:a16="http://schemas.microsoft.com/office/drawing/2014/main" val="10003"/>
                   </a:ext>
                 </a:extLst>
               </a:tr>
@@ -5142,7 +5142,7 @@
                 </a:tc>
                 <a:extLst>
                   <a:ext uri="{0D108BD9-81ED-4DB2-BD59-A6C34878D82A}">
-                    <a16:rowId xmlns:a16="http://schemas.microsoft.com/office/drawing/2014/main" xmlns="" val="10005"/>
+                    <a16:rowId xmlns="" xmlns:a16="http://schemas.microsoft.com/office/drawing/2014/main" val="10005"/>
                   </a:ext>
                 </a:extLst>
               </a:tr>
@@ -5458,7 +5458,7 @@
                 </a:tc>
                 <a:extLst>
                   <a:ext uri="{0D108BD9-81ED-4DB2-BD59-A6C34878D82A}">
-                    <a16:rowId xmlns:a16="http://schemas.microsoft.com/office/drawing/2014/main" xmlns="" val="10004"/>
+                    <a16:rowId xmlns="" xmlns:a16="http://schemas.microsoft.com/office/drawing/2014/main" val="10004"/>
                   </a:ext>
                 </a:extLst>
               </a:tr>
@@ -5917,7 +5917,7 @@
                 </a:tc>
                 <a:extLst>
                   <a:ext uri="{0D108BD9-81ED-4DB2-BD59-A6C34878D82A}">
-                    <a16:rowId xmlns:a16="http://schemas.microsoft.com/office/drawing/2014/main" xmlns="" val="10007"/>
+                    <a16:rowId xmlns="" xmlns:a16="http://schemas.microsoft.com/office/drawing/2014/main" val="10007"/>
                   </a:ext>
                 </a:extLst>
               </a:tr>
@@ -6321,7 +6321,7 @@
                 </a:tc>
                 <a:extLst>
                   <a:ext uri="{0D108BD9-81ED-4DB2-BD59-A6C34878D82A}">
-                    <a16:rowId xmlns:a16="http://schemas.microsoft.com/office/drawing/2014/main" xmlns="" val="10008"/>
+                    <a16:rowId xmlns="" xmlns:a16="http://schemas.microsoft.com/office/drawing/2014/main" val="10008"/>
                   </a:ext>
                 </a:extLst>
               </a:tr>
@@ -6334,7 +6334,7 @@
           <p:cNvPr id="6" name="Tekstvak 12">
             <a:extLst>
               <a:ext uri="{FF2B5EF4-FFF2-40B4-BE49-F238E27FC236}">
-                <a16:creationId xmlns:a16="http://schemas.microsoft.com/office/drawing/2014/main" xmlns="" id="{35AAEF8A-1E8B-4134-8FA6-762EB3980799}"/>
+                <a16:creationId xmlns="" xmlns:a16="http://schemas.microsoft.com/office/drawing/2014/main" id="{35AAEF8A-1E8B-4134-8FA6-762EB3980799}"/>
               </a:ext>
             </a:extLst>
           </p:cNvPr>
@@ -6416,7 +6416,7 @@
     </p:spTree>
     <p:extLst>
       <p:ext uri="{BB962C8B-B14F-4D97-AF65-F5344CB8AC3E}">
-        <p14:creationId xmlns:p14="http://schemas.microsoft.com/office/powerpoint/2010/main" xmlns="" val="275260862"/>
+        <p14:creationId xmlns:p14="http://schemas.microsoft.com/office/powerpoint/2010/main" val="275260862"/>
       </p:ext>
     </p:extLst>
   </p:cSld>
@@ -6584,14 +6584,14 @@
           <p:nvPr>
             <p:extLst>
               <p:ext uri="{D42A27DB-BD31-4B8C-83A1-F6EECF244321}">
-                <p14:modId xmlns:p14="http://schemas.microsoft.com/office/powerpoint/2010/main" xmlns="" val="4098376138"/>
+                <p14:modId xmlns:p14="http://schemas.microsoft.com/office/powerpoint/2010/main" val="2224225910"/>
               </p:ext>
             </p:extLst>
           </p:nvPr>
         </p:nvGraphicFramePr>
         <p:xfrm>
           <a:off x="852756" y="2201624"/>
-          <a:ext cx="9760449" cy="2565585"/>
+          <a:ext cx="10469364" cy="2565585"/>
         </p:xfrm>
         <a:graphic>
           <a:graphicData uri="http://schemas.openxmlformats.org/drawingml/2006/table">
@@ -6600,21 +6600,21 @@
                 <a:tableStyleId>{7DF18680-E054-41AD-8BC1-D1AEF772440D}</a:tableStyleId>
               </a:tblPr>
               <a:tblGrid>
-                <a:gridCol w="2376235">
+                <a:gridCol w="1582219">
                   <a:extLst>
                     <a:ext uri="{9D8B030D-6E8A-4147-A177-3AD203B41FA5}">
                       <a16:colId xmlns:a16="http://schemas.microsoft.com/office/drawing/2014/main" xmlns="" val="20000"/>
                     </a:ext>
                   </a:extLst>
                 </a:gridCol>
-                <a:gridCol w="3692107">
+                <a:gridCol w="3431569">
                   <a:extLst>
                     <a:ext uri="{9D8B030D-6E8A-4147-A177-3AD203B41FA5}">
                       <a16:colId xmlns:a16="http://schemas.microsoft.com/office/drawing/2014/main" xmlns="" val="20002"/>
                     </a:ext>
                   </a:extLst>
                 </a:gridCol>
-                <a:gridCol w="3692107"/>
+                <a:gridCol w="5455576"/>
               </a:tblGrid>
               <a:tr h="513117">
                 <a:tc>
@@ -6740,6 +6740,10 @@
                         <a:buFontTx/>
                         <a:buNone/>
                       </a:pPr>
+                      <a:r>
+                        <a:rPr lang="en-US" dirty="0" smtClean="0"/>
+                        <a:t>244 140 625</a:t>
+                      </a:r>
                       <a:endParaRPr lang="en-US" dirty="0"/>
                     </a:p>
                   </a:txBody>
@@ -6818,6 +6822,10 @@
                         <a:buFontTx/>
                         <a:buNone/>
                       </a:pPr>
+                      <a:r>
+                        <a:rPr lang="en-US" dirty="0" smtClean="0"/>
+                        <a:t>3 814 697 265 625</a:t>
+                      </a:r>
                       <a:endParaRPr lang="en-US" dirty="0"/>
                     </a:p>
                   </a:txBody>
@@ -6888,6 +6896,10 @@
                     <a:bodyPr/>
                     <a:lstStyle/>
                     <a:p>
+                      <a:r>
+                        <a:rPr lang="en-US" dirty="0" smtClean="0"/>
+                        <a:t>582 076 609 134 674 072 265 625</a:t>
+                      </a:r>
                       <a:endParaRPr lang="en-US" dirty="0"/>
                     </a:p>
                   </a:txBody>
@@ -6958,6 +6970,10 @@
                     <a:bodyPr/>
                     <a:lstStyle/>
                     <a:p>
+                      <a:r>
+                        <a:rPr lang="en-US" dirty="0" smtClean="0"/>
+                        <a:t>3 552 713 678 800 500 929 355 621 337 890 625</a:t>
+                      </a:r>
                       <a:endParaRPr lang="en-US" dirty="0"/>
                     </a:p>
                   </a:txBody>
@@ -7060,7 +7076,7 @@
     </p:spTree>
     <p:extLst>
       <p:ext uri="{BB962C8B-B14F-4D97-AF65-F5344CB8AC3E}">
-        <p14:creationId xmlns:p14="http://schemas.microsoft.com/office/powerpoint/2010/main" xmlns="" val="2712770434"/>
+        <p14:creationId xmlns:p14="http://schemas.microsoft.com/office/powerpoint/2010/main" val="45256658"/>
       </p:ext>
     </p:extLst>
   </p:cSld>
@@ -7209,7 +7225,7 @@
           <p:nvPr>
             <p:extLst>
               <p:ext uri="{D42A27DB-BD31-4B8C-83A1-F6EECF244321}">
-                <p14:modId xmlns:p14="http://schemas.microsoft.com/office/powerpoint/2010/main" xmlns="" val="797968927"/>
+                <p14:modId xmlns:p14="http://schemas.microsoft.com/office/powerpoint/2010/main" val="797968927"/>
               </p:ext>
             </p:extLst>
           </p:nvPr>
@@ -7228,21 +7244,21 @@
                 <a:gridCol w="5682593">
                   <a:extLst>
                     <a:ext uri="{9D8B030D-6E8A-4147-A177-3AD203B41FA5}">
-                      <a16:colId xmlns="" xmlns:a16="http://schemas.microsoft.com/office/drawing/2014/main" val="20000"/>
+                      <a16:colId xmlns:a16="http://schemas.microsoft.com/office/drawing/2014/main" xmlns="" val="20000"/>
                     </a:ext>
                   </a:extLst>
                 </a:gridCol>
                 <a:gridCol w="1746607">
                   <a:extLst>
                     <a:ext uri="{9D8B030D-6E8A-4147-A177-3AD203B41FA5}">
-                      <a16:colId xmlns="" xmlns:a16="http://schemas.microsoft.com/office/drawing/2014/main" val="20001"/>
+                      <a16:colId xmlns:a16="http://schemas.microsoft.com/office/drawing/2014/main" xmlns="" val="20001"/>
                     </a:ext>
                   </a:extLst>
                 </a:gridCol>
                 <a:gridCol w="1777429">
                   <a:extLst>
                     <a:ext uri="{9D8B030D-6E8A-4147-A177-3AD203B41FA5}">
-                      <a16:colId xmlns="" xmlns:a16="http://schemas.microsoft.com/office/drawing/2014/main" val="20002"/>
+                      <a16:colId xmlns:a16="http://schemas.microsoft.com/office/drawing/2014/main" xmlns="" val="20002"/>
                     </a:ext>
                   </a:extLst>
                 </a:gridCol>
@@ -7317,7 +7333,7 @@
                 </a:tc>
                 <a:extLst>
                   <a:ext uri="{0D108BD9-81ED-4DB2-BD59-A6C34878D82A}">
-                    <a16:rowId xmlns="" xmlns:a16="http://schemas.microsoft.com/office/drawing/2014/main" val="10000"/>
+                    <a16:rowId xmlns:a16="http://schemas.microsoft.com/office/drawing/2014/main" xmlns="" val="10000"/>
                   </a:ext>
                 </a:extLst>
               </a:tr>
@@ -7471,7 +7487,7 @@
                 </a:tc>
                 <a:extLst>
                   <a:ext uri="{0D108BD9-81ED-4DB2-BD59-A6C34878D82A}">
-                    <a16:rowId xmlns="" xmlns:a16="http://schemas.microsoft.com/office/drawing/2014/main" val="10001"/>
+                    <a16:rowId xmlns:a16="http://schemas.microsoft.com/office/drawing/2014/main" xmlns="" val="10001"/>
                   </a:ext>
                 </a:extLst>
               </a:tr>
@@ -7673,7 +7689,7 @@
                 </a:tc>
                 <a:extLst>
                   <a:ext uri="{0D108BD9-81ED-4DB2-BD59-A6C34878D82A}">
-                    <a16:rowId xmlns="" xmlns:a16="http://schemas.microsoft.com/office/drawing/2014/main" val="10002"/>
+                    <a16:rowId xmlns:a16="http://schemas.microsoft.com/office/drawing/2014/main" xmlns="" val="10002"/>
                   </a:ext>
                 </a:extLst>
               </a:tr>
@@ -7855,7 +7871,7 @@
                 </a:tc>
                 <a:extLst>
                   <a:ext uri="{0D108BD9-81ED-4DB2-BD59-A6C34878D82A}">
-                    <a16:rowId xmlns="" xmlns:a16="http://schemas.microsoft.com/office/drawing/2014/main" val="10003"/>
+                    <a16:rowId xmlns:a16="http://schemas.microsoft.com/office/drawing/2014/main" xmlns="" val="10003"/>
                   </a:ext>
                 </a:extLst>
               </a:tr>
@@ -8181,7 +8197,7 @@
                 </a:tc>
                 <a:extLst>
                   <a:ext uri="{0D108BD9-81ED-4DB2-BD59-A6C34878D82A}">
-                    <a16:rowId xmlns="" xmlns:a16="http://schemas.microsoft.com/office/drawing/2014/main" val="10004"/>
+                    <a16:rowId xmlns:a16="http://schemas.microsoft.com/office/drawing/2014/main" xmlns="" val="10004"/>
                   </a:ext>
                 </a:extLst>
               </a:tr>
@@ -8194,7 +8210,7 @@
           <p:cNvPr id="5" name="Titel 1">
             <a:extLst>
               <a:ext uri="{FF2B5EF4-FFF2-40B4-BE49-F238E27FC236}">
-                <a16:creationId xmlns="" xmlns:a16="http://schemas.microsoft.com/office/drawing/2014/main" id="{57634FB6-1EFE-4652-9667-17798A640B50}"/>
+                <a16:creationId xmlns:a16="http://schemas.microsoft.com/office/drawing/2014/main" xmlns="" id="{57634FB6-1EFE-4652-9667-17798A640B50}"/>
               </a:ext>
             </a:extLst>
           </p:cNvPr>
@@ -8230,7 +8246,7 @@
                   <a:blip r:embed="rId2">
                     <a:extLst>
                       <a:ext uri="{28A0092B-C50C-407E-A947-70E740481C1C}">
-                        <a14:useLocalDpi xmlns:a14="http://schemas.microsoft.com/office/drawing/2010/main" xmlns="" val="0"/>
+                        <a14:useLocalDpi xmlns:a14="http://schemas.microsoft.com/office/drawing/2010/main" val="0"/>
                       </a:ext>
                     </a:extLst>
                   </a:blip>
@@ -8260,7 +8276,7 @@
           <p:cNvPr id="6" name="Tekstvak 12">
             <a:extLst>
               <a:ext uri="{FF2B5EF4-FFF2-40B4-BE49-F238E27FC236}">
-                <a16:creationId xmlns="" xmlns:a16="http://schemas.microsoft.com/office/drawing/2014/main" id="{35AAEF8A-1E8B-4134-8FA6-762EB3980799}"/>
+                <a16:creationId xmlns:a16="http://schemas.microsoft.com/office/drawing/2014/main" xmlns="" id="{35AAEF8A-1E8B-4134-8FA6-762EB3980799}"/>
               </a:ext>
             </a:extLst>
           </p:cNvPr>
@@ -8342,7 +8358,7 @@
     </p:spTree>
     <p:extLst>
       <p:ext uri="{BB962C8B-B14F-4D97-AF65-F5344CB8AC3E}">
-        <p14:creationId xmlns:p14="http://schemas.microsoft.com/office/powerpoint/2010/main" xmlns="" val="4073493650"/>
+        <p14:creationId xmlns:p14="http://schemas.microsoft.com/office/powerpoint/2010/main" val="4073493650"/>
       </p:ext>
     </p:extLst>
   </p:cSld>
@@ -8579,7 +8595,7 @@
           <p:nvPr>
             <p:extLst>
               <p:ext uri="{D42A27DB-BD31-4B8C-83A1-F6EECF244321}">
-                <p14:modId xmlns:p14="http://schemas.microsoft.com/office/powerpoint/2010/main" xmlns="" val="984398942"/>
+                <p14:modId xmlns:p14="http://schemas.microsoft.com/office/powerpoint/2010/main" val="984398942"/>
               </p:ext>
             </p:extLst>
           </p:nvPr>
@@ -8598,7 +8614,7 @@
                 <a:gridCol w="5939447">
                   <a:extLst>
                     <a:ext uri="{9D8B030D-6E8A-4147-A177-3AD203B41FA5}">
-                      <a16:colId xmlns="" xmlns:a16="http://schemas.microsoft.com/office/drawing/2014/main" val="20000"/>
+                      <a16:colId xmlns:a16="http://schemas.microsoft.com/office/drawing/2014/main" xmlns="" val="20000"/>
                     </a:ext>
                   </a:extLst>
                 </a:gridCol>
@@ -8606,14 +8622,14 @@
                 <a:gridCol w="1643865">
                   <a:extLst>
                     <a:ext uri="{9D8B030D-6E8A-4147-A177-3AD203B41FA5}">
-                      <a16:colId xmlns="" xmlns:a16="http://schemas.microsoft.com/office/drawing/2014/main" val="20001"/>
+                      <a16:colId xmlns:a16="http://schemas.microsoft.com/office/drawing/2014/main" xmlns="" val="20001"/>
                     </a:ext>
                   </a:extLst>
                 </a:gridCol>
                 <a:gridCol w="1684962">
                   <a:extLst>
                     <a:ext uri="{9D8B030D-6E8A-4147-A177-3AD203B41FA5}">
-                      <a16:colId xmlns="" xmlns:a16="http://schemas.microsoft.com/office/drawing/2014/main" val="20002"/>
+                      <a16:colId xmlns:a16="http://schemas.microsoft.com/office/drawing/2014/main" xmlns="" val="20002"/>
                     </a:ext>
                   </a:extLst>
                 </a:gridCol>
@@ -8690,7 +8706,7 @@
                 </a:tc>
                 <a:extLst>
                   <a:ext uri="{0D108BD9-81ED-4DB2-BD59-A6C34878D82A}">
-                    <a16:rowId xmlns="" xmlns:a16="http://schemas.microsoft.com/office/drawing/2014/main" val="10000"/>
+                    <a16:rowId xmlns:a16="http://schemas.microsoft.com/office/drawing/2014/main" xmlns="" val="10000"/>
                   </a:ext>
                 </a:extLst>
               </a:tr>
@@ -8904,7 +8920,7 @@
                 </a:tc>
                 <a:extLst>
                   <a:ext uri="{0D108BD9-81ED-4DB2-BD59-A6C34878D82A}">
-                    <a16:rowId xmlns="" xmlns:a16="http://schemas.microsoft.com/office/drawing/2014/main" val="10001"/>
+                    <a16:rowId xmlns:a16="http://schemas.microsoft.com/office/drawing/2014/main" xmlns="" val="10001"/>
                   </a:ext>
                 </a:extLst>
               </a:tr>
@@ -9280,7 +9296,7 @@
                 </a:tc>
                 <a:extLst>
                   <a:ext uri="{0D108BD9-81ED-4DB2-BD59-A6C34878D82A}">
-                    <a16:rowId xmlns="" xmlns:a16="http://schemas.microsoft.com/office/drawing/2014/main" val="10002"/>
+                    <a16:rowId xmlns:a16="http://schemas.microsoft.com/office/drawing/2014/main" xmlns="" val="10002"/>
                   </a:ext>
                 </a:extLst>
               </a:tr>
@@ -9799,7 +9815,7 @@
                 </a:tc>
                 <a:extLst>
                   <a:ext uri="{0D108BD9-81ED-4DB2-BD59-A6C34878D82A}">
-                    <a16:rowId xmlns="" xmlns:a16="http://schemas.microsoft.com/office/drawing/2014/main" val="10003"/>
+                    <a16:rowId xmlns:a16="http://schemas.microsoft.com/office/drawing/2014/main" xmlns="" val="10003"/>
                   </a:ext>
                 </a:extLst>
               </a:tr>
@@ -10259,7 +10275,7 @@
                 </a:tc>
                 <a:extLst>
                   <a:ext uri="{0D108BD9-81ED-4DB2-BD59-A6C34878D82A}">
-                    <a16:rowId xmlns="" xmlns:a16="http://schemas.microsoft.com/office/drawing/2014/main" val="10004"/>
+                    <a16:rowId xmlns:a16="http://schemas.microsoft.com/office/drawing/2014/main" xmlns="" val="10004"/>
                   </a:ext>
                 </a:extLst>
               </a:tr>
@@ -10272,7 +10288,7 @@
           <p:cNvPr id="7" name="Titel 1">
             <a:extLst>
               <a:ext uri="{FF2B5EF4-FFF2-40B4-BE49-F238E27FC236}">
-                <a16:creationId xmlns="" xmlns:a16="http://schemas.microsoft.com/office/drawing/2014/main" id="{3A5270FA-8269-42A6-96C7-79FBB8ED49C4}"/>
+                <a16:creationId xmlns:a16="http://schemas.microsoft.com/office/drawing/2014/main" xmlns="" id="{3A5270FA-8269-42A6-96C7-79FBB8ED49C4}"/>
               </a:ext>
             </a:extLst>
           </p:cNvPr>
@@ -10308,7 +10324,7 @@
                   <a:blip r:embed="rId2">
                     <a:extLst>
                       <a:ext uri="{28A0092B-C50C-407E-A947-70E740481C1C}">
-                        <a14:useLocalDpi xmlns:a14="http://schemas.microsoft.com/office/drawing/2010/main" xmlns="" val="0"/>
+                        <a14:useLocalDpi xmlns:a14="http://schemas.microsoft.com/office/drawing/2010/main" val="0"/>
                       </a:ext>
                     </a:extLst>
                   </a:blip>
@@ -10338,7 +10354,7 @@
           <p:cNvPr id="6" name="Tekstvak 12">
             <a:extLst>
               <a:ext uri="{FF2B5EF4-FFF2-40B4-BE49-F238E27FC236}">
-                <a16:creationId xmlns="" xmlns:a16="http://schemas.microsoft.com/office/drawing/2014/main" id="{35AAEF8A-1E8B-4134-8FA6-762EB3980799}"/>
+                <a16:creationId xmlns:a16="http://schemas.microsoft.com/office/drawing/2014/main" xmlns="" id="{35AAEF8A-1E8B-4134-8FA6-762EB3980799}"/>
               </a:ext>
             </a:extLst>
           </p:cNvPr>
@@ -10420,7 +10436,7 @@
     </p:spTree>
     <p:extLst>
       <p:ext uri="{BB962C8B-B14F-4D97-AF65-F5344CB8AC3E}">
-        <p14:creationId xmlns:p14="http://schemas.microsoft.com/office/powerpoint/2010/main" xmlns="" val="537525159"/>
+        <p14:creationId xmlns:p14="http://schemas.microsoft.com/office/powerpoint/2010/main" val="537525159"/>
       </p:ext>
     </p:extLst>
   </p:cSld>
@@ -10531,7 +10547,7 @@
           <a:blip r:embed="rId2" cstate="print">
             <a:extLst>
               <a:ext uri="{28A0092B-C50C-407E-A947-70E740481C1C}">
-                <a14:useLocalDpi xmlns:a14="http://schemas.microsoft.com/office/drawing/2010/main" xmlns="" val="0"/>
+                <a14:useLocalDpi xmlns:a14="http://schemas.microsoft.com/office/drawing/2010/main" val="0"/>
               </a:ext>
             </a:extLst>
           </a:blip>
@@ -10551,7 +10567,7 @@
           <a:noFill/>
           <a:extLst>
             <a:ext uri="{909E8E84-426E-40DD-AFC4-6F175D3DCCD1}">
-              <a14:hiddenFill xmlns:a14="http://schemas.microsoft.com/office/drawing/2010/main" xmlns="">
+              <a14:hiddenFill xmlns:a14="http://schemas.microsoft.com/office/drawing/2010/main">
                 <a:solidFill>
                   <a:srgbClr val="FFFFFF"/>
                 </a:solidFill>
@@ -10565,7 +10581,7 @@
           <p:cNvPr id="7" name="Tekstvak 12">
             <a:extLst>
               <a:ext uri="{FF2B5EF4-FFF2-40B4-BE49-F238E27FC236}">
-                <a16:creationId xmlns:a16="http://schemas.microsoft.com/office/drawing/2014/main" xmlns="" id="{35AAEF8A-1E8B-4134-8FA6-762EB3980799}"/>
+                <a16:creationId xmlns="" xmlns:a16="http://schemas.microsoft.com/office/drawing/2014/main" id="{35AAEF8A-1E8B-4134-8FA6-762EB3980799}"/>
               </a:ext>
             </a:extLst>
           </p:cNvPr>
@@ -10633,7 +10649,7 @@
     </p:spTree>
     <p:extLst>
       <p:ext uri="{BB962C8B-B14F-4D97-AF65-F5344CB8AC3E}">
-        <p14:creationId xmlns:p14="http://schemas.microsoft.com/office/powerpoint/2010/main" xmlns="" val="2424268661"/>
+        <p14:creationId xmlns:p14="http://schemas.microsoft.com/office/powerpoint/2010/main" val="2424268661"/>
       </p:ext>
     </p:extLst>
   </p:cSld>
@@ -10744,7 +10760,7 @@
           <a:blip r:embed="rId2" cstate="print">
             <a:extLst>
               <a:ext uri="{28A0092B-C50C-407E-A947-70E740481C1C}">
-                <a14:useLocalDpi xmlns:a14="http://schemas.microsoft.com/office/drawing/2010/main" xmlns="" val="0"/>
+                <a14:useLocalDpi xmlns:a14="http://schemas.microsoft.com/office/drawing/2010/main" val="0"/>
               </a:ext>
             </a:extLst>
           </a:blip>
@@ -10764,7 +10780,7 @@
           <a:noFill/>
           <a:extLst>
             <a:ext uri="{909E8E84-426E-40DD-AFC4-6F175D3DCCD1}">
-              <a14:hiddenFill xmlns:a14="http://schemas.microsoft.com/office/drawing/2010/main" xmlns="">
+              <a14:hiddenFill xmlns:a14="http://schemas.microsoft.com/office/drawing/2010/main">
                 <a:solidFill>
                   <a:srgbClr val="FFFFFF"/>
                 </a:solidFill>
@@ -10778,7 +10794,7 @@
           <p:cNvPr id="7" name="Tekstvak 12">
             <a:extLst>
               <a:ext uri="{FF2B5EF4-FFF2-40B4-BE49-F238E27FC236}">
-                <a16:creationId xmlns:a16="http://schemas.microsoft.com/office/drawing/2014/main" xmlns="" id="{35AAEF8A-1E8B-4134-8FA6-762EB3980799}"/>
+                <a16:creationId xmlns="" xmlns:a16="http://schemas.microsoft.com/office/drawing/2014/main" id="{35AAEF8A-1E8B-4134-8FA6-762EB3980799}"/>
               </a:ext>
             </a:extLst>
           </p:cNvPr>
@@ -10848,7 +10864,7 @@
           <p:cNvPr id="6" name="Rechthoek: afgeronde hoeken 3">
             <a:extLst>
               <a:ext uri="{FF2B5EF4-FFF2-40B4-BE49-F238E27FC236}">
-                <a16:creationId xmlns:a16="http://schemas.microsoft.com/office/drawing/2014/main" xmlns="" id="{FAD157E3-005E-4D6B-8ACD-9582341BA281}"/>
+                <a16:creationId xmlns="" xmlns:a16="http://schemas.microsoft.com/office/drawing/2014/main" id="{FAD157E3-005E-4D6B-8ACD-9582341BA281}"/>
               </a:ext>
             </a:extLst>
           </p:cNvPr>
@@ -10898,7 +10914,7 @@
     </p:spTree>
     <p:extLst>
       <p:ext uri="{BB962C8B-B14F-4D97-AF65-F5344CB8AC3E}">
-        <p14:creationId xmlns:p14="http://schemas.microsoft.com/office/powerpoint/2010/main" xmlns="" val="1079787711"/>
+        <p14:creationId xmlns:p14="http://schemas.microsoft.com/office/powerpoint/2010/main" val="1079787711"/>
       </p:ext>
     </p:extLst>
   </p:cSld>
@@ -12292,7 +12308,7 @@
           <p:cNvPr id="31" name="Tekstvak 12">
             <a:extLst>
               <a:ext uri="{FF2B5EF4-FFF2-40B4-BE49-F238E27FC236}">
-                <a16:creationId xmlns:a16="http://schemas.microsoft.com/office/drawing/2014/main" xmlns="" id="{35AAEF8A-1E8B-4134-8FA6-762EB3980799}"/>
+                <a16:creationId xmlns="" xmlns:a16="http://schemas.microsoft.com/office/drawing/2014/main" id="{35AAEF8A-1E8B-4134-8FA6-762EB3980799}"/>
               </a:ext>
             </a:extLst>
           </p:cNvPr>
@@ -12360,7 +12376,7 @@
     </p:spTree>
     <p:extLst>
       <p:ext uri="{BB962C8B-B14F-4D97-AF65-F5344CB8AC3E}">
-        <p14:creationId xmlns:p14="http://schemas.microsoft.com/office/powerpoint/2010/main" xmlns="" val="717371431"/>
+        <p14:creationId xmlns:p14="http://schemas.microsoft.com/office/powerpoint/2010/main" val="717371431"/>
       </p:ext>
     </p:extLst>
   </p:cSld>
@@ -13743,7 +13759,7 @@
           <p:cNvPr id="31" name="Tekstvak 12">
             <a:extLst>
               <a:ext uri="{FF2B5EF4-FFF2-40B4-BE49-F238E27FC236}">
-                <a16:creationId xmlns:a16="http://schemas.microsoft.com/office/drawing/2014/main" xmlns="" id="{35AAEF8A-1E8B-4134-8FA6-762EB3980799}"/>
+                <a16:creationId xmlns="" xmlns:a16="http://schemas.microsoft.com/office/drawing/2014/main" id="{35AAEF8A-1E8B-4134-8FA6-762EB3980799}"/>
               </a:ext>
             </a:extLst>
           </p:cNvPr>
@@ -13811,7 +13827,7 @@
     </p:spTree>
     <p:extLst>
       <p:ext uri="{BB962C8B-B14F-4D97-AF65-F5344CB8AC3E}">
-        <p14:creationId xmlns:p14="http://schemas.microsoft.com/office/powerpoint/2010/main" xmlns="" val="2781350608"/>
+        <p14:creationId xmlns:p14="http://schemas.microsoft.com/office/powerpoint/2010/main" val="2781350608"/>
       </p:ext>
     </p:extLst>
   </p:cSld>
@@ -13922,7 +13938,7 @@
           <a:blip r:embed="rId2" cstate="print">
             <a:extLst>
               <a:ext uri="{28A0092B-C50C-407E-A947-70E740481C1C}">
-                <a14:useLocalDpi xmlns:a14="http://schemas.microsoft.com/office/drawing/2010/main" xmlns="" val="0"/>
+                <a14:useLocalDpi xmlns:a14="http://schemas.microsoft.com/office/drawing/2010/main" val="0"/>
               </a:ext>
             </a:extLst>
           </a:blip>
@@ -13942,7 +13958,7 @@
           <a:noFill/>
           <a:extLst>
             <a:ext uri="{909E8E84-426E-40DD-AFC4-6F175D3DCCD1}">
-              <a14:hiddenFill xmlns:a14="http://schemas.microsoft.com/office/drawing/2010/main" xmlns="">
+              <a14:hiddenFill xmlns:a14="http://schemas.microsoft.com/office/drawing/2010/main">
                 <a:solidFill>
                   <a:srgbClr val="FFFFFF"/>
                 </a:solidFill>
@@ -13956,7 +13972,7 @@
           <p:cNvPr id="7" name="Tekstvak 12">
             <a:extLst>
               <a:ext uri="{FF2B5EF4-FFF2-40B4-BE49-F238E27FC236}">
-                <a16:creationId xmlns:a16="http://schemas.microsoft.com/office/drawing/2014/main" xmlns="" id="{35AAEF8A-1E8B-4134-8FA6-762EB3980799}"/>
+                <a16:creationId xmlns="" xmlns:a16="http://schemas.microsoft.com/office/drawing/2014/main" id="{35AAEF8A-1E8B-4134-8FA6-762EB3980799}"/>
               </a:ext>
             </a:extLst>
           </p:cNvPr>
@@ -14026,7 +14042,7 @@
           <p:cNvPr id="6" name="Rechthoek: afgeronde hoeken 3">
             <a:extLst>
               <a:ext uri="{FF2B5EF4-FFF2-40B4-BE49-F238E27FC236}">
-                <a16:creationId xmlns:a16="http://schemas.microsoft.com/office/drawing/2014/main" xmlns="" id="{FAD157E3-005E-4D6B-8ACD-9582341BA281}"/>
+                <a16:creationId xmlns="" xmlns:a16="http://schemas.microsoft.com/office/drawing/2014/main" id="{FAD157E3-005E-4D6B-8ACD-9582341BA281}"/>
               </a:ext>
             </a:extLst>
           </p:cNvPr>
@@ -14076,7 +14092,7 @@
     </p:spTree>
     <p:extLst>
       <p:ext uri="{BB962C8B-B14F-4D97-AF65-F5344CB8AC3E}">
-        <p14:creationId xmlns:p14="http://schemas.microsoft.com/office/powerpoint/2010/main" xmlns="" val="4041327318"/>
+        <p14:creationId xmlns:p14="http://schemas.microsoft.com/office/powerpoint/2010/main" val="4041327318"/>
       </p:ext>
     </p:extLst>
   </p:cSld>
@@ -14115,7 +14131,7 @@
           <p:cNvPr id="51" name="Rechthoek 8">
             <a:extLst>
               <a:ext uri="{FF2B5EF4-FFF2-40B4-BE49-F238E27FC236}">
-                <a16:creationId xmlns="" xmlns:a16="http://schemas.microsoft.com/office/drawing/2014/main" id="{2EF3A218-A581-4942-95E5-912DA50B7BC2}"/>
+                <a16:creationId xmlns:a16="http://schemas.microsoft.com/office/drawing/2014/main" xmlns="" id="{2EF3A218-A581-4942-95E5-912DA50B7BC2}"/>
               </a:ext>
             </a:extLst>
           </p:cNvPr>
@@ -14216,7 +14232,7 @@
           <p:cNvPr id="6" name="Tekstvak 12">
             <a:extLst>
               <a:ext uri="{FF2B5EF4-FFF2-40B4-BE49-F238E27FC236}">
-                <a16:creationId xmlns="" xmlns:a16="http://schemas.microsoft.com/office/drawing/2014/main" id="{35AAEF8A-1E8B-4134-8FA6-762EB3980799}"/>
+                <a16:creationId xmlns:a16="http://schemas.microsoft.com/office/drawing/2014/main" xmlns="" id="{35AAEF8A-1E8B-4134-8FA6-762EB3980799}"/>
               </a:ext>
             </a:extLst>
           </p:cNvPr>
@@ -14772,7 +14788,7 @@
           <p:cNvPr id="124" name="Rechthoek 8">
             <a:extLst>
               <a:ext uri="{FF2B5EF4-FFF2-40B4-BE49-F238E27FC236}">
-                <a16:creationId xmlns="" xmlns:a16="http://schemas.microsoft.com/office/drawing/2014/main" id="{2EF3A218-A581-4942-95E5-912DA50B7BC2}"/>
+                <a16:creationId xmlns:a16="http://schemas.microsoft.com/office/drawing/2014/main" xmlns="" id="{2EF3A218-A581-4942-95E5-912DA50B7BC2}"/>
               </a:ext>
             </a:extLst>
           </p:cNvPr>
@@ -14825,7 +14841,7 @@
     </p:spTree>
     <p:extLst>
       <p:ext uri="{BB962C8B-B14F-4D97-AF65-F5344CB8AC3E}">
-        <p14:creationId xmlns:p14="http://schemas.microsoft.com/office/powerpoint/2010/main" xmlns="" val="1998351486"/>
+        <p14:creationId xmlns:p14="http://schemas.microsoft.com/office/powerpoint/2010/main" val="1998351486"/>
       </p:ext>
     </p:extLst>
   </p:cSld>
@@ -14864,7 +14880,7 @@
           <p:cNvPr id="2" name="Titel 1">
             <a:extLst>
               <a:ext uri="{FF2B5EF4-FFF2-40B4-BE49-F238E27FC236}">
-                <a16:creationId xmlns:a16="http://schemas.microsoft.com/office/drawing/2014/main" xmlns="" id="{769A96FB-BA26-47C0-85BC-9E5A44D94A65}"/>
+                <a16:creationId xmlns="" xmlns:a16="http://schemas.microsoft.com/office/drawing/2014/main" id="{769A96FB-BA26-47C0-85BC-9E5A44D94A65}"/>
               </a:ext>
             </a:extLst>
           </p:cNvPr>
@@ -14900,7 +14916,7 @@
           <p:cNvPr id="7" name="AutoShape 2" descr="Afbeeldingsresultaat voor cel from human">
             <a:extLst>
               <a:ext uri="{FF2B5EF4-FFF2-40B4-BE49-F238E27FC236}">
-                <a16:creationId xmlns:a16="http://schemas.microsoft.com/office/drawing/2014/main" xmlns="" id="{BAA6AD35-A0AD-46FB-8C83-83697536AD9E}"/>
+                <a16:creationId xmlns="" xmlns:a16="http://schemas.microsoft.com/office/drawing/2014/main" id="{BAA6AD35-A0AD-46FB-8C83-83697536AD9E}"/>
               </a:ext>
             </a:extLst>
           </p:cNvPr>
@@ -14920,7 +14936,7 @@
           <a:noFill/>
           <a:extLst>
             <a:ext uri="{909E8E84-426E-40DD-AFC4-6F175D3DCCD1}">
-              <a14:hiddenFill xmlns:a14="http://schemas.microsoft.com/office/drawing/2010/main" xmlns="">
+              <a14:hiddenFill xmlns:a14="http://schemas.microsoft.com/office/drawing/2010/main">
                 <a:solidFill>
                   <a:srgbClr val="FFFFFF"/>
                 </a:solidFill>
@@ -14945,7 +14961,7 @@
           <p:cNvPr id="14" name="AutoShape 4" descr="Afbeeldingsresultaat voor cel from human">
             <a:extLst>
               <a:ext uri="{FF2B5EF4-FFF2-40B4-BE49-F238E27FC236}">
-                <a16:creationId xmlns:a16="http://schemas.microsoft.com/office/drawing/2014/main" xmlns="" id="{DE7F6D67-FFDD-4318-B4D9-E249E6758D4A}"/>
+                <a16:creationId xmlns="" xmlns:a16="http://schemas.microsoft.com/office/drawing/2014/main" id="{DE7F6D67-FFDD-4318-B4D9-E249E6758D4A}"/>
               </a:ext>
             </a:extLst>
           </p:cNvPr>
@@ -14965,7 +14981,7 @@
           <a:noFill/>
           <a:extLst>
             <a:ext uri="{909E8E84-426E-40DD-AFC4-6F175D3DCCD1}">
-              <a14:hiddenFill xmlns:a14="http://schemas.microsoft.com/office/drawing/2010/main" xmlns="">
+              <a14:hiddenFill xmlns:a14="http://schemas.microsoft.com/office/drawing/2010/main">
                 <a:solidFill>
                   <a:srgbClr val="FFFFFF"/>
                 </a:solidFill>
@@ -14990,7 +15006,7 @@
           <p:cNvPr id="16" name="Afbeelding 15">
             <a:extLst>
               <a:ext uri="{FF2B5EF4-FFF2-40B4-BE49-F238E27FC236}">
-                <a16:creationId xmlns:a16="http://schemas.microsoft.com/office/drawing/2014/main" xmlns="" id="{028B203A-6AFB-43CC-A2E5-888B735C297F}"/>
+                <a16:creationId xmlns="" xmlns:a16="http://schemas.microsoft.com/office/drawing/2014/main" id="{028B203A-6AFB-43CC-A2E5-888B735C297F}"/>
               </a:ext>
             </a:extLst>
           </p:cNvPr>
@@ -15003,7 +15019,7 @@
           <a:blip r:embed="rId2" cstate="print">
             <a:extLst>
               <a:ext uri="{28A0092B-C50C-407E-A947-70E740481C1C}">
-                <a14:useLocalDpi xmlns:a14="http://schemas.microsoft.com/office/drawing/2010/main" xmlns="" val="0"/>
+                <a14:useLocalDpi xmlns:a14="http://schemas.microsoft.com/office/drawing/2010/main" val="0"/>
               </a:ext>
             </a:extLst>
           </a:blip>
@@ -15026,7 +15042,7 @@
           <p:cNvPr id="19" name="Gelijkbenige driehoek 18">
             <a:extLst>
               <a:ext uri="{FF2B5EF4-FFF2-40B4-BE49-F238E27FC236}">
-                <a16:creationId xmlns:a16="http://schemas.microsoft.com/office/drawing/2014/main" xmlns="" id="{3473C7A5-6D55-4B8D-B912-17E38BDAAE6F}"/>
+                <a16:creationId xmlns="" xmlns:a16="http://schemas.microsoft.com/office/drawing/2014/main" id="{3473C7A5-6D55-4B8D-B912-17E38BDAAE6F}"/>
               </a:ext>
             </a:extLst>
           </p:cNvPr>
@@ -15085,7 +15101,7 @@
           <p:cNvPr id="21" name="Afbeelding 20">
             <a:extLst>
               <a:ext uri="{FF2B5EF4-FFF2-40B4-BE49-F238E27FC236}">
-                <a16:creationId xmlns:a16="http://schemas.microsoft.com/office/drawing/2014/main" xmlns="" id="{2E4ED76A-8CDE-4820-BEF2-FFF0CAB0FFC2}"/>
+                <a16:creationId xmlns="" xmlns:a16="http://schemas.microsoft.com/office/drawing/2014/main" id="{2E4ED76A-8CDE-4820-BEF2-FFF0CAB0FFC2}"/>
               </a:ext>
             </a:extLst>
           </p:cNvPr>
@@ -15115,7 +15131,7 @@
           <p:cNvPr id="29" name="Tekstvak 28">
             <a:extLst>
               <a:ext uri="{FF2B5EF4-FFF2-40B4-BE49-F238E27FC236}">
-                <a16:creationId xmlns:a16="http://schemas.microsoft.com/office/drawing/2014/main" xmlns="" id="{3F5F8535-0F1D-4072-B4F7-ECC8E1EF4714}"/>
+                <a16:creationId xmlns="" xmlns:a16="http://schemas.microsoft.com/office/drawing/2014/main" id="{3F5F8535-0F1D-4072-B4F7-ECC8E1EF4714}"/>
               </a:ext>
             </a:extLst>
           </p:cNvPr>
@@ -15150,7 +15166,7 @@
           <p:cNvPr id="30" name="Tekstvak 29">
             <a:extLst>
               <a:ext uri="{FF2B5EF4-FFF2-40B4-BE49-F238E27FC236}">
-                <a16:creationId xmlns:a16="http://schemas.microsoft.com/office/drawing/2014/main" xmlns="" id="{60EFD1DE-A3E9-41CC-9FD4-3B5142326B68}"/>
+                <a16:creationId xmlns="" xmlns:a16="http://schemas.microsoft.com/office/drawing/2014/main" id="{60EFD1DE-A3E9-41CC-9FD4-3B5142326B68}"/>
               </a:ext>
             </a:extLst>
           </p:cNvPr>
@@ -15185,7 +15201,7 @@
           <p:cNvPr id="11" name="Tekstvak 12">
             <a:extLst>
               <a:ext uri="{FF2B5EF4-FFF2-40B4-BE49-F238E27FC236}">
-                <a16:creationId xmlns:a16="http://schemas.microsoft.com/office/drawing/2014/main" xmlns="" id="{35AAEF8A-1E8B-4134-8FA6-762EB3980799}"/>
+                <a16:creationId xmlns="" xmlns:a16="http://schemas.microsoft.com/office/drawing/2014/main" id="{35AAEF8A-1E8B-4134-8FA6-762EB3980799}"/>
               </a:ext>
             </a:extLst>
           </p:cNvPr>
@@ -15267,7 +15283,7 @@
     </p:spTree>
     <p:extLst>
       <p:ext uri="{BB962C8B-B14F-4D97-AF65-F5344CB8AC3E}">
-        <p14:creationId xmlns:p14="http://schemas.microsoft.com/office/powerpoint/2010/main" xmlns="" val="875101815"/>
+        <p14:creationId xmlns:p14="http://schemas.microsoft.com/office/powerpoint/2010/main" val="875101815"/>
       </p:ext>
     </p:extLst>
   </p:cSld>
@@ -15306,7 +15322,7 @@
           <p:cNvPr id="51" name="Rechthoek 8">
             <a:extLst>
               <a:ext uri="{FF2B5EF4-FFF2-40B4-BE49-F238E27FC236}">
-                <a16:creationId xmlns="" xmlns:a16="http://schemas.microsoft.com/office/drawing/2014/main" id="{2EF3A218-A581-4942-95E5-912DA50B7BC2}"/>
+                <a16:creationId xmlns:a16="http://schemas.microsoft.com/office/drawing/2014/main" xmlns="" id="{2EF3A218-A581-4942-95E5-912DA50B7BC2}"/>
               </a:ext>
             </a:extLst>
           </p:cNvPr>
@@ -15407,7 +15423,7 @@
           <p:cNvPr id="6" name="Tekstvak 12">
             <a:extLst>
               <a:ext uri="{FF2B5EF4-FFF2-40B4-BE49-F238E27FC236}">
-                <a16:creationId xmlns="" xmlns:a16="http://schemas.microsoft.com/office/drawing/2014/main" id="{35AAEF8A-1E8B-4134-8FA6-762EB3980799}"/>
+                <a16:creationId xmlns:a16="http://schemas.microsoft.com/office/drawing/2014/main" xmlns="" id="{35AAEF8A-1E8B-4134-8FA6-762EB3980799}"/>
               </a:ext>
             </a:extLst>
           </p:cNvPr>
@@ -15963,7 +15979,7 @@
           <p:cNvPr id="124" name="Rechthoek 8">
             <a:extLst>
               <a:ext uri="{FF2B5EF4-FFF2-40B4-BE49-F238E27FC236}">
-                <a16:creationId xmlns="" xmlns:a16="http://schemas.microsoft.com/office/drawing/2014/main" id="{2EF3A218-A581-4942-95E5-912DA50B7BC2}"/>
+                <a16:creationId xmlns:a16="http://schemas.microsoft.com/office/drawing/2014/main" xmlns="" id="{2EF3A218-A581-4942-95E5-912DA50B7BC2}"/>
               </a:ext>
             </a:extLst>
           </p:cNvPr>
@@ -16539,7 +16555,7 @@
     </p:spTree>
     <p:extLst>
       <p:ext uri="{BB962C8B-B14F-4D97-AF65-F5344CB8AC3E}">
-        <p14:creationId xmlns:p14="http://schemas.microsoft.com/office/powerpoint/2010/main" xmlns="" val="2068231559"/>
+        <p14:creationId xmlns:p14="http://schemas.microsoft.com/office/powerpoint/2010/main" val="2068231559"/>
       </p:ext>
     </p:extLst>
   </p:cSld>
@@ -16578,7 +16594,7 @@
           <p:cNvPr id="51" name="Rechthoek 8">
             <a:extLst>
               <a:ext uri="{FF2B5EF4-FFF2-40B4-BE49-F238E27FC236}">
-                <a16:creationId xmlns="" xmlns:a16="http://schemas.microsoft.com/office/drawing/2014/main" id="{2EF3A218-A581-4942-95E5-912DA50B7BC2}"/>
+                <a16:creationId xmlns:a16="http://schemas.microsoft.com/office/drawing/2014/main" xmlns="" id="{2EF3A218-A581-4942-95E5-912DA50B7BC2}"/>
               </a:ext>
             </a:extLst>
           </p:cNvPr>
@@ -16679,7 +16695,7 @@
           <p:cNvPr id="6" name="Tekstvak 12">
             <a:extLst>
               <a:ext uri="{FF2B5EF4-FFF2-40B4-BE49-F238E27FC236}">
-                <a16:creationId xmlns="" xmlns:a16="http://schemas.microsoft.com/office/drawing/2014/main" id="{35AAEF8A-1E8B-4134-8FA6-762EB3980799}"/>
+                <a16:creationId xmlns:a16="http://schemas.microsoft.com/office/drawing/2014/main" xmlns="" id="{35AAEF8A-1E8B-4134-8FA6-762EB3980799}"/>
               </a:ext>
             </a:extLst>
           </p:cNvPr>
@@ -17235,7 +17251,7 @@
           <p:cNvPr id="124" name="Rechthoek 8">
             <a:extLst>
               <a:ext uri="{FF2B5EF4-FFF2-40B4-BE49-F238E27FC236}">
-                <a16:creationId xmlns="" xmlns:a16="http://schemas.microsoft.com/office/drawing/2014/main" id="{2EF3A218-A581-4942-95E5-912DA50B7BC2}"/>
+                <a16:creationId xmlns:a16="http://schemas.microsoft.com/office/drawing/2014/main" xmlns="" id="{2EF3A218-A581-4942-95E5-912DA50B7BC2}"/>
               </a:ext>
             </a:extLst>
           </p:cNvPr>
@@ -18031,7 +18047,7 @@
     </p:spTree>
     <p:extLst>
       <p:ext uri="{BB962C8B-B14F-4D97-AF65-F5344CB8AC3E}">
-        <p14:creationId xmlns:p14="http://schemas.microsoft.com/office/powerpoint/2010/main" xmlns="" val="2866703418"/>
+        <p14:creationId xmlns:p14="http://schemas.microsoft.com/office/powerpoint/2010/main" val="2866703418"/>
       </p:ext>
     </p:extLst>
   </p:cSld>
@@ -18070,7 +18086,7 @@
           <p:cNvPr id="51" name="Rechthoek 8">
             <a:extLst>
               <a:ext uri="{FF2B5EF4-FFF2-40B4-BE49-F238E27FC236}">
-                <a16:creationId xmlns="" xmlns:a16="http://schemas.microsoft.com/office/drawing/2014/main" id="{2EF3A218-A581-4942-95E5-912DA50B7BC2}"/>
+                <a16:creationId xmlns:a16="http://schemas.microsoft.com/office/drawing/2014/main" xmlns="" id="{2EF3A218-A581-4942-95E5-912DA50B7BC2}"/>
               </a:ext>
             </a:extLst>
           </p:cNvPr>
@@ -18171,7 +18187,7 @@
           <p:cNvPr id="6" name="Tekstvak 12">
             <a:extLst>
               <a:ext uri="{FF2B5EF4-FFF2-40B4-BE49-F238E27FC236}">
-                <a16:creationId xmlns="" xmlns:a16="http://schemas.microsoft.com/office/drawing/2014/main" id="{35AAEF8A-1E8B-4134-8FA6-762EB3980799}"/>
+                <a16:creationId xmlns:a16="http://schemas.microsoft.com/office/drawing/2014/main" xmlns="" id="{35AAEF8A-1E8B-4134-8FA6-762EB3980799}"/>
               </a:ext>
             </a:extLst>
           </p:cNvPr>
@@ -18719,7 +18735,7 @@
           <p:cNvPr id="124" name="Rechthoek 8">
             <a:extLst>
               <a:ext uri="{FF2B5EF4-FFF2-40B4-BE49-F238E27FC236}">
-                <a16:creationId xmlns="" xmlns:a16="http://schemas.microsoft.com/office/drawing/2014/main" id="{2EF3A218-A581-4942-95E5-912DA50B7BC2}"/>
+                <a16:creationId xmlns:a16="http://schemas.microsoft.com/office/drawing/2014/main" xmlns="" id="{2EF3A218-A581-4942-95E5-912DA50B7BC2}"/>
               </a:ext>
             </a:extLst>
           </p:cNvPr>
@@ -19910,7 +19926,7 @@
     </p:spTree>
     <p:extLst>
       <p:ext uri="{BB962C8B-B14F-4D97-AF65-F5344CB8AC3E}">
-        <p14:creationId xmlns:p14="http://schemas.microsoft.com/office/powerpoint/2010/main" xmlns="" val="637490418"/>
+        <p14:creationId xmlns:p14="http://schemas.microsoft.com/office/powerpoint/2010/main" val="637490418"/>
       </p:ext>
     </p:extLst>
   </p:cSld>
@@ -19949,7 +19965,7 @@
           <p:cNvPr id="51" name="Rechthoek 8">
             <a:extLst>
               <a:ext uri="{FF2B5EF4-FFF2-40B4-BE49-F238E27FC236}">
-                <a16:creationId xmlns="" xmlns:a16="http://schemas.microsoft.com/office/drawing/2014/main" id="{2EF3A218-A581-4942-95E5-912DA50B7BC2}"/>
+                <a16:creationId xmlns:a16="http://schemas.microsoft.com/office/drawing/2014/main" xmlns="" id="{2EF3A218-A581-4942-95E5-912DA50B7BC2}"/>
               </a:ext>
             </a:extLst>
           </p:cNvPr>
@@ -20050,7 +20066,7 @@
           <p:cNvPr id="6" name="Tekstvak 12">
             <a:extLst>
               <a:ext uri="{FF2B5EF4-FFF2-40B4-BE49-F238E27FC236}">
-                <a16:creationId xmlns="" xmlns:a16="http://schemas.microsoft.com/office/drawing/2014/main" id="{35AAEF8A-1E8B-4134-8FA6-762EB3980799}"/>
+                <a16:creationId xmlns:a16="http://schemas.microsoft.com/office/drawing/2014/main" xmlns="" id="{35AAEF8A-1E8B-4134-8FA6-762EB3980799}"/>
               </a:ext>
             </a:extLst>
           </p:cNvPr>
@@ -20598,7 +20614,7 @@
           <p:cNvPr id="124" name="Rechthoek 8">
             <a:extLst>
               <a:ext uri="{FF2B5EF4-FFF2-40B4-BE49-F238E27FC236}">
-                <a16:creationId xmlns="" xmlns:a16="http://schemas.microsoft.com/office/drawing/2014/main" id="{2EF3A218-A581-4942-95E5-912DA50B7BC2}"/>
+                <a16:creationId xmlns:a16="http://schemas.microsoft.com/office/drawing/2014/main" xmlns="" id="{2EF3A218-A581-4942-95E5-912DA50B7BC2}"/>
               </a:ext>
             </a:extLst>
           </p:cNvPr>
@@ -21879,7 +21895,7 @@
     </p:spTree>
     <p:extLst>
       <p:ext uri="{BB962C8B-B14F-4D97-AF65-F5344CB8AC3E}">
-        <p14:creationId xmlns:p14="http://schemas.microsoft.com/office/powerpoint/2010/main" xmlns="" val="1248562259"/>
+        <p14:creationId xmlns:p14="http://schemas.microsoft.com/office/powerpoint/2010/main" val="1248562259"/>
       </p:ext>
     </p:extLst>
   </p:cSld>
@@ -21918,7 +21934,7 @@
           <p:cNvPr id="51" name="Rechthoek 8">
             <a:extLst>
               <a:ext uri="{FF2B5EF4-FFF2-40B4-BE49-F238E27FC236}">
-                <a16:creationId xmlns="" xmlns:a16="http://schemas.microsoft.com/office/drawing/2014/main" id="{2EF3A218-A581-4942-95E5-912DA50B7BC2}"/>
+                <a16:creationId xmlns:a16="http://schemas.microsoft.com/office/drawing/2014/main" xmlns="" id="{2EF3A218-A581-4942-95E5-912DA50B7BC2}"/>
               </a:ext>
             </a:extLst>
           </p:cNvPr>
@@ -22019,7 +22035,7 @@
           <p:cNvPr id="6" name="Tekstvak 12">
             <a:extLst>
               <a:ext uri="{FF2B5EF4-FFF2-40B4-BE49-F238E27FC236}">
-                <a16:creationId xmlns="" xmlns:a16="http://schemas.microsoft.com/office/drawing/2014/main" id="{35AAEF8A-1E8B-4134-8FA6-762EB3980799}"/>
+                <a16:creationId xmlns:a16="http://schemas.microsoft.com/office/drawing/2014/main" xmlns="" id="{35AAEF8A-1E8B-4134-8FA6-762EB3980799}"/>
               </a:ext>
             </a:extLst>
           </p:cNvPr>
@@ -22567,7 +22583,7 @@
           <p:cNvPr id="124" name="Rechthoek 8">
             <a:extLst>
               <a:ext uri="{FF2B5EF4-FFF2-40B4-BE49-F238E27FC236}">
-                <a16:creationId xmlns="" xmlns:a16="http://schemas.microsoft.com/office/drawing/2014/main" id="{2EF3A218-A581-4942-95E5-912DA50B7BC2}"/>
+                <a16:creationId xmlns:a16="http://schemas.microsoft.com/office/drawing/2014/main" xmlns="" id="{2EF3A218-A581-4942-95E5-912DA50B7BC2}"/>
               </a:ext>
             </a:extLst>
           </p:cNvPr>
@@ -24081,7 +24097,7 @@
     </p:spTree>
     <p:extLst>
       <p:ext uri="{BB962C8B-B14F-4D97-AF65-F5344CB8AC3E}">
-        <p14:creationId xmlns:p14="http://schemas.microsoft.com/office/powerpoint/2010/main" xmlns="" val="195424327"/>
+        <p14:creationId xmlns:p14="http://schemas.microsoft.com/office/powerpoint/2010/main" val="195424327"/>
       </p:ext>
     </p:extLst>
   </p:cSld>
@@ -24120,7 +24136,7 @@
           <p:cNvPr id="51" name="Rechthoek 8">
             <a:extLst>
               <a:ext uri="{FF2B5EF4-FFF2-40B4-BE49-F238E27FC236}">
-                <a16:creationId xmlns:a16="http://schemas.microsoft.com/office/drawing/2014/main" xmlns="" id="{2EF3A218-A581-4942-95E5-912DA50B7BC2}"/>
+                <a16:creationId xmlns="" xmlns:a16="http://schemas.microsoft.com/office/drawing/2014/main" id="{2EF3A218-A581-4942-95E5-912DA50B7BC2}"/>
               </a:ext>
             </a:extLst>
           </p:cNvPr>
@@ -24221,7 +24237,7 @@
           <p:cNvPr id="6" name="Tekstvak 12">
             <a:extLst>
               <a:ext uri="{FF2B5EF4-FFF2-40B4-BE49-F238E27FC236}">
-                <a16:creationId xmlns:a16="http://schemas.microsoft.com/office/drawing/2014/main" xmlns="" id="{35AAEF8A-1E8B-4134-8FA6-762EB3980799}"/>
+                <a16:creationId xmlns="" xmlns:a16="http://schemas.microsoft.com/office/drawing/2014/main" id="{35AAEF8A-1E8B-4134-8FA6-762EB3980799}"/>
               </a:ext>
             </a:extLst>
           </p:cNvPr>
@@ -24769,7 +24785,7 @@
           <p:cNvPr id="124" name="Rechthoek 8">
             <a:extLst>
               <a:ext uri="{FF2B5EF4-FFF2-40B4-BE49-F238E27FC236}">
-                <a16:creationId xmlns:a16="http://schemas.microsoft.com/office/drawing/2014/main" xmlns="" id="{2EF3A218-A581-4942-95E5-912DA50B7BC2}"/>
+                <a16:creationId xmlns="" xmlns:a16="http://schemas.microsoft.com/office/drawing/2014/main" id="{2EF3A218-A581-4942-95E5-912DA50B7BC2}"/>
               </a:ext>
             </a:extLst>
           </p:cNvPr>
@@ -25790,7 +25806,7 @@
           <a:blip r:embed="rId3" cstate="print">
             <a:extLst>
               <a:ext uri="{28A0092B-C50C-407E-A947-70E740481C1C}">
-                <a14:useLocalDpi xmlns:a14="http://schemas.microsoft.com/office/drawing/2010/main" xmlns="" val="0"/>
+                <a14:useLocalDpi xmlns:a14="http://schemas.microsoft.com/office/drawing/2010/main" val="0"/>
               </a:ext>
             </a:extLst>
           </a:blip>
@@ -25810,7 +25826,7 @@
           <a:noFill/>
           <a:extLst>
             <a:ext uri="{909E8E84-426E-40DD-AFC4-6F175D3DCCD1}">
-              <a14:hiddenFill xmlns:a14="http://schemas.microsoft.com/office/drawing/2010/main" xmlns="">
+              <a14:hiddenFill xmlns:a14="http://schemas.microsoft.com/office/drawing/2010/main">
                 <a:solidFill>
                   <a:srgbClr val="FFFFFF"/>
                 </a:solidFill>
@@ -26278,7 +26294,7 @@
     </p:spTree>
     <p:extLst>
       <p:ext uri="{BB962C8B-B14F-4D97-AF65-F5344CB8AC3E}">
-        <p14:creationId xmlns:p14="http://schemas.microsoft.com/office/powerpoint/2010/main" xmlns="" val="4125545122"/>
+        <p14:creationId xmlns:p14="http://schemas.microsoft.com/office/powerpoint/2010/main" val="4125545122"/>
       </p:ext>
     </p:extLst>
   </p:cSld>
@@ -26317,7 +26333,7 @@
           <p:cNvPr id="51" name="Rechthoek 8">
             <a:extLst>
               <a:ext uri="{FF2B5EF4-FFF2-40B4-BE49-F238E27FC236}">
-                <a16:creationId xmlns:a16="http://schemas.microsoft.com/office/drawing/2014/main" xmlns="" id="{2EF3A218-A581-4942-95E5-912DA50B7BC2}"/>
+                <a16:creationId xmlns="" xmlns:a16="http://schemas.microsoft.com/office/drawing/2014/main" id="{2EF3A218-A581-4942-95E5-912DA50B7BC2}"/>
               </a:ext>
             </a:extLst>
           </p:cNvPr>
@@ -26424,7 +26440,7 @@
           <p:cNvPr id="6" name="Tekstvak 12">
             <a:extLst>
               <a:ext uri="{FF2B5EF4-FFF2-40B4-BE49-F238E27FC236}">
-                <a16:creationId xmlns:a16="http://schemas.microsoft.com/office/drawing/2014/main" xmlns="" id="{35AAEF8A-1E8B-4134-8FA6-762EB3980799}"/>
+                <a16:creationId xmlns="" xmlns:a16="http://schemas.microsoft.com/office/drawing/2014/main" id="{35AAEF8A-1E8B-4134-8FA6-762EB3980799}"/>
               </a:ext>
             </a:extLst>
           </p:cNvPr>
@@ -26972,7 +26988,7 @@
           <p:cNvPr id="124" name="Rechthoek 8">
             <a:extLst>
               <a:ext uri="{FF2B5EF4-FFF2-40B4-BE49-F238E27FC236}">
-                <a16:creationId xmlns:a16="http://schemas.microsoft.com/office/drawing/2014/main" xmlns="" id="{2EF3A218-A581-4942-95E5-912DA50B7BC2}"/>
+                <a16:creationId xmlns="" xmlns:a16="http://schemas.microsoft.com/office/drawing/2014/main" id="{2EF3A218-A581-4942-95E5-912DA50B7BC2}"/>
               </a:ext>
             </a:extLst>
           </p:cNvPr>
@@ -28440,7 +28456,7 @@
     </p:spTree>
     <p:extLst>
       <p:ext uri="{BB962C8B-B14F-4D97-AF65-F5344CB8AC3E}">
-        <p14:creationId xmlns:p14="http://schemas.microsoft.com/office/powerpoint/2010/main" xmlns="" val="2091336189"/>
+        <p14:creationId xmlns:p14="http://schemas.microsoft.com/office/powerpoint/2010/main" val="2091336189"/>
       </p:ext>
     </p:extLst>
   </p:cSld>
@@ -28479,7 +28495,7 @@
           <p:cNvPr id="51" name="Rechthoek 8">
             <a:extLst>
               <a:ext uri="{FF2B5EF4-FFF2-40B4-BE49-F238E27FC236}">
-                <a16:creationId xmlns:a16="http://schemas.microsoft.com/office/drawing/2014/main" xmlns="" id="{2EF3A218-A581-4942-95E5-912DA50B7BC2}"/>
+                <a16:creationId xmlns="" xmlns:a16="http://schemas.microsoft.com/office/drawing/2014/main" id="{2EF3A218-A581-4942-95E5-912DA50B7BC2}"/>
               </a:ext>
             </a:extLst>
           </p:cNvPr>
@@ -28612,7 +28628,7 @@
           <p:cNvPr id="6" name="Tekstvak 12">
             <a:extLst>
               <a:ext uri="{FF2B5EF4-FFF2-40B4-BE49-F238E27FC236}">
-                <a16:creationId xmlns:a16="http://schemas.microsoft.com/office/drawing/2014/main" xmlns="" id="{35AAEF8A-1E8B-4134-8FA6-762EB3980799}"/>
+                <a16:creationId xmlns="" xmlns:a16="http://schemas.microsoft.com/office/drawing/2014/main" id="{35AAEF8A-1E8B-4134-8FA6-762EB3980799}"/>
               </a:ext>
             </a:extLst>
           </p:cNvPr>
@@ -29160,7 +29176,7 @@
           <p:cNvPr id="124" name="Rechthoek 8">
             <a:extLst>
               <a:ext uri="{FF2B5EF4-FFF2-40B4-BE49-F238E27FC236}">
-                <a16:creationId xmlns:a16="http://schemas.microsoft.com/office/drawing/2014/main" xmlns="" id="{2EF3A218-A581-4942-95E5-912DA50B7BC2}"/>
+                <a16:creationId xmlns="" xmlns:a16="http://schemas.microsoft.com/office/drawing/2014/main" id="{2EF3A218-A581-4942-95E5-912DA50B7BC2}"/>
               </a:ext>
             </a:extLst>
           </p:cNvPr>
@@ -30759,7 +30775,7 @@
     </p:spTree>
     <p:extLst>
       <p:ext uri="{BB962C8B-B14F-4D97-AF65-F5344CB8AC3E}">
-        <p14:creationId xmlns:p14="http://schemas.microsoft.com/office/powerpoint/2010/main" xmlns="" val="2799970328"/>
+        <p14:creationId xmlns:p14="http://schemas.microsoft.com/office/powerpoint/2010/main" val="2799970328"/>
       </p:ext>
     </p:extLst>
   </p:cSld>
@@ -30798,7 +30814,7 @@
           <p:cNvPr id="51" name="Rechthoek 8">
             <a:extLst>
               <a:ext uri="{FF2B5EF4-FFF2-40B4-BE49-F238E27FC236}">
-                <a16:creationId xmlns:a16="http://schemas.microsoft.com/office/drawing/2014/main" xmlns="" id="{2EF3A218-A581-4942-95E5-912DA50B7BC2}"/>
+                <a16:creationId xmlns="" xmlns:a16="http://schemas.microsoft.com/office/drawing/2014/main" id="{2EF3A218-A581-4942-95E5-912DA50B7BC2}"/>
               </a:ext>
             </a:extLst>
           </p:cNvPr>
@@ -30931,7 +30947,7 @@
           <p:cNvPr id="6" name="Tekstvak 12">
             <a:extLst>
               <a:ext uri="{FF2B5EF4-FFF2-40B4-BE49-F238E27FC236}">
-                <a16:creationId xmlns:a16="http://schemas.microsoft.com/office/drawing/2014/main" xmlns="" id="{35AAEF8A-1E8B-4134-8FA6-762EB3980799}"/>
+                <a16:creationId xmlns="" xmlns:a16="http://schemas.microsoft.com/office/drawing/2014/main" id="{35AAEF8A-1E8B-4134-8FA6-762EB3980799}"/>
               </a:ext>
             </a:extLst>
           </p:cNvPr>
@@ -31479,7 +31495,7 @@
           <p:cNvPr id="124" name="Rechthoek 8">
             <a:extLst>
               <a:ext uri="{FF2B5EF4-FFF2-40B4-BE49-F238E27FC236}">
-                <a16:creationId xmlns:a16="http://schemas.microsoft.com/office/drawing/2014/main" xmlns="" id="{2EF3A218-A581-4942-95E5-912DA50B7BC2}"/>
+                <a16:creationId xmlns="" xmlns:a16="http://schemas.microsoft.com/office/drawing/2014/main" id="{2EF3A218-A581-4942-95E5-912DA50B7BC2}"/>
               </a:ext>
             </a:extLst>
           </p:cNvPr>
@@ -33195,7 +33211,7 @@
     </p:spTree>
     <p:extLst>
       <p:ext uri="{BB962C8B-B14F-4D97-AF65-F5344CB8AC3E}">
-        <p14:creationId xmlns:p14="http://schemas.microsoft.com/office/powerpoint/2010/main" xmlns="" val="3863723509"/>
+        <p14:creationId xmlns:p14="http://schemas.microsoft.com/office/powerpoint/2010/main" val="3863723509"/>
       </p:ext>
     </p:extLst>
   </p:cSld>
@@ -33257,7 +33273,7 @@
           <p:cNvPr id="6" name="Tekstvak 12">
             <a:extLst>
               <a:ext uri="{FF2B5EF4-FFF2-40B4-BE49-F238E27FC236}">
-                <a16:creationId xmlns:a16="http://schemas.microsoft.com/office/drawing/2014/main" xmlns="" id="{35AAEF8A-1E8B-4134-8FA6-762EB3980799}"/>
+                <a16:creationId xmlns="" xmlns:a16="http://schemas.microsoft.com/office/drawing/2014/main" id="{35AAEF8A-1E8B-4134-8FA6-762EB3980799}"/>
               </a:ext>
             </a:extLst>
           </p:cNvPr>
@@ -34074,7 +34090,7 @@
     </p:spTree>
     <p:extLst>
       <p:ext uri="{BB962C8B-B14F-4D97-AF65-F5344CB8AC3E}">
-        <p14:creationId xmlns:p14="http://schemas.microsoft.com/office/powerpoint/2010/main" xmlns="" val="1708830380"/>
+        <p14:creationId xmlns:p14="http://schemas.microsoft.com/office/powerpoint/2010/main" val="1708830380"/>
       </p:ext>
     </p:extLst>
   </p:cSld>
@@ -34113,7 +34129,7 @@
           <p:cNvPr id="2" name="Titel 1">
             <a:extLst>
               <a:ext uri="{FF2B5EF4-FFF2-40B4-BE49-F238E27FC236}">
-                <a16:creationId xmlns:a16="http://schemas.microsoft.com/office/drawing/2014/main" xmlns="" id="{769A96FB-BA26-47C0-85BC-9E5A44D94A65}"/>
+                <a16:creationId xmlns="" xmlns:a16="http://schemas.microsoft.com/office/drawing/2014/main" id="{769A96FB-BA26-47C0-85BC-9E5A44D94A65}"/>
               </a:ext>
             </a:extLst>
           </p:cNvPr>
@@ -34149,7 +34165,7 @@
           <p:cNvPr id="7" name="AutoShape 2" descr="Afbeeldingsresultaat voor cel from human">
             <a:extLst>
               <a:ext uri="{FF2B5EF4-FFF2-40B4-BE49-F238E27FC236}">
-                <a16:creationId xmlns:a16="http://schemas.microsoft.com/office/drawing/2014/main" xmlns="" id="{BAA6AD35-A0AD-46FB-8C83-83697536AD9E}"/>
+                <a16:creationId xmlns="" xmlns:a16="http://schemas.microsoft.com/office/drawing/2014/main" id="{BAA6AD35-A0AD-46FB-8C83-83697536AD9E}"/>
               </a:ext>
             </a:extLst>
           </p:cNvPr>
@@ -34169,7 +34185,7 @@
           <a:noFill/>
           <a:extLst>
             <a:ext uri="{909E8E84-426E-40DD-AFC4-6F175D3DCCD1}">
-              <a14:hiddenFill xmlns:a14="http://schemas.microsoft.com/office/drawing/2010/main" xmlns="">
+              <a14:hiddenFill xmlns:a14="http://schemas.microsoft.com/office/drawing/2010/main">
                 <a:solidFill>
                   <a:srgbClr val="FFFFFF"/>
                 </a:solidFill>
@@ -34194,7 +34210,7 @@
           <p:cNvPr id="14" name="AutoShape 4" descr="Afbeeldingsresultaat voor cel from human">
             <a:extLst>
               <a:ext uri="{FF2B5EF4-FFF2-40B4-BE49-F238E27FC236}">
-                <a16:creationId xmlns:a16="http://schemas.microsoft.com/office/drawing/2014/main" xmlns="" id="{DE7F6D67-FFDD-4318-B4D9-E249E6758D4A}"/>
+                <a16:creationId xmlns="" xmlns:a16="http://schemas.microsoft.com/office/drawing/2014/main" id="{DE7F6D67-FFDD-4318-B4D9-E249E6758D4A}"/>
               </a:ext>
             </a:extLst>
           </p:cNvPr>
@@ -34214,7 +34230,7 @@
           <a:noFill/>
           <a:extLst>
             <a:ext uri="{909E8E84-426E-40DD-AFC4-6F175D3DCCD1}">
-              <a14:hiddenFill xmlns:a14="http://schemas.microsoft.com/office/drawing/2010/main" xmlns="">
+              <a14:hiddenFill xmlns:a14="http://schemas.microsoft.com/office/drawing/2010/main">
                 <a:solidFill>
                   <a:srgbClr val="FFFFFF"/>
                 </a:solidFill>
@@ -34239,7 +34255,7 @@
           <p:cNvPr id="16" name="Afbeelding 15">
             <a:extLst>
               <a:ext uri="{FF2B5EF4-FFF2-40B4-BE49-F238E27FC236}">
-                <a16:creationId xmlns:a16="http://schemas.microsoft.com/office/drawing/2014/main" xmlns="" id="{028B203A-6AFB-43CC-A2E5-888B735C297F}"/>
+                <a16:creationId xmlns="" xmlns:a16="http://schemas.microsoft.com/office/drawing/2014/main" id="{028B203A-6AFB-43CC-A2E5-888B735C297F}"/>
               </a:ext>
             </a:extLst>
           </p:cNvPr>
@@ -34252,7 +34268,7 @@
           <a:blip r:embed="rId2" cstate="print">
             <a:extLst>
               <a:ext uri="{28A0092B-C50C-407E-A947-70E740481C1C}">
-                <a14:useLocalDpi xmlns:a14="http://schemas.microsoft.com/office/drawing/2010/main" xmlns="" val="0"/>
+                <a14:useLocalDpi xmlns:a14="http://schemas.microsoft.com/office/drawing/2010/main" val="0"/>
               </a:ext>
             </a:extLst>
           </a:blip>
@@ -34275,7 +34291,7 @@
           <p:cNvPr id="19" name="Gelijkbenige driehoek 18">
             <a:extLst>
               <a:ext uri="{FF2B5EF4-FFF2-40B4-BE49-F238E27FC236}">
-                <a16:creationId xmlns:a16="http://schemas.microsoft.com/office/drawing/2014/main" xmlns="" id="{3473C7A5-6D55-4B8D-B912-17E38BDAAE6F}"/>
+                <a16:creationId xmlns="" xmlns:a16="http://schemas.microsoft.com/office/drawing/2014/main" id="{3473C7A5-6D55-4B8D-B912-17E38BDAAE6F}"/>
               </a:ext>
             </a:extLst>
           </p:cNvPr>
@@ -34334,7 +34350,7 @@
           <p:cNvPr id="21" name="Afbeelding 20">
             <a:extLst>
               <a:ext uri="{FF2B5EF4-FFF2-40B4-BE49-F238E27FC236}">
-                <a16:creationId xmlns:a16="http://schemas.microsoft.com/office/drawing/2014/main" xmlns="" id="{2E4ED76A-8CDE-4820-BEF2-FFF0CAB0FFC2}"/>
+                <a16:creationId xmlns="" xmlns:a16="http://schemas.microsoft.com/office/drawing/2014/main" id="{2E4ED76A-8CDE-4820-BEF2-FFF0CAB0FFC2}"/>
               </a:ext>
             </a:extLst>
           </p:cNvPr>
@@ -34364,7 +34380,7 @@
           <p:cNvPr id="29" name="Tekstvak 28">
             <a:extLst>
               <a:ext uri="{FF2B5EF4-FFF2-40B4-BE49-F238E27FC236}">
-                <a16:creationId xmlns:a16="http://schemas.microsoft.com/office/drawing/2014/main" xmlns="" id="{3F5F8535-0F1D-4072-B4F7-ECC8E1EF4714}"/>
+                <a16:creationId xmlns="" xmlns:a16="http://schemas.microsoft.com/office/drawing/2014/main" id="{3F5F8535-0F1D-4072-B4F7-ECC8E1EF4714}"/>
               </a:ext>
             </a:extLst>
           </p:cNvPr>
@@ -34399,7 +34415,7 @@
           <p:cNvPr id="30" name="Tekstvak 29">
             <a:extLst>
               <a:ext uri="{FF2B5EF4-FFF2-40B4-BE49-F238E27FC236}">
-                <a16:creationId xmlns:a16="http://schemas.microsoft.com/office/drawing/2014/main" xmlns="" id="{60EFD1DE-A3E9-41CC-9FD4-3B5142326B68}"/>
+                <a16:creationId xmlns="" xmlns:a16="http://schemas.microsoft.com/office/drawing/2014/main" id="{60EFD1DE-A3E9-41CC-9FD4-3B5142326B68}"/>
               </a:ext>
             </a:extLst>
           </p:cNvPr>
@@ -34434,7 +34450,7 @@
           <p:cNvPr id="11" name="Tekstvak 12">
             <a:extLst>
               <a:ext uri="{FF2B5EF4-FFF2-40B4-BE49-F238E27FC236}">
-                <a16:creationId xmlns:a16="http://schemas.microsoft.com/office/drawing/2014/main" xmlns="" id="{35AAEF8A-1E8B-4134-8FA6-762EB3980799}"/>
+                <a16:creationId xmlns="" xmlns:a16="http://schemas.microsoft.com/office/drawing/2014/main" id="{35AAEF8A-1E8B-4134-8FA6-762EB3980799}"/>
               </a:ext>
             </a:extLst>
           </p:cNvPr>
@@ -34518,7 +34534,7 @@
           <p:cNvPr id="28" name="Tekstvak 2">
             <a:extLst>
               <a:ext uri="{FF2B5EF4-FFF2-40B4-BE49-F238E27FC236}">
-                <a16:creationId xmlns:a16="http://schemas.microsoft.com/office/drawing/2014/main" xmlns="" id="{09C9D1F4-F032-4E5D-9A7C-FF1C6395C9AA}"/>
+                <a16:creationId xmlns="" xmlns:a16="http://schemas.microsoft.com/office/drawing/2014/main" id="{09C9D1F4-F032-4E5D-9A7C-FF1C6395C9AA}"/>
               </a:ext>
             </a:extLst>
           </p:cNvPr>
@@ -34659,7 +34675,7 @@
     </p:spTree>
     <p:extLst>
       <p:ext uri="{BB962C8B-B14F-4D97-AF65-F5344CB8AC3E}">
-        <p14:creationId xmlns:p14="http://schemas.microsoft.com/office/powerpoint/2010/main" xmlns="" val="3413036344"/>
+        <p14:creationId xmlns:p14="http://schemas.microsoft.com/office/powerpoint/2010/main" val="3413036344"/>
       </p:ext>
     </p:extLst>
   </p:cSld>
@@ -34721,7 +34737,7 @@
           <p:cNvPr id="6" name="Tekstvak 12">
             <a:extLst>
               <a:ext uri="{FF2B5EF4-FFF2-40B4-BE49-F238E27FC236}">
-                <a16:creationId xmlns:a16="http://schemas.microsoft.com/office/drawing/2014/main" xmlns="" id="{35AAEF8A-1E8B-4134-8FA6-762EB3980799}"/>
+                <a16:creationId xmlns="" xmlns:a16="http://schemas.microsoft.com/office/drawing/2014/main" id="{35AAEF8A-1E8B-4134-8FA6-762EB3980799}"/>
               </a:ext>
             </a:extLst>
           </p:cNvPr>
@@ -36287,7 +36303,7 @@
     </p:spTree>
     <p:extLst>
       <p:ext uri="{BB962C8B-B14F-4D97-AF65-F5344CB8AC3E}">
-        <p14:creationId xmlns:p14="http://schemas.microsoft.com/office/powerpoint/2010/main" xmlns="" val="2988895409"/>
+        <p14:creationId xmlns:p14="http://schemas.microsoft.com/office/powerpoint/2010/main" val="2988895409"/>
       </p:ext>
     </p:extLst>
   </p:cSld>
@@ -36349,7 +36365,7 @@
           <p:cNvPr id="6" name="Tekstvak 12">
             <a:extLst>
               <a:ext uri="{FF2B5EF4-FFF2-40B4-BE49-F238E27FC236}">
-                <a16:creationId xmlns:a16="http://schemas.microsoft.com/office/drawing/2014/main" xmlns="" id="{35AAEF8A-1E8B-4134-8FA6-762EB3980799}"/>
+                <a16:creationId xmlns="" xmlns:a16="http://schemas.microsoft.com/office/drawing/2014/main" id="{35AAEF8A-1E8B-4134-8FA6-762EB3980799}"/>
               </a:ext>
             </a:extLst>
           </p:cNvPr>
@@ -38672,7 +38688,7 @@
     </p:spTree>
     <p:extLst>
       <p:ext uri="{BB962C8B-B14F-4D97-AF65-F5344CB8AC3E}">
-        <p14:creationId xmlns:p14="http://schemas.microsoft.com/office/powerpoint/2010/main" xmlns="" val="657171376"/>
+        <p14:creationId xmlns:p14="http://schemas.microsoft.com/office/powerpoint/2010/main" val="657171376"/>
       </p:ext>
     </p:extLst>
   </p:cSld>
@@ -38738,7 +38754,7 @@
           <p:cNvPr id="5" name="Tekstvak 12">
             <a:extLst>
               <a:ext uri="{FF2B5EF4-FFF2-40B4-BE49-F238E27FC236}">
-                <a16:creationId xmlns:a16="http://schemas.microsoft.com/office/drawing/2014/main" xmlns="" id="{35AAEF8A-1E8B-4134-8FA6-762EB3980799}"/>
+                <a16:creationId xmlns="" xmlns:a16="http://schemas.microsoft.com/office/drawing/2014/main" id="{35AAEF8A-1E8B-4134-8FA6-762EB3980799}"/>
               </a:ext>
             </a:extLst>
           </p:cNvPr>
@@ -38887,7 +38903,7 @@
     </p:spTree>
     <p:extLst>
       <p:ext uri="{BB962C8B-B14F-4D97-AF65-F5344CB8AC3E}">
-        <p14:creationId xmlns:p14="http://schemas.microsoft.com/office/powerpoint/2010/main" xmlns="" val="3732728830"/>
+        <p14:creationId xmlns:p14="http://schemas.microsoft.com/office/powerpoint/2010/main" val="3732728830"/>
       </p:ext>
     </p:extLst>
   </p:cSld>
@@ -39007,7 +39023,7 @@
           <p:cNvPr id="5" name="Tekstvak 12">
             <a:extLst>
               <a:ext uri="{FF2B5EF4-FFF2-40B4-BE49-F238E27FC236}">
-                <a16:creationId xmlns="" xmlns:a16="http://schemas.microsoft.com/office/drawing/2014/main" id="{35AAEF8A-1E8B-4134-8FA6-762EB3980799}"/>
+                <a16:creationId xmlns:a16="http://schemas.microsoft.com/office/drawing/2014/main" xmlns="" id="{35AAEF8A-1E8B-4134-8FA6-762EB3980799}"/>
               </a:ext>
             </a:extLst>
           </p:cNvPr>
@@ -39587,7 +39603,7 @@
     </p:spTree>
     <p:extLst>
       <p:ext uri="{BB962C8B-B14F-4D97-AF65-F5344CB8AC3E}">
-        <p14:creationId xmlns:p14="http://schemas.microsoft.com/office/powerpoint/2010/main" xmlns="" val="2208300206"/>
+        <p14:creationId xmlns:p14="http://schemas.microsoft.com/office/powerpoint/2010/main" val="2208300206"/>
       </p:ext>
     </p:extLst>
   </p:cSld>
@@ -39633,7 +39649,7 @@
           <a:blip r:embed="rId2" cstate="print">
             <a:extLst>
               <a:ext uri="{28A0092B-C50C-407E-A947-70E740481C1C}">
-                <a14:useLocalDpi xmlns:a14="http://schemas.microsoft.com/office/drawing/2010/main" xmlns="" val="0"/>
+                <a14:useLocalDpi xmlns:a14="http://schemas.microsoft.com/office/drawing/2010/main" val="0"/>
               </a:ext>
             </a:extLst>
           </a:blip>
@@ -39662,7 +39678,7 @@
           <a:blip r:embed="rId3" cstate="print">
             <a:extLst>
               <a:ext uri="{28A0092B-C50C-407E-A947-70E740481C1C}">
-                <a14:useLocalDpi xmlns:a14="http://schemas.microsoft.com/office/drawing/2010/main" xmlns="" val="0"/>
+                <a14:useLocalDpi xmlns:a14="http://schemas.microsoft.com/office/drawing/2010/main" val="0"/>
               </a:ext>
             </a:extLst>
           </a:blip>
@@ -39715,7 +39731,7 @@
           <p:cNvPr id="5" name="Tekstvak 12">
             <a:extLst>
               <a:ext uri="{FF2B5EF4-FFF2-40B4-BE49-F238E27FC236}">
-                <a16:creationId xmlns="" xmlns:a16="http://schemas.microsoft.com/office/drawing/2014/main" id="{35AAEF8A-1E8B-4134-8FA6-762EB3980799}"/>
+                <a16:creationId xmlns:a16="http://schemas.microsoft.com/office/drawing/2014/main" xmlns="" id="{35AAEF8A-1E8B-4134-8FA6-762EB3980799}"/>
               </a:ext>
             </a:extLst>
           </p:cNvPr>
@@ -40295,7 +40311,7 @@
     </p:spTree>
     <p:extLst>
       <p:ext uri="{BB962C8B-B14F-4D97-AF65-F5344CB8AC3E}">
-        <p14:creationId xmlns:p14="http://schemas.microsoft.com/office/powerpoint/2010/main" xmlns="" val="2208300206"/>
+        <p14:creationId xmlns:p14="http://schemas.microsoft.com/office/powerpoint/2010/main" val="2208300206"/>
       </p:ext>
     </p:extLst>
   </p:cSld>
@@ -40373,7 +40389,7 @@
           <p:nvPr>
             <p:extLst>
               <p:ext uri="{D42A27DB-BD31-4B8C-83A1-F6EECF244321}">
-                <p14:modId xmlns:p14="http://schemas.microsoft.com/office/powerpoint/2010/main" xmlns="" val="2282285695"/>
+                <p14:modId xmlns:p14="http://schemas.microsoft.com/office/powerpoint/2010/main" val="2282285695"/>
               </p:ext>
             </p:extLst>
           </p:nvPr>
@@ -40392,14 +40408,14 @@
                 <a:gridCol w="1507826">
                   <a:extLst>
                     <a:ext uri="{9D8B030D-6E8A-4147-A177-3AD203B41FA5}">
-                      <a16:colId xmlns:a16="http://schemas.microsoft.com/office/drawing/2014/main" xmlns="" val="20000"/>
+                      <a16:colId xmlns="" xmlns:a16="http://schemas.microsoft.com/office/drawing/2014/main" val="20000"/>
                     </a:ext>
                   </a:extLst>
                 </a:gridCol>
                 <a:gridCol w="1396678">
                   <a:extLst>
                     <a:ext uri="{9D8B030D-6E8A-4147-A177-3AD203B41FA5}">
-                      <a16:colId xmlns:a16="http://schemas.microsoft.com/office/drawing/2014/main" xmlns="" val="20001"/>
+                      <a16:colId xmlns="" xmlns:a16="http://schemas.microsoft.com/office/drawing/2014/main" val="20001"/>
                     </a:ext>
                   </a:extLst>
                 </a:gridCol>
@@ -40407,7 +40423,7 @@
                 <a:gridCol w="2085654">
                   <a:extLst>
                     <a:ext uri="{9D8B030D-6E8A-4147-A177-3AD203B41FA5}">
-                      <a16:colId xmlns:a16="http://schemas.microsoft.com/office/drawing/2014/main" xmlns="" val="20003"/>
+                      <a16:colId xmlns="" xmlns:a16="http://schemas.microsoft.com/office/drawing/2014/main" val="20003"/>
                     </a:ext>
                   </a:extLst>
                 </a:gridCol>
@@ -40415,7 +40431,7 @@
                 <a:gridCol w="2167848">
                   <a:extLst>
                     <a:ext uri="{9D8B030D-6E8A-4147-A177-3AD203B41FA5}">
-                      <a16:colId xmlns:a16="http://schemas.microsoft.com/office/drawing/2014/main" xmlns="" val="20004"/>
+                      <a16:colId xmlns="" xmlns:a16="http://schemas.microsoft.com/office/drawing/2014/main" val="20004"/>
                     </a:ext>
                   </a:extLst>
                 </a:gridCol>
@@ -40529,7 +40545,7 @@
                 </a:tc>
                 <a:extLst>
                   <a:ext uri="{0D108BD9-81ED-4DB2-BD59-A6C34878D82A}">
-                    <a16:rowId xmlns:a16="http://schemas.microsoft.com/office/drawing/2014/main" xmlns="" val="10000"/>
+                    <a16:rowId xmlns="" xmlns:a16="http://schemas.microsoft.com/office/drawing/2014/main" val="10000"/>
                   </a:ext>
                 </a:extLst>
               </a:tr>
@@ -40815,7 +40831,7 @@
                 </a:tc>
                 <a:extLst>
                   <a:ext uri="{0D108BD9-81ED-4DB2-BD59-A6C34878D82A}">
-                    <a16:rowId xmlns:a16="http://schemas.microsoft.com/office/drawing/2014/main" xmlns="" val="10001"/>
+                    <a16:rowId xmlns="" xmlns:a16="http://schemas.microsoft.com/office/drawing/2014/main" val="10001"/>
                   </a:ext>
                 </a:extLst>
               </a:tr>
@@ -41123,7 +41139,7 @@
                 </a:tc>
                 <a:extLst>
                   <a:ext uri="{0D108BD9-81ED-4DB2-BD59-A6C34878D82A}">
-                    <a16:rowId xmlns:a16="http://schemas.microsoft.com/office/drawing/2014/main" xmlns="" val="10002"/>
+                    <a16:rowId xmlns="" xmlns:a16="http://schemas.microsoft.com/office/drawing/2014/main" val="10002"/>
                   </a:ext>
                 </a:extLst>
               </a:tr>
@@ -41394,7 +41410,7 @@
                 </a:tc>
                 <a:extLst>
                   <a:ext uri="{0D108BD9-81ED-4DB2-BD59-A6C34878D82A}">
-                    <a16:rowId xmlns:a16="http://schemas.microsoft.com/office/drawing/2014/main" xmlns="" val="10003"/>
+                    <a16:rowId xmlns="" xmlns:a16="http://schemas.microsoft.com/office/drawing/2014/main" val="10003"/>
                   </a:ext>
                 </a:extLst>
               </a:tr>
@@ -41648,7 +41664,7 @@
                 </a:tc>
                 <a:extLst>
                   <a:ext uri="{0D108BD9-81ED-4DB2-BD59-A6C34878D82A}">
-                    <a16:rowId xmlns:a16="http://schemas.microsoft.com/office/drawing/2014/main" xmlns="" val="10004"/>
+                    <a16:rowId xmlns="" xmlns:a16="http://schemas.microsoft.com/office/drawing/2014/main" val="10004"/>
                   </a:ext>
                 </a:extLst>
               </a:tr>
@@ -41661,7 +41677,7 @@
           <p:cNvPr id="5" name="Tekstvak 12">
             <a:extLst>
               <a:ext uri="{FF2B5EF4-FFF2-40B4-BE49-F238E27FC236}">
-                <a16:creationId xmlns:a16="http://schemas.microsoft.com/office/drawing/2014/main" xmlns="" id="{35AAEF8A-1E8B-4134-8FA6-762EB3980799}"/>
+                <a16:creationId xmlns="" xmlns:a16="http://schemas.microsoft.com/office/drawing/2014/main" id="{35AAEF8A-1E8B-4134-8FA6-762EB3980799}"/>
               </a:ext>
             </a:extLst>
           </p:cNvPr>
@@ -41743,7 +41759,7 @@
     </p:spTree>
     <p:extLst>
       <p:ext uri="{BB962C8B-B14F-4D97-AF65-F5344CB8AC3E}">
-        <p14:creationId xmlns:p14="http://schemas.microsoft.com/office/powerpoint/2010/main" xmlns="" val="724559619"/>
+        <p14:creationId xmlns:p14="http://schemas.microsoft.com/office/powerpoint/2010/main" val="724559619"/>
       </p:ext>
     </p:extLst>
   </p:cSld>
@@ -41817,7 +41833,7 @@
           <p:cNvPr id="5" name="Tekstvak 12">
             <a:extLst>
               <a:ext uri="{FF2B5EF4-FFF2-40B4-BE49-F238E27FC236}">
-                <a16:creationId xmlns:a16="http://schemas.microsoft.com/office/drawing/2014/main" xmlns="" id="{35AAEF8A-1E8B-4134-8FA6-762EB3980799}"/>
+                <a16:creationId xmlns="" xmlns:a16="http://schemas.microsoft.com/office/drawing/2014/main" id="{35AAEF8A-1E8B-4134-8FA6-762EB3980799}"/>
               </a:ext>
             </a:extLst>
           </p:cNvPr>
@@ -41905,7 +41921,7 @@
           <p:nvPr>
             <p:extLst>
               <p:ext uri="{D42A27DB-BD31-4B8C-83A1-F6EECF244321}">
-                <p14:modId xmlns:p14="http://schemas.microsoft.com/office/powerpoint/2010/main" xmlns="" val="480707905"/>
+                <p14:modId xmlns:p14="http://schemas.microsoft.com/office/powerpoint/2010/main" val="480707905"/>
               </p:ext>
             </p:extLst>
           </p:nvPr>
@@ -41924,14 +41940,14 @@
                 <a:gridCol w="1507826">
                   <a:extLst>
                     <a:ext uri="{9D8B030D-6E8A-4147-A177-3AD203B41FA5}">
-                      <a16:colId xmlns:a16="http://schemas.microsoft.com/office/drawing/2014/main" xmlns="" val="20000"/>
+                      <a16:colId xmlns="" xmlns:a16="http://schemas.microsoft.com/office/drawing/2014/main" val="20000"/>
                     </a:ext>
                   </a:extLst>
                 </a:gridCol>
                 <a:gridCol w="1396678">
                   <a:extLst>
                     <a:ext uri="{9D8B030D-6E8A-4147-A177-3AD203B41FA5}">
-                      <a16:colId xmlns:a16="http://schemas.microsoft.com/office/drawing/2014/main" xmlns="" val="20001"/>
+                      <a16:colId xmlns="" xmlns:a16="http://schemas.microsoft.com/office/drawing/2014/main" val="20001"/>
                     </a:ext>
                   </a:extLst>
                 </a:gridCol>
@@ -41939,7 +41955,7 @@
                 <a:gridCol w="2085654">
                   <a:extLst>
                     <a:ext uri="{9D8B030D-6E8A-4147-A177-3AD203B41FA5}">
-                      <a16:colId xmlns:a16="http://schemas.microsoft.com/office/drawing/2014/main" xmlns="" val="20003"/>
+                      <a16:colId xmlns="" xmlns:a16="http://schemas.microsoft.com/office/drawing/2014/main" val="20003"/>
                     </a:ext>
                   </a:extLst>
                 </a:gridCol>
@@ -41947,7 +41963,7 @@
                 <a:gridCol w="2167848">
                   <a:extLst>
                     <a:ext uri="{9D8B030D-6E8A-4147-A177-3AD203B41FA5}">
-                      <a16:colId xmlns:a16="http://schemas.microsoft.com/office/drawing/2014/main" xmlns="" val="20004"/>
+                      <a16:colId xmlns="" xmlns:a16="http://schemas.microsoft.com/office/drawing/2014/main" val="20004"/>
                     </a:ext>
                   </a:extLst>
                 </a:gridCol>
@@ -42061,7 +42077,7 @@
                 </a:tc>
                 <a:extLst>
                   <a:ext uri="{0D108BD9-81ED-4DB2-BD59-A6C34878D82A}">
-                    <a16:rowId xmlns:a16="http://schemas.microsoft.com/office/drawing/2014/main" xmlns="" val="10000"/>
+                    <a16:rowId xmlns="" xmlns:a16="http://schemas.microsoft.com/office/drawing/2014/main" val="10000"/>
                   </a:ext>
                 </a:extLst>
               </a:tr>
@@ -42357,7 +42373,7 @@
                 </a:tc>
                 <a:extLst>
                   <a:ext uri="{0D108BD9-81ED-4DB2-BD59-A6C34878D82A}">
-                    <a16:rowId xmlns:a16="http://schemas.microsoft.com/office/drawing/2014/main" xmlns="" val="10001"/>
+                    <a16:rowId xmlns="" xmlns:a16="http://schemas.microsoft.com/office/drawing/2014/main" val="10001"/>
                   </a:ext>
                 </a:extLst>
               </a:tr>
@@ -42635,7 +42651,7 @@
                 </a:tc>
                 <a:extLst>
                   <a:ext uri="{0D108BD9-81ED-4DB2-BD59-A6C34878D82A}">
-                    <a16:rowId xmlns:a16="http://schemas.microsoft.com/office/drawing/2014/main" xmlns="" val="10002"/>
+                    <a16:rowId xmlns="" xmlns:a16="http://schemas.microsoft.com/office/drawing/2014/main" val="10002"/>
                   </a:ext>
                 </a:extLst>
               </a:tr>
@@ -42914,7 +42930,7 @@
                 </a:tc>
                 <a:extLst>
                   <a:ext uri="{0D108BD9-81ED-4DB2-BD59-A6C34878D82A}">
-                    <a16:rowId xmlns:a16="http://schemas.microsoft.com/office/drawing/2014/main" xmlns="" val="10003"/>
+                    <a16:rowId xmlns="" xmlns:a16="http://schemas.microsoft.com/office/drawing/2014/main" val="10003"/>
                   </a:ext>
                 </a:extLst>
               </a:tr>
@@ -43172,7 +43188,7 @@
                 </a:tc>
                 <a:extLst>
                   <a:ext uri="{0D108BD9-81ED-4DB2-BD59-A6C34878D82A}">
-                    <a16:rowId xmlns:a16="http://schemas.microsoft.com/office/drawing/2014/main" xmlns="" val="10004"/>
+                    <a16:rowId xmlns="" xmlns:a16="http://schemas.microsoft.com/office/drawing/2014/main" val="10004"/>
                   </a:ext>
                 </a:extLst>
               </a:tr>
@@ -43183,7 +43199,7 @@
     </p:spTree>
     <p:extLst>
       <p:ext uri="{BB962C8B-B14F-4D97-AF65-F5344CB8AC3E}">
-        <p14:creationId xmlns:p14="http://schemas.microsoft.com/office/powerpoint/2010/main" xmlns="" val="693618469"/>
+        <p14:creationId xmlns:p14="http://schemas.microsoft.com/office/powerpoint/2010/main" val="693618469"/>
       </p:ext>
     </p:extLst>
   </p:cSld>
@@ -43302,7 +43318,7 @@
           <p:cNvPr id="4" name="Tekstvak 12">
             <a:extLst>
               <a:ext uri="{FF2B5EF4-FFF2-40B4-BE49-F238E27FC236}">
-                <a16:creationId xmlns:a16="http://schemas.microsoft.com/office/drawing/2014/main" xmlns="" id="{35AAEF8A-1E8B-4134-8FA6-762EB3980799}"/>
+                <a16:creationId xmlns="" xmlns:a16="http://schemas.microsoft.com/office/drawing/2014/main" id="{35AAEF8A-1E8B-4134-8FA6-762EB3980799}"/>
               </a:ext>
             </a:extLst>
           </p:cNvPr>
@@ -43395,7 +43411,7 @@
     </p:spTree>
     <p:extLst>
       <p:ext uri="{BB962C8B-B14F-4D97-AF65-F5344CB8AC3E}">
-        <p14:creationId xmlns:p14="http://schemas.microsoft.com/office/powerpoint/2010/main" xmlns="" val="4094249125"/>
+        <p14:creationId xmlns:p14="http://schemas.microsoft.com/office/powerpoint/2010/main" val="4094249125"/>
       </p:ext>
     </p:extLst>
   </p:cSld>
@@ -43464,7 +43480,7 @@
         <p:spPr/>
         <p:txBody>
           <a:bodyPr>
-            <a:normAutofit lnSpcReduction="10000"/>
+            <a:normAutofit/>
           </a:bodyPr>
           <a:lstStyle/>
           <a:p>
@@ -43497,7 +43513,78 @@
               <a:rPr lang="en-US" dirty="0" err="1" smtClean="0"/>
               <a:t>doen</a:t>
             </a:r>
+            <a:r>
+              <a:rPr lang="en-US" dirty="0" smtClean="0"/>
+              <a:t>:</a:t>
+            </a:r>
+          </a:p>
+          <a:p>
+            <a:pPr lvl="1"/>
+            <a:r>
+              <a:rPr lang="en-US" dirty="0" err="1" smtClean="0"/>
+              <a:t>Hillclimber</a:t>
+            </a:r>
+            <a:r>
+              <a:rPr lang="en-US" dirty="0" smtClean="0"/>
+              <a:t> </a:t>
+            </a:r>
+            <a:r>
+              <a:rPr lang="en-US" dirty="0" err="1" smtClean="0"/>
+              <a:t>recursief</a:t>
+            </a:r>
+            <a:r>
+              <a:rPr lang="en-US" dirty="0" smtClean="0"/>
+              <a:t> </a:t>
+            </a:r>
+            <a:r>
+              <a:rPr lang="en-US" dirty="0" err="1" smtClean="0"/>
+              <a:t>maken</a:t>
+            </a:r>
             <a:endParaRPr lang="en-US" dirty="0" smtClean="0"/>
+          </a:p>
+          <a:p>
+            <a:pPr lvl="1"/>
+            <a:r>
+              <a:rPr lang="en-US" dirty="0" err="1" smtClean="0"/>
+              <a:t>Hillclimber</a:t>
+            </a:r>
+            <a:r>
+              <a:rPr lang="en-US" dirty="0" smtClean="0"/>
+              <a:t> </a:t>
+            </a:r>
+            <a:r>
+              <a:rPr lang="en-US" dirty="0" err="1" smtClean="0"/>
+              <a:t>anders</a:t>
+            </a:r>
+            <a:r>
+              <a:rPr lang="en-US" dirty="0" smtClean="0"/>
+              <a:t> </a:t>
+            </a:r>
+            <a:r>
+              <a:rPr lang="en-US" dirty="0" err="1" smtClean="0"/>
+              <a:t>vouwen</a:t>
+            </a:r>
+            <a:r>
+              <a:rPr lang="en-US" dirty="0" smtClean="0"/>
+              <a:t>, </a:t>
+            </a:r>
+            <a:r>
+              <a:rPr lang="en-US" dirty="0" err="1" smtClean="0"/>
+              <a:t>fouten</a:t>
+            </a:r>
+            <a:r>
+              <a:rPr lang="en-US" dirty="0" smtClean="0"/>
+              <a:t> </a:t>
+            </a:r>
+            <a:r>
+              <a:rPr lang="en-US" dirty="0" err="1" smtClean="0"/>
+              <a:t>voorkomen</a:t>
+            </a:r>
+            <a:endParaRPr lang="en-US" dirty="0" smtClean="0"/>
+          </a:p>
+          <a:p>
+            <a:pPr lvl="1"/>
+            <a:endParaRPr lang="en-US" dirty="0"/>
           </a:p>
           <a:p>
             <a:pPr marL="0" indent="0">
@@ -43505,7 +43592,7 @@
             </a:pPr>
             <a:r>
               <a:rPr lang="en-US" dirty="0" err="1" smtClean="0"/>
-              <a:t>Niet</a:t>
+              <a:t>Helaas</a:t>
             </a:r>
             <a:r>
               <a:rPr lang="en-US" dirty="0" smtClean="0"/>
@@ -43513,7 +43600,7 @@
             </a:r>
             <a:r>
               <a:rPr lang="en-US" dirty="0" err="1" smtClean="0"/>
-              <a:t>kunnen</a:t>
+              <a:t>niet</a:t>
             </a:r>
             <a:r>
               <a:rPr lang="en-US" dirty="0" smtClean="0"/>
@@ -43521,50 +43608,34 @@
             </a:r>
             <a:r>
               <a:rPr lang="en-US" dirty="0" err="1" smtClean="0"/>
-              <a:t>doen</a:t>
+              <a:t>afgekregen</a:t>
             </a:r>
             <a:r>
               <a:rPr lang="en-US" dirty="0" smtClean="0"/>
-              <a:t> door </a:t>
-            </a:r>
+              <a:t>:</a:t>
+            </a:r>
+          </a:p>
+          <a:p>
+            <a:pPr lvl="1"/>
             <a:r>
               <a:rPr lang="en-US" dirty="0" err="1" smtClean="0"/>
-              <a:t>tijd</a:t>
+              <a:t>Hillclimber</a:t>
             </a:r>
             <a:r>
               <a:rPr lang="en-US" dirty="0" smtClean="0"/>
               <a:t> </a:t>
             </a:r>
-          </a:p>
-          <a:p>
-            <a:pPr marL="0" indent="0">
-              <a:buNone/>
-            </a:pPr>
-            <a:endParaRPr lang="en-US" dirty="0" smtClean="0"/>
-          </a:p>
-          <a:p>
-            <a:pPr marL="0" indent="0">
-              <a:buNone/>
-            </a:pPr>
-            <a:endParaRPr lang="en-US" dirty="0" smtClean="0"/>
-          </a:p>
-          <a:p>
-            <a:pPr marL="0" indent="0">
-              <a:buNone/>
-            </a:pPr>
-            <a:endParaRPr lang="en-US" dirty="0" smtClean="0"/>
-          </a:p>
-          <a:p>
-            <a:pPr marL="0" indent="0">
-              <a:buNone/>
-            </a:pPr>
-            <a:r>
-              <a:rPr lang="en-US" dirty="0" smtClean="0"/>
-              <a:t>Recap </a:t>
-            </a:r>
             <a:r>
               <a:rPr lang="en-US" dirty="0" err="1" smtClean="0"/>
-              <a:t>beste</a:t>
+              <a:t>onderzoeken</a:t>
+            </a:r>
+            <a:r>
+              <a:rPr lang="en-US" dirty="0"/>
+              <a:t> </a:t>
+            </a:r>
+            <a:r>
+              <a:rPr lang="en-US" dirty="0" err="1" smtClean="0"/>
+              <a:t>naar</a:t>
             </a:r>
             <a:r>
               <a:rPr lang="en-US" dirty="0" smtClean="0"/>
@@ -43572,20 +43643,15 @@
             </a:r>
             <a:r>
               <a:rPr lang="en-US" dirty="0" err="1" smtClean="0"/>
-              <a:t>algoritmen</a:t>
+              <a:t>oorzaak</a:t>
             </a:r>
             <a:r>
               <a:rPr lang="en-US" dirty="0" smtClean="0"/>
               <a:t> </a:t>
             </a:r>
-          </a:p>
-          <a:p>
-            <a:pPr marL="0" indent="0">
-              <a:buNone/>
-            </a:pPr>
             <a:r>
               <a:rPr lang="en-US" dirty="0" err="1" smtClean="0"/>
-              <a:t>Welk</a:t>
+              <a:t>foute</a:t>
             </a:r>
             <a:r>
               <a:rPr lang="en-US" dirty="0" smtClean="0"/>
@@ -43593,92 +43659,9 @@
             </a:r>
             <a:r>
               <a:rPr lang="en-US" dirty="0" err="1" smtClean="0"/>
-              <a:t>algoritme</a:t>
-            </a:r>
-            <a:r>
-              <a:rPr lang="en-US" dirty="0" smtClean="0"/>
-              <a:t> </a:t>
-            </a:r>
-            <a:r>
-              <a:rPr lang="en-US" dirty="0" err="1" smtClean="0"/>
-              <a:t>zou</a:t>
-            </a:r>
-            <a:r>
-              <a:rPr lang="en-US" dirty="0" smtClean="0"/>
-              <a:t> je </a:t>
-            </a:r>
-            <a:r>
-              <a:rPr lang="en-US" dirty="0" err="1" smtClean="0"/>
-              <a:t>kiezen</a:t>
-            </a:r>
-            <a:r>
-              <a:rPr lang="en-US" dirty="0" smtClean="0"/>
-              <a:t> </a:t>
-            </a:r>
-            <a:r>
-              <a:rPr lang="en-US" dirty="0" err="1" smtClean="0"/>
-              <a:t>voor</a:t>
-            </a:r>
-            <a:r>
-              <a:rPr lang="en-US" dirty="0" smtClean="0"/>
-              <a:t> </a:t>
-            </a:r>
-            <a:r>
-              <a:rPr lang="en-US" dirty="0" err="1" smtClean="0"/>
-              <a:t>een</a:t>
-            </a:r>
-            <a:r>
-              <a:rPr lang="en-US" dirty="0" smtClean="0"/>
-              <a:t> </a:t>
-            </a:r>
-            <a:r>
-              <a:rPr lang="en-US" dirty="0" err="1" smtClean="0"/>
-              <a:t>keten</a:t>
+              <a:t>vouwingen</a:t>
             </a:r>
             <a:endParaRPr lang="en-US" dirty="0" smtClean="0"/>
-          </a:p>
-          <a:p>
-            <a:pPr marL="0" indent="0">
-              <a:buNone/>
-            </a:pPr>
-            <a:r>
-              <a:rPr lang="en-US" dirty="0" err="1" smtClean="0"/>
-              <a:t>Korte</a:t>
-            </a:r>
-            <a:r>
-              <a:rPr lang="en-US" dirty="0" smtClean="0"/>
-              <a:t> </a:t>
-            </a:r>
-            <a:r>
-              <a:rPr lang="en-US" dirty="0" err="1" smtClean="0"/>
-              <a:t>keten</a:t>
-            </a:r>
-            <a:r>
-              <a:rPr lang="en-US" dirty="0" smtClean="0"/>
-              <a:t> : breadth first</a:t>
-            </a:r>
-          </a:p>
-          <a:p>
-            <a:pPr marL="0" indent="0">
-              <a:buNone/>
-            </a:pPr>
-            <a:r>
-              <a:rPr lang="en-US" dirty="0" smtClean="0"/>
-              <a:t>Lange : </a:t>
-            </a:r>
-            <a:r>
-              <a:rPr lang="en-US" dirty="0" err="1" smtClean="0"/>
-              <a:t>depthfirst</a:t>
-            </a:r>
-            <a:r>
-              <a:rPr lang="en-US" dirty="0" smtClean="0"/>
-              <a:t> + </a:t>
-            </a:r>
-            <a:r>
-              <a:rPr lang="en-US" dirty="0" err="1" smtClean="0"/>
-              <a:t>hillclimber</a:t>
-            </a:r>
-            <a:endParaRPr lang="en-US" dirty="0"/>
           </a:p>
         </p:txBody>
       </p:sp>
@@ -43687,7 +43670,7 @@
           <p:cNvPr id="4" name="Tekstvak 12">
             <a:extLst>
               <a:ext uri="{FF2B5EF4-FFF2-40B4-BE49-F238E27FC236}">
-                <a16:creationId xmlns:a16="http://schemas.microsoft.com/office/drawing/2014/main" xmlns="" id="{35AAEF8A-1E8B-4134-8FA6-762EB3980799}"/>
+                <a16:creationId xmlns="" xmlns:a16="http://schemas.microsoft.com/office/drawing/2014/main" id="{35AAEF8A-1E8B-4134-8FA6-762EB3980799}"/>
               </a:ext>
             </a:extLst>
           </p:cNvPr>
@@ -43780,7 +43763,7 @@
     </p:spTree>
     <p:extLst>
       <p:ext uri="{BB962C8B-B14F-4D97-AF65-F5344CB8AC3E}">
-        <p14:creationId xmlns:p14="http://schemas.microsoft.com/office/powerpoint/2010/main" xmlns="" val="3973364317"/>
+        <p14:creationId xmlns:p14="http://schemas.microsoft.com/office/powerpoint/2010/main" val="3973364317"/>
       </p:ext>
     </p:extLst>
   </p:cSld>
@@ -43819,7 +43802,7 @@
           <p:cNvPr id="2" name="Titel 1">
             <a:extLst>
               <a:ext uri="{FF2B5EF4-FFF2-40B4-BE49-F238E27FC236}">
-                <a16:creationId xmlns:a16="http://schemas.microsoft.com/office/drawing/2014/main" xmlns="" id="{769A96FB-BA26-47C0-85BC-9E5A44D94A65}"/>
+                <a16:creationId xmlns="" xmlns:a16="http://schemas.microsoft.com/office/drawing/2014/main" id="{769A96FB-BA26-47C0-85BC-9E5A44D94A65}"/>
               </a:ext>
             </a:extLst>
           </p:cNvPr>
@@ -43855,7 +43838,7 @@
           <p:cNvPr id="7" name="AutoShape 2" descr="Afbeeldingsresultaat voor cel from human">
             <a:extLst>
               <a:ext uri="{FF2B5EF4-FFF2-40B4-BE49-F238E27FC236}">
-                <a16:creationId xmlns:a16="http://schemas.microsoft.com/office/drawing/2014/main" xmlns="" id="{BAA6AD35-A0AD-46FB-8C83-83697536AD9E}"/>
+                <a16:creationId xmlns="" xmlns:a16="http://schemas.microsoft.com/office/drawing/2014/main" id="{BAA6AD35-A0AD-46FB-8C83-83697536AD9E}"/>
               </a:ext>
             </a:extLst>
           </p:cNvPr>
@@ -43875,7 +43858,7 @@
           <a:noFill/>
           <a:extLst>
             <a:ext uri="{909E8E84-426E-40DD-AFC4-6F175D3DCCD1}">
-              <a14:hiddenFill xmlns:a14="http://schemas.microsoft.com/office/drawing/2010/main" xmlns="">
+              <a14:hiddenFill xmlns:a14="http://schemas.microsoft.com/office/drawing/2010/main">
                 <a:solidFill>
                   <a:srgbClr val="FFFFFF"/>
                 </a:solidFill>
@@ -43900,7 +43883,7 @@
           <p:cNvPr id="14" name="AutoShape 4" descr="Afbeeldingsresultaat voor cel from human">
             <a:extLst>
               <a:ext uri="{FF2B5EF4-FFF2-40B4-BE49-F238E27FC236}">
-                <a16:creationId xmlns:a16="http://schemas.microsoft.com/office/drawing/2014/main" xmlns="" id="{DE7F6D67-FFDD-4318-B4D9-E249E6758D4A}"/>
+                <a16:creationId xmlns="" xmlns:a16="http://schemas.microsoft.com/office/drawing/2014/main" id="{DE7F6D67-FFDD-4318-B4D9-E249E6758D4A}"/>
               </a:ext>
             </a:extLst>
           </p:cNvPr>
@@ -43920,7 +43903,7 @@
           <a:noFill/>
           <a:extLst>
             <a:ext uri="{909E8E84-426E-40DD-AFC4-6F175D3DCCD1}">
-              <a14:hiddenFill xmlns:a14="http://schemas.microsoft.com/office/drawing/2010/main" xmlns="">
+              <a14:hiddenFill xmlns:a14="http://schemas.microsoft.com/office/drawing/2010/main">
                 <a:solidFill>
                   <a:srgbClr val="FFFFFF"/>
                 </a:solidFill>
@@ -43945,7 +43928,7 @@
           <p:cNvPr id="16" name="Afbeelding 15">
             <a:extLst>
               <a:ext uri="{FF2B5EF4-FFF2-40B4-BE49-F238E27FC236}">
-                <a16:creationId xmlns:a16="http://schemas.microsoft.com/office/drawing/2014/main" xmlns="" id="{028B203A-6AFB-43CC-A2E5-888B735C297F}"/>
+                <a16:creationId xmlns="" xmlns:a16="http://schemas.microsoft.com/office/drawing/2014/main" id="{028B203A-6AFB-43CC-A2E5-888B735C297F}"/>
               </a:ext>
             </a:extLst>
           </p:cNvPr>
@@ -43958,7 +43941,7 @@
           <a:blip r:embed="rId2" cstate="print">
             <a:extLst>
               <a:ext uri="{28A0092B-C50C-407E-A947-70E740481C1C}">
-                <a14:useLocalDpi xmlns:a14="http://schemas.microsoft.com/office/drawing/2010/main" xmlns="" val="0"/>
+                <a14:useLocalDpi xmlns:a14="http://schemas.microsoft.com/office/drawing/2010/main" val="0"/>
               </a:ext>
             </a:extLst>
           </a:blip>
@@ -43981,7 +43964,7 @@
           <p:cNvPr id="19" name="Gelijkbenige driehoek 18">
             <a:extLst>
               <a:ext uri="{FF2B5EF4-FFF2-40B4-BE49-F238E27FC236}">
-                <a16:creationId xmlns:a16="http://schemas.microsoft.com/office/drawing/2014/main" xmlns="" id="{3473C7A5-6D55-4B8D-B912-17E38BDAAE6F}"/>
+                <a16:creationId xmlns="" xmlns:a16="http://schemas.microsoft.com/office/drawing/2014/main" id="{3473C7A5-6D55-4B8D-B912-17E38BDAAE6F}"/>
               </a:ext>
             </a:extLst>
           </p:cNvPr>
@@ -44040,7 +44023,7 @@
           <p:cNvPr id="21" name="Afbeelding 20">
             <a:extLst>
               <a:ext uri="{FF2B5EF4-FFF2-40B4-BE49-F238E27FC236}">
-                <a16:creationId xmlns:a16="http://schemas.microsoft.com/office/drawing/2014/main" xmlns="" id="{2E4ED76A-8CDE-4820-BEF2-FFF0CAB0FFC2}"/>
+                <a16:creationId xmlns="" xmlns:a16="http://schemas.microsoft.com/office/drawing/2014/main" id="{2E4ED76A-8CDE-4820-BEF2-FFF0CAB0FFC2}"/>
               </a:ext>
             </a:extLst>
           </p:cNvPr>
@@ -44070,7 +44053,7 @@
           <p:cNvPr id="29" name="Tekstvak 28">
             <a:extLst>
               <a:ext uri="{FF2B5EF4-FFF2-40B4-BE49-F238E27FC236}">
-                <a16:creationId xmlns:a16="http://schemas.microsoft.com/office/drawing/2014/main" xmlns="" id="{3F5F8535-0F1D-4072-B4F7-ECC8E1EF4714}"/>
+                <a16:creationId xmlns="" xmlns:a16="http://schemas.microsoft.com/office/drawing/2014/main" id="{3F5F8535-0F1D-4072-B4F7-ECC8E1EF4714}"/>
               </a:ext>
             </a:extLst>
           </p:cNvPr>
@@ -44105,7 +44088,7 @@
           <p:cNvPr id="30" name="Tekstvak 29">
             <a:extLst>
               <a:ext uri="{FF2B5EF4-FFF2-40B4-BE49-F238E27FC236}">
-                <a16:creationId xmlns:a16="http://schemas.microsoft.com/office/drawing/2014/main" xmlns="" id="{60EFD1DE-A3E9-41CC-9FD4-3B5142326B68}"/>
+                <a16:creationId xmlns="" xmlns:a16="http://schemas.microsoft.com/office/drawing/2014/main" id="{60EFD1DE-A3E9-41CC-9FD4-3B5142326B68}"/>
               </a:ext>
             </a:extLst>
           </p:cNvPr>
@@ -44140,7 +44123,7 @@
           <p:cNvPr id="11" name="Tekstvak 12">
             <a:extLst>
               <a:ext uri="{FF2B5EF4-FFF2-40B4-BE49-F238E27FC236}">
-                <a16:creationId xmlns:a16="http://schemas.microsoft.com/office/drawing/2014/main" xmlns="" id="{35AAEF8A-1E8B-4134-8FA6-762EB3980799}"/>
+                <a16:creationId xmlns="" xmlns:a16="http://schemas.microsoft.com/office/drawing/2014/main" id="{35AAEF8A-1E8B-4134-8FA6-762EB3980799}"/>
               </a:ext>
             </a:extLst>
           </p:cNvPr>
@@ -44224,7 +44207,7 @@
           <p:cNvPr id="28" name="Tekstvak 2">
             <a:extLst>
               <a:ext uri="{FF2B5EF4-FFF2-40B4-BE49-F238E27FC236}">
-                <a16:creationId xmlns:a16="http://schemas.microsoft.com/office/drawing/2014/main" xmlns="" id="{09C9D1F4-F032-4E5D-9A7C-FF1C6395C9AA}"/>
+                <a16:creationId xmlns="" xmlns:a16="http://schemas.microsoft.com/office/drawing/2014/main" id="{09C9D1F4-F032-4E5D-9A7C-FF1C6395C9AA}"/>
               </a:ext>
             </a:extLst>
           </p:cNvPr>
@@ -44367,7 +44350,7 @@
           <p:cNvPr id="15" name="Rechthoek: afgeronde hoeken 3">
             <a:extLst>
               <a:ext uri="{FF2B5EF4-FFF2-40B4-BE49-F238E27FC236}">
-                <a16:creationId xmlns:a16="http://schemas.microsoft.com/office/drawing/2014/main" xmlns="" id="{7030C92F-7460-4CD0-AC3E-DFDBBFE02B78}"/>
+                <a16:creationId xmlns="" xmlns:a16="http://schemas.microsoft.com/office/drawing/2014/main" id="{7030C92F-7460-4CD0-AC3E-DFDBBFE02B78}"/>
               </a:ext>
             </a:extLst>
           </p:cNvPr>
@@ -44421,7 +44404,7 @@
           <p:cNvPr id="17" name="Tekstvak 5">
             <a:extLst>
               <a:ext uri="{FF2B5EF4-FFF2-40B4-BE49-F238E27FC236}">
-                <a16:creationId xmlns:a16="http://schemas.microsoft.com/office/drawing/2014/main" xmlns="" id="{06236ACC-5C22-4120-A532-40542026AAA4}"/>
+                <a16:creationId xmlns="" xmlns:a16="http://schemas.microsoft.com/office/drawing/2014/main" id="{06236ACC-5C22-4120-A532-40542026AAA4}"/>
               </a:ext>
             </a:extLst>
           </p:cNvPr>
@@ -44468,7 +44451,7 @@
     </p:spTree>
     <p:extLst>
       <p:ext uri="{BB962C8B-B14F-4D97-AF65-F5344CB8AC3E}">
-        <p14:creationId xmlns:p14="http://schemas.microsoft.com/office/powerpoint/2010/main" xmlns="" val="3235940139"/>
+        <p14:creationId xmlns:p14="http://schemas.microsoft.com/office/powerpoint/2010/main" val="3235940139"/>
       </p:ext>
     </p:extLst>
   </p:cSld>
@@ -44507,7 +44490,7 @@
           <p:cNvPr id="2" name="Titel 1">
             <a:extLst>
               <a:ext uri="{FF2B5EF4-FFF2-40B4-BE49-F238E27FC236}">
-                <a16:creationId xmlns:a16="http://schemas.microsoft.com/office/drawing/2014/main" xmlns="" id="{769A96FB-BA26-47C0-85BC-9E5A44D94A65}"/>
+                <a16:creationId xmlns="" xmlns:a16="http://schemas.microsoft.com/office/drawing/2014/main" id="{769A96FB-BA26-47C0-85BC-9E5A44D94A65}"/>
               </a:ext>
             </a:extLst>
           </p:cNvPr>
@@ -44543,7 +44526,7 @@
           <p:cNvPr id="5" name="Tijdelijke aanduiding voor inhoud 4">
             <a:extLst>
               <a:ext uri="{FF2B5EF4-FFF2-40B4-BE49-F238E27FC236}">
-                <a16:creationId xmlns:a16="http://schemas.microsoft.com/office/drawing/2014/main" xmlns="" id="{82F9B9FE-1870-4902-A7DB-4B27D59D2B2B}"/>
+                <a16:creationId xmlns="" xmlns:a16="http://schemas.microsoft.com/office/drawing/2014/main" id="{82F9B9FE-1870-4902-A7DB-4B27D59D2B2B}"/>
               </a:ext>
             </a:extLst>
           </p:cNvPr>
@@ -44558,7 +44541,7 @@
           <a:blip r:embed="rId2" cstate="print">
             <a:extLst>
               <a:ext uri="{28A0092B-C50C-407E-A947-70E740481C1C}">
-                <a14:useLocalDpi xmlns:a14="http://schemas.microsoft.com/office/drawing/2010/main" xmlns="" val="0"/>
+                <a14:useLocalDpi xmlns:a14="http://schemas.microsoft.com/office/drawing/2010/main" val="0"/>
               </a:ext>
             </a:extLst>
           </a:blip>
@@ -44578,7 +44561,7 @@
           <p:cNvPr id="14" name="Afbeelding 13">
             <a:extLst>
               <a:ext uri="{FF2B5EF4-FFF2-40B4-BE49-F238E27FC236}">
-                <a16:creationId xmlns:a16="http://schemas.microsoft.com/office/drawing/2014/main" xmlns="" id="{F67612D4-1C0C-40D2-972D-04F12DDE0F60}"/>
+                <a16:creationId xmlns="" xmlns:a16="http://schemas.microsoft.com/office/drawing/2014/main" id="{F67612D4-1C0C-40D2-972D-04F12DDE0F60}"/>
               </a:ext>
             </a:extLst>
           </p:cNvPr>
@@ -44608,7 +44591,7 @@
           <p:cNvPr id="3" name="Tekstvak 2">
             <a:extLst>
               <a:ext uri="{FF2B5EF4-FFF2-40B4-BE49-F238E27FC236}">
-                <a16:creationId xmlns:a16="http://schemas.microsoft.com/office/drawing/2014/main" xmlns="" id="{C26579A7-5154-43F0-8824-0FAFC9CD4201}"/>
+                <a16:creationId xmlns="" xmlns:a16="http://schemas.microsoft.com/office/drawing/2014/main" id="{C26579A7-5154-43F0-8824-0FAFC9CD4201}"/>
               </a:ext>
             </a:extLst>
           </p:cNvPr>
@@ -44643,7 +44626,7 @@
           <p:cNvPr id="4" name="Tekstvak 3">
             <a:extLst>
               <a:ext uri="{FF2B5EF4-FFF2-40B4-BE49-F238E27FC236}">
-                <a16:creationId xmlns:a16="http://schemas.microsoft.com/office/drawing/2014/main" xmlns="" id="{1F03EA5B-9405-4FF2-A715-0E995B30C408}"/>
+                <a16:creationId xmlns="" xmlns:a16="http://schemas.microsoft.com/office/drawing/2014/main" id="{1F03EA5B-9405-4FF2-A715-0E995B30C408}"/>
               </a:ext>
             </a:extLst>
           </p:cNvPr>
@@ -44678,7 +44661,7 @@
           <p:cNvPr id="17" name="Rechte verbindingslijn met pijl 16">
             <a:extLst>
               <a:ext uri="{FF2B5EF4-FFF2-40B4-BE49-F238E27FC236}">
-                <a16:creationId xmlns:a16="http://schemas.microsoft.com/office/drawing/2014/main" xmlns="" id="{4354D81E-79D5-49F9-8B3E-FFC4DC3E61F5}"/>
+                <a16:creationId xmlns="" xmlns:a16="http://schemas.microsoft.com/office/drawing/2014/main" id="{4354D81E-79D5-49F9-8B3E-FFC4DC3E61F5}"/>
               </a:ext>
             </a:extLst>
           </p:cNvPr>
@@ -44719,7 +44702,7 @@
           <p:cNvPr id="7170" name="Picture 2" descr="Afbeeldingsresultaat voor hammer drawing">
             <a:extLst>
               <a:ext uri="{FF2B5EF4-FFF2-40B4-BE49-F238E27FC236}">
-                <a16:creationId xmlns:a16="http://schemas.microsoft.com/office/drawing/2014/main" xmlns="" id="{ACB393D5-86CC-4AAD-A571-9E26D25E2E0B}"/>
+                <a16:creationId xmlns="" xmlns:a16="http://schemas.microsoft.com/office/drawing/2014/main" id="{ACB393D5-86CC-4AAD-A571-9E26D25E2E0B}"/>
               </a:ext>
             </a:extLst>
           </p:cNvPr>
@@ -44732,7 +44715,7 @@
           <a:blip r:embed="rId4" cstate="print">
             <a:extLst>
               <a:ext uri="{28A0092B-C50C-407E-A947-70E740481C1C}">
-                <a14:useLocalDpi xmlns:a14="http://schemas.microsoft.com/office/drawing/2010/main" xmlns="" val="0"/>
+                <a14:useLocalDpi xmlns:a14="http://schemas.microsoft.com/office/drawing/2010/main" val="0"/>
               </a:ext>
             </a:extLst>
           </a:blip>
@@ -44752,7 +44735,7 @@
           <a:noFill/>
           <a:extLst>
             <a:ext uri="{909E8E84-426E-40DD-AFC4-6F175D3DCCD1}">
-              <a14:hiddenFill xmlns:a14="http://schemas.microsoft.com/office/drawing/2010/main" xmlns="">
+              <a14:hiddenFill xmlns:a14="http://schemas.microsoft.com/office/drawing/2010/main">
                 <a:solidFill>
                   <a:srgbClr val="FFFFFF"/>
                 </a:solidFill>
@@ -44766,7 +44749,7 @@
           <p:cNvPr id="6" name="Gedachtewolkje: wolk 5">
             <a:extLst>
               <a:ext uri="{FF2B5EF4-FFF2-40B4-BE49-F238E27FC236}">
-                <a16:creationId xmlns:a16="http://schemas.microsoft.com/office/drawing/2014/main" xmlns="" id="{39AC6EFF-786A-42AC-971E-B03EAAA5119B}"/>
+                <a16:creationId xmlns="" xmlns:a16="http://schemas.microsoft.com/office/drawing/2014/main" id="{39AC6EFF-786A-42AC-971E-B03EAAA5119B}"/>
               </a:ext>
             </a:extLst>
           </p:cNvPr>
@@ -44828,7 +44811,7 @@
           <p:cNvPr id="7172" name="Picture 4" descr="Afbeeldingsresultaat voor bouwpakket tekening">
             <a:extLst>
               <a:ext uri="{FF2B5EF4-FFF2-40B4-BE49-F238E27FC236}">
-                <a16:creationId xmlns:a16="http://schemas.microsoft.com/office/drawing/2014/main" xmlns="" id="{4A471D98-FB95-4C4D-AE0F-FD069389E87D}"/>
+                <a16:creationId xmlns="" xmlns:a16="http://schemas.microsoft.com/office/drawing/2014/main" id="{4A471D98-FB95-4C4D-AE0F-FD069389E87D}"/>
               </a:ext>
             </a:extLst>
           </p:cNvPr>
@@ -44841,7 +44824,7 @@
           <a:blip r:embed="rId5" cstate="print">
             <a:extLst>
               <a:ext uri="{28A0092B-C50C-407E-A947-70E740481C1C}">
-                <a14:useLocalDpi xmlns:a14="http://schemas.microsoft.com/office/drawing/2010/main" xmlns="" val="0"/>
+                <a14:useLocalDpi xmlns:a14="http://schemas.microsoft.com/office/drawing/2010/main" val="0"/>
               </a:ext>
             </a:extLst>
           </a:blip>
@@ -44861,7 +44844,7 @@
           <a:noFill/>
           <a:extLst>
             <a:ext uri="{909E8E84-426E-40DD-AFC4-6F175D3DCCD1}">
-              <a14:hiddenFill xmlns:a14="http://schemas.microsoft.com/office/drawing/2010/main" xmlns="">
+              <a14:hiddenFill xmlns:a14="http://schemas.microsoft.com/office/drawing/2010/main">
                 <a:solidFill>
                   <a:srgbClr val="FFFFFF"/>
                 </a:solidFill>
@@ -44875,7 +44858,7 @@
           <p:cNvPr id="12" name="Tekstvak 12">
             <a:extLst>
               <a:ext uri="{FF2B5EF4-FFF2-40B4-BE49-F238E27FC236}">
-                <a16:creationId xmlns:a16="http://schemas.microsoft.com/office/drawing/2014/main" xmlns="" id="{35AAEF8A-1E8B-4134-8FA6-762EB3980799}"/>
+                <a16:creationId xmlns="" xmlns:a16="http://schemas.microsoft.com/office/drawing/2014/main" id="{35AAEF8A-1E8B-4134-8FA6-762EB3980799}"/>
               </a:ext>
             </a:extLst>
           </p:cNvPr>
@@ -44957,7 +44940,7 @@
     </p:spTree>
     <p:extLst>
       <p:ext uri="{BB962C8B-B14F-4D97-AF65-F5344CB8AC3E}">
-        <p14:creationId xmlns:p14="http://schemas.microsoft.com/office/powerpoint/2010/main" xmlns="" val="1588497352"/>
+        <p14:creationId xmlns:p14="http://schemas.microsoft.com/office/powerpoint/2010/main" val="1588497352"/>
       </p:ext>
     </p:extLst>
   </p:cSld>
@@ -44996,7 +44979,7 @@
           <p:cNvPr id="2" name="Titel 1">
             <a:extLst>
               <a:ext uri="{FF2B5EF4-FFF2-40B4-BE49-F238E27FC236}">
-                <a16:creationId xmlns:a16="http://schemas.microsoft.com/office/drawing/2014/main" xmlns="" id="{769A96FB-BA26-47C0-85BC-9E5A44D94A65}"/>
+                <a16:creationId xmlns="" xmlns:a16="http://schemas.microsoft.com/office/drawing/2014/main" id="{769A96FB-BA26-47C0-85BC-9E5A44D94A65}"/>
               </a:ext>
             </a:extLst>
           </p:cNvPr>
@@ -45032,7 +45015,7 @@
           <p:cNvPr id="5" name="Tijdelijke aanduiding voor inhoud 4">
             <a:extLst>
               <a:ext uri="{FF2B5EF4-FFF2-40B4-BE49-F238E27FC236}">
-                <a16:creationId xmlns:a16="http://schemas.microsoft.com/office/drawing/2014/main" xmlns="" id="{82F9B9FE-1870-4902-A7DB-4B27D59D2B2B}"/>
+                <a16:creationId xmlns="" xmlns:a16="http://schemas.microsoft.com/office/drawing/2014/main" id="{82F9B9FE-1870-4902-A7DB-4B27D59D2B2B}"/>
               </a:ext>
             </a:extLst>
           </p:cNvPr>
@@ -45047,7 +45030,7 @@
           <a:blip r:embed="rId2" cstate="print">
             <a:extLst>
               <a:ext uri="{28A0092B-C50C-407E-A947-70E740481C1C}">
-                <a14:useLocalDpi xmlns:a14="http://schemas.microsoft.com/office/drawing/2010/main" xmlns="" val="0"/>
+                <a14:useLocalDpi xmlns:a14="http://schemas.microsoft.com/office/drawing/2010/main" val="0"/>
               </a:ext>
             </a:extLst>
           </a:blip>
@@ -45067,7 +45050,7 @@
           <p:cNvPr id="14" name="Afbeelding 13">
             <a:extLst>
               <a:ext uri="{FF2B5EF4-FFF2-40B4-BE49-F238E27FC236}">
-                <a16:creationId xmlns:a16="http://schemas.microsoft.com/office/drawing/2014/main" xmlns="" id="{F67612D4-1C0C-40D2-972D-04F12DDE0F60}"/>
+                <a16:creationId xmlns="" xmlns:a16="http://schemas.microsoft.com/office/drawing/2014/main" id="{F67612D4-1C0C-40D2-972D-04F12DDE0F60}"/>
               </a:ext>
             </a:extLst>
           </p:cNvPr>
@@ -45097,7 +45080,7 @@
           <p:cNvPr id="3" name="Tekstvak 2">
             <a:extLst>
               <a:ext uri="{FF2B5EF4-FFF2-40B4-BE49-F238E27FC236}">
-                <a16:creationId xmlns:a16="http://schemas.microsoft.com/office/drawing/2014/main" xmlns="" id="{C26579A7-5154-43F0-8824-0FAFC9CD4201}"/>
+                <a16:creationId xmlns="" xmlns:a16="http://schemas.microsoft.com/office/drawing/2014/main" id="{C26579A7-5154-43F0-8824-0FAFC9CD4201}"/>
               </a:ext>
             </a:extLst>
           </p:cNvPr>
@@ -45132,7 +45115,7 @@
           <p:cNvPr id="4" name="Tekstvak 3">
             <a:extLst>
               <a:ext uri="{FF2B5EF4-FFF2-40B4-BE49-F238E27FC236}">
-                <a16:creationId xmlns:a16="http://schemas.microsoft.com/office/drawing/2014/main" xmlns="" id="{1F03EA5B-9405-4FF2-A715-0E995B30C408}"/>
+                <a16:creationId xmlns="" xmlns:a16="http://schemas.microsoft.com/office/drawing/2014/main" id="{1F03EA5B-9405-4FF2-A715-0E995B30C408}"/>
               </a:ext>
             </a:extLst>
           </p:cNvPr>
@@ -45167,7 +45150,7 @@
           <p:cNvPr id="17" name="Rechte verbindingslijn met pijl 16">
             <a:extLst>
               <a:ext uri="{FF2B5EF4-FFF2-40B4-BE49-F238E27FC236}">
-                <a16:creationId xmlns:a16="http://schemas.microsoft.com/office/drawing/2014/main" xmlns="" id="{4354D81E-79D5-49F9-8B3E-FFC4DC3E61F5}"/>
+                <a16:creationId xmlns="" xmlns:a16="http://schemas.microsoft.com/office/drawing/2014/main" id="{4354D81E-79D5-49F9-8B3E-FFC4DC3E61F5}"/>
               </a:ext>
             </a:extLst>
           </p:cNvPr>
@@ -45208,7 +45191,7 @@
           <p:cNvPr id="46" name="Tekstvak 12">
             <a:extLst>
               <a:ext uri="{FF2B5EF4-FFF2-40B4-BE49-F238E27FC236}">
-                <a16:creationId xmlns:a16="http://schemas.microsoft.com/office/drawing/2014/main" xmlns="" id="{35AAEF8A-1E8B-4134-8FA6-762EB3980799}"/>
+                <a16:creationId xmlns="" xmlns:a16="http://schemas.microsoft.com/office/drawing/2014/main" id="{35AAEF8A-1E8B-4134-8FA6-762EB3980799}"/>
               </a:ext>
             </a:extLst>
           </p:cNvPr>
@@ -45299,7 +45282,7 @@
           <a:blip r:embed="rId4" cstate="print">
             <a:extLst>
               <a:ext uri="{28A0092B-C50C-407E-A947-70E740481C1C}">
-                <a14:useLocalDpi xmlns:a14="http://schemas.microsoft.com/office/drawing/2010/main" xmlns="" val="0"/>
+                <a14:useLocalDpi xmlns:a14="http://schemas.microsoft.com/office/drawing/2010/main" val="0"/>
               </a:ext>
             </a:extLst>
           </a:blip>
@@ -45321,14 +45304,14 @@
           <a:effectLst/>
           <a:extLst>
             <a:ext uri="{909E8E84-426E-40DD-AFC4-6F175D3DCCD1}">
-              <a14:hiddenFill xmlns:a14="http://schemas.microsoft.com/office/drawing/2010/main" xmlns="">
+              <a14:hiddenFill xmlns:a14="http://schemas.microsoft.com/office/drawing/2010/main">
                 <a:solidFill>
                   <a:schemeClr val="accent1"/>
                 </a:solidFill>
               </a14:hiddenFill>
             </a:ext>
             <a:ext uri="{91240B29-F687-4F45-9708-019B960494DF}">
-              <a14:hiddenLine xmlns:a14="http://schemas.microsoft.com/office/drawing/2010/main" xmlns="" w="9525">
+              <a14:hiddenLine xmlns:a14="http://schemas.microsoft.com/office/drawing/2010/main" w="9525">
                 <a:solidFill>
                   <a:schemeClr val="tx1"/>
                 </a:solidFill>
@@ -45338,7 +45321,7 @@
               </a14:hiddenLine>
             </a:ext>
             <a:ext uri="{AF507438-7753-43E0-B8FC-AC1667EBCBE1}">
-              <a14:hiddenEffects xmlns:a14="http://schemas.microsoft.com/office/drawing/2010/main" xmlns="">
+              <a14:hiddenEffects xmlns:a14="http://schemas.microsoft.com/office/drawing/2010/main">
                 <a:effectLst>
                   <a:outerShdw dist="35921" dir="2700000" algn="ctr" rotWithShape="0">
                     <a:schemeClr val="bg2"/>
@@ -45441,7 +45424,7 @@
           <a:blip r:embed="rId5" cstate="print">
             <a:extLst>
               <a:ext uri="{28A0092B-C50C-407E-A947-70E740481C1C}">
-                <a14:useLocalDpi xmlns:a14="http://schemas.microsoft.com/office/drawing/2010/main" xmlns="" val="0"/>
+                <a14:useLocalDpi xmlns:a14="http://schemas.microsoft.com/office/drawing/2010/main" val="0"/>
               </a:ext>
             </a:extLst>
           </a:blip>
@@ -45463,14 +45446,14 @@
           <a:effectLst/>
           <a:extLst>
             <a:ext uri="{909E8E84-426E-40DD-AFC4-6F175D3DCCD1}">
-              <a14:hiddenFill xmlns:a14="http://schemas.microsoft.com/office/drawing/2010/main" xmlns="">
+              <a14:hiddenFill xmlns:a14="http://schemas.microsoft.com/office/drawing/2010/main">
                 <a:solidFill>
                   <a:schemeClr val="accent1"/>
                 </a:solidFill>
               </a14:hiddenFill>
             </a:ext>
             <a:ext uri="{91240B29-F687-4F45-9708-019B960494DF}">
-              <a14:hiddenLine xmlns:a14="http://schemas.microsoft.com/office/drawing/2010/main" xmlns="" w="9525">
+              <a14:hiddenLine xmlns:a14="http://schemas.microsoft.com/office/drawing/2010/main" w="9525">
                 <a:solidFill>
                   <a:schemeClr val="tx1"/>
                 </a:solidFill>
@@ -45480,7 +45463,7 @@
               </a14:hiddenLine>
             </a:ext>
             <a:ext uri="{AF507438-7753-43E0-B8FC-AC1667EBCBE1}">
-              <a14:hiddenEffects xmlns:a14="http://schemas.microsoft.com/office/drawing/2010/main" xmlns="">
+              <a14:hiddenEffects xmlns:a14="http://schemas.microsoft.com/office/drawing/2010/main">
                 <a:effectLst>
                   <a:outerShdw dist="35921" dir="2700000" algn="ctr" rotWithShape="0">
                     <a:schemeClr val="bg2"/>
@@ -45557,7 +45540,7 @@
           <p:cNvPr id="63" name="Tekstvak 2">
             <a:extLst>
               <a:ext uri="{FF2B5EF4-FFF2-40B4-BE49-F238E27FC236}">
-                <a16:creationId xmlns:a16="http://schemas.microsoft.com/office/drawing/2014/main" xmlns="" id="{C26579A7-5154-43F0-8824-0FAFC9CD4201}"/>
+                <a16:creationId xmlns="" xmlns:a16="http://schemas.microsoft.com/office/drawing/2014/main" id="{C26579A7-5154-43F0-8824-0FAFC9CD4201}"/>
               </a:ext>
             </a:extLst>
           </p:cNvPr>
@@ -45594,7 +45577,7 @@
           <p:cNvPr id="64" name="Tekstvak 2">
             <a:extLst>
               <a:ext uri="{FF2B5EF4-FFF2-40B4-BE49-F238E27FC236}">
-                <a16:creationId xmlns:a16="http://schemas.microsoft.com/office/drawing/2014/main" xmlns="" id="{C26579A7-5154-43F0-8824-0FAFC9CD4201}"/>
+                <a16:creationId xmlns="" xmlns:a16="http://schemas.microsoft.com/office/drawing/2014/main" id="{C26579A7-5154-43F0-8824-0FAFC9CD4201}"/>
               </a:ext>
             </a:extLst>
           </p:cNvPr>
@@ -45629,7 +45612,7 @@
     </p:spTree>
     <p:extLst>
       <p:ext uri="{BB962C8B-B14F-4D97-AF65-F5344CB8AC3E}">
-        <p14:creationId xmlns:p14="http://schemas.microsoft.com/office/powerpoint/2010/main" xmlns="" val="1374118703"/>
+        <p14:creationId xmlns:p14="http://schemas.microsoft.com/office/powerpoint/2010/main" val="1374118703"/>
       </p:ext>
     </p:extLst>
   </p:cSld>
@@ -45668,7 +45651,7 @@
           <p:cNvPr id="2" name="Titel 1">
             <a:extLst>
               <a:ext uri="{FF2B5EF4-FFF2-40B4-BE49-F238E27FC236}">
-                <a16:creationId xmlns:a16="http://schemas.microsoft.com/office/drawing/2014/main" xmlns="" id="{769A96FB-BA26-47C0-85BC-9E5A44D94A65}"/>
+                <a16:creationId xmlns="" xmlns:a16="http://schemas.microsoft.com/office/drawing/2014/main" id="{769A96FB-BA26-47C0-85BC-9E5A44D94A65}"/>
               </a:ext>
             </a:extLst>
           </p:cNvPr>
@@ -45704,7 +45687,7 @@
           <p:cNvPr id="5" name="Tijdelijke aanduiding voor inhoud 4">
             <a:extLst>
               <a:ext uri="{FF2B5EF4-FFF2-40B4-BE49-F238E27FC236}">
-                <a16:creationId xmlns:a16="http://schemas.microsoft.com/office/drawing/2014/main" xmlns="" id="{82F9B9FE-1870-4902-A7DB-4B27D59D2B2B}"/>
+                <a16:creationId xmlns="" xmlns:a16="http://schemas.microsoft.com/office/drawing/2014/main" id="{82F9B9FE-1870-4902-A7DB-4B27D59D2B2B}"/>
               </a:ext>
             </a:extLst>
           </p:cNvPr>
@@ -45719,7 +45702,7 @@
           <a:blip r:embed="rId2" cstate="print">
             <a:extLst>
               <a:ext uri="{28A0092B-C50C-407E-A947-70E740481C1C}">
-                <a14:useLocalDpi xmlns:a14="http://schemas.microsoft.com/office/drawing/2010/main" xmlns="" val="0"/>
+                <a14:useLocalDpi xmlns:a14="http://schemas.microsoft.com/office/drawing/2010/main" val="0"/>
               </a:ext>
             </a:extLst>
           </a:blip>
@@ -45739,7 +45722,7 @@
           <p:cNvPr id="14" name="Afbeelding 13">
             <a:extLst>
               <a:ext uri="{FF2B5EF4-FFF2-40B4-BE49-F238E27FC236}">
-                <a16:creationId xmlns:a16="http://schemas.microsoft.com/office/drawing/2014/main" xmlns="" id="{F67612D4-1C0C-40D2-972D-04F12DDE0F60}"/>
+                <a16:creationId xmlns="" xmlns:a16="http://schemas.microsoft.com/office/drawing/2014/main" id="{F67612D4-1C0C-40D2-972D-04F12DDE0F60}"/>
               </a:ext>
             </a:extLst>
           </p:cNvPr>
@@ -45769,7 +45752,7 @@
           <p:cNvPr id="3" name="Tekstvak 2">
             <a:extLst>
               <a:ext uri="{FF2B5EF4-FFF2-40B4-BE49-F238E27FC236}">
-                <a16:creationId xmlns:a16="http://schemas.microsoft.com/office/drawing/2014/main" xmlns="" id="{C26579A7-5154-43F0-8824-0FAFC9CD4201}"/>
+                <a16:creationId xmlns="" xmlns:a16="http://schemas.microsoft.com/office/drawing/2014/main" id="{C26579A7-5154-43F0-8824-0FAFC9CD4201}"/>
               </a:ext>
             </a:extLst>
           </p:cNvPr>
@@ -45804,7 +45787,7 @@
           <p:cNvPr id="4" name="Tekstvak 3">
             <a:extLst>
               <a:ext uri="{FF2B5EF4-FFF2-40B4-BE49-F238E27FC236}">
-                <a16:creationId xmlns:a16="http://schemas.microsoft.com/office/drawing/2014/main" xmlns="" id="{1F03EA5B-9405-4FF2-A715-0E995B30C408}"/>
+                <a16:creationId xmlns="" xmlns:a16="http://schemas.microsoft.com/office/drawing/2014/main" id="{1F03EA5B-9405-4FF2-A715-0E995B30C408}"/>
               </a:ext>
             </a:extLst>
           </p:cNvPr>
@@ -45839,7 +45822,7 @@
           <p:cNvPr id="17" name="Rechte verbindingslijn met pijl 16">
             <a:extLst>
               <a:ext uri="{FF2B5EF4-FFF2-40B4-BE49-F238E27FC236}">
-                <a16:creationId xmlns:a16="http://schemas.microsoft.com/office/drawing/2014/main" xmlns="" id="{4354D81E-79D5-49F9-8B3E-FFC4DC3E61F5}"/>
+                <a16:creationId xmlns="" xmlns:a16="http://schemas.microsoft.com/office/drawing/2014/main" id="{4354D81E-79D5-49F9-8B3E-FFC4DC3E61F5}"/>
               </a:ext>
             </a:extLst>
           </p:cNvPr>
@@ -45880,7 +45863,7 @@
           <p:cNvPr id="46" name="Tekstvak 12">
             <a:extLst>
               <a:ext uri="{FF2B5EF4-FFF2-40B4-BE49-F238E27FC236}">
-                <a16:creationId xmlns:a16="http://schemas.microsoft.com/office/drawing/2014/main" xmlns="" id="{35AAEF8A-1E8B-4134-8FA6-762EB3980799}"/>
+                <a16:creationId xmlns="" xmlns:a16="http://schemas.microsoft.com/office/drawing/2014/main" id="{35AAEF8A-1E8B-4134-8FA6-762EB3980799}"/>
               </a:ext>
             </a:extLst>
           </p:cNvPr>
@@ -45971,7 +45954,7 @@
           <a:blip r:embed="rId4" cstate="print">
             <a:extLst>
               <a:ext uri="{28A0092B-C50C-407E-A947-70E740481C1C}">
-                <a14:useLocalDpi xmlns:a14="http://schemas.microsoft.com/office/drawing/2010/main" xmlns="" val="0"/>
+                <a14:useLocalDpi xmlns:a14="http://schemas.microsoft.com/office/drawing/2010/main" val="0"/>
               </a:ext>
             </a:extLst>
           </a:blip>
@@ -45993,14 +45976,14 @@
           <a:effectLst/>
           <a:extLst>
             <a:ext uri="{909E8E84-426E-40DD-AFC4-6F175D3DCCD1}">
-              <a14:hiddenFill xmlns:a14="http://schemas.microsoft.com/office/drawing/2010/main" xmlns="">
+              <a14:hiddenFill xmlns:a14="http://schemas.microsoft.com/office/drawing/2010/main">
                 <a:solidFill>
                   <a:schemeClr val="accent1"/>
                 </a:solidFill>
               </a14:hiddenFill>
             </a:ext>
             <a:ext uri="{91240B29-F687-4F45-9708-019B960494DF}">
-              <a14:hiddenLine xmlns:a14="http://schemas.microsoft.com/office/drawing/2010/main" xmlns="" w="9525">
+              <a14:hiddenLine xmlns:a14="http://schemas.microsoft.com/office/drawing/2010/main" w="9525">
                 <a:solidFill>
                   <a:schemeClr val="tx1"/>
                 </a:solidFill>
@@ -46010,7 +45993,7 @@
               </a14:hiddenLine>
             </a:ext>
             <a:ext uri="{AF507438-7753-43E0-B8FC-AC1667EBCBE1}">
-              <a14:hiddenEffects xmlns:a14="http://schemas.microsoft.com/office/drawing/2010/main" xmlns="">
+              <a14:hiddenEffects xmlns:a14="http://schemas.microsoft.com/office/drawing/2010/main">
                 <a:effectLst>
                   <a:outerShdw dist="35921" dir="2700000" algn="ctr" rotWithShape="0">
                     <a:schemeClr val="bg2"/>
@@ -46113,7 +46096,7 @@
           <a:blip r:embed="rId5" cstate="print">
             <a:extLst>
               <a:ext uri="{28A0092B-C50C-407E-A947-70E740481C1C}">
-                <a14:useLocalDpi xmlns:a14="http://schemas.microsoft.com/office/drawing/2010/main" xmlns="" val="0"/>
+                <a14:useLocalDpi xmlns:a14="http://schemas.microsoft.com/office/drawing/2010/main" val="0"/>
               </a:ext>
             </a:extLst>
           </a:blip>
@@ -46135,14 +46118,14 @@
           <a:effectLst/>
           <a:extLst>
             <a:ext uri="{909E8E84-426E-40DD-AFC4-6F175D3DCCD1}">
-              <a14:hiddenFill xmlns:a14="http://schemas.microsoft.com/office/drawing/2010/main" xmlns="">
+              <a14:hiddenFill xmlns:a14="http://schemas.microsoft.com/office/drawing/2010/main">
                 <a:solidFill>
                   <a:schemeClr val="accent1"/>
                 </a:solidFill>
               </a14:hiddenFill>
             </a:ext>
             <a:ext uri="{91240B29-F687-4F45-9708-019B960494DF}">
-              <a14:hiddenLine xmlns:a14="http://schemas.microsoft.com/office/drawing/2010/main" xmlns="" w="9525">
+              <a14:hiddenLine xmlns:a14="http://schemas.microsoft.com/office/drawing/2010/main" w="9525">
                 <a:solidFill>
                   <a:schemeClr val="tx1"/>
                 </a:solidFill>
@@ -46152,7 +46135,7 @@
               </a14:hiddenLine>
             </a:ext>
             <a:ext uri="{AF507438-7753-43E0-B8FC-AC1667EBCBE1}">
-              <a14:hiddenEffects xmlns:a14="http://schemas.microsoft.com/office/drawing/2010/main" xmlns="">
+              <a14:hiddenEffects xmlns:a14="http://schemas.microsoft.com/office/drawing/2010/main">
                 <a:effectLst>
                   <a:outerShdw dist="35921" dir="2700000" algn="ctr" rotWithShape="0">
                     <a:schemeClr val="bg2"/>
@@ -46229,7 +46212,7 @@
           <p:cNvPr id="63" name="Tekstvak 2">
             <a:extLst>
               <a:ext uri="{FF2B5EF4-FFF2-40B4-BE49-F238E27FC236}">
-                <a16:creationId xmlns:a16="http://schemas.microsoft.com/office/drawing/2014/main" xmlns="" id="{C26579A7-5154-43F0-8824-0FAFC9CD4201}"/>
+                <a16:creationId xmlns="" xmlns:a16="http://schemas.microsoft.com/office/drawing/2014/main" id="{C26579A7-5154-43F0-8824-0FAFC9CD4201}"/>
               </a:ext>
             </a:extLst>
           </p:cNvPr>
@@ -46266,7 +46249,7 @@
           <p:cNvPr id="64" name="Tekstvak 2">
             <a:extLst>
               <a:ext uri="{FF2B5EF4-FFF2-40B4-BE49-F238E27FC236}">
-                <a16:creationId xmlns:a16="http://schemas.microsoft.com/office/drawing/2014/main" xmlns="" id="{C26579A7-5154-43F0-8824-0FAFC9CD4201}"/>
+                <a16:creationId xmlns="" xmlns:a16="http://schemas.microsoft.com/office/drawing/2014/main" id="{C26579A7-5154-43F0-8824-0FAFC9CD4201}"/>
               </a:ext>
             </a:extLst>
           </p:cNvPr>
@@ -46303,7 +46286,7 @@
           <p:cNvPr id="18" name="Ovaal 41">
             <a:extLst>
               <a:ext uri="{FF2B5EF4-FFF2-40B4-BE49-F238E27FC236}">
-                <a16:creationId xmlns:a16="http://schemas.microsoft.com/office/drawing/2014/main" xmlns="" id="{72D56CA8-60C5-45EC-8F1B-B1093445083D}"/>
+                <a16:creationId xmlns="" xmlns:a16="http://schemas.microsoft.com/office/drawing/2014/main" id="{72D56CA8-60C5-45EC-8F1B-B1093445083D}"/>
               </a:ext>
             </a:extLst>
           </p:cNvPr>
@@ -46357,7 +46340,7 @@
           <p:cNvPr id="19" name="Ovaal 43">
             <a:extLst>
               <a:ext uri="{FF2B5EF4-FFF2-40B4-BE49-F238E27FC236}">
-                <a16:creationId xmlns:a16="http://schemas.microsoft.com/office/drawing/2014/main" xmlns="" id="{7CF4FCBC-648B-4EB1-93CE-BA029036C0CC}"/>
+                <a16:creationId xmlns="" xmlns:a16="http://schemas.microsoft.com/office/drawing/2014/main" id="{7CF4FCBC-648B-4EB1-93CE-BA029036C0CC}"/>
               </a:ext>
             </a:extLst>
           </p:cNvPr>
@@ -46411,7 +46394,7 @@
           <p:cNvPr id="20" name="Tekstvak 50">
             <a:extLst>
               <a:ext uri="{FF2B5EF4-FFF2-40B4-BE49-F238E27FC236}">
-                <a16:creationId xmlns:a16="http://schemas.microsoft.com/office/drawing/2014/main" xmlns="" id="{36AF06F7-C7AC-406C-827D-CBD749238E27}"/>
+                <a16:creationId xmlns="" xmlns:a16="http://schemas.microsoft.com/office/drawing/2014/main" id="{36AF06F7-C7AC-406C-827D-CBD749238E27}"/>
               </a:ext>
             </a:extLst>
           </p:cNvPr>
@@ -46446,7 +46429,7 @@
           <p:cNvPr id="21" name="Tekstvak 58">
             <a:extLst>
               <a:ext uri="{FF2B5EF4-FFF2-40B4-BE49-F238E27FC236}">
-                <a16:creationId xmlns:a16="http://schemas.microsoft.com/office/drawing/2014/main" xmlns="" id="{F0657E35-0C81-4AF8-BA44-4F33F5AF6613}"/>
+                <a16:creationId xmlns="" xmlns:a16="http://schemas.microsoft.com/office/drawing/2014/main" id="{F0657E35-0C81-4AF8-BA44-4F33F5AF6613}"/>
               </a:ext>
             </a:extLst>
           </p:cNvPr>
@@ -46481,7 +46464,7 @@
           <p:cNvPr id="22" name="Ovaal 61">
             <a:extLst>
               <a:ext uri="{FF2B5EF4-FFF2-40B4-BE49-F238E27FC236}">
-                <a16:creationId xmlns:a16="http://schemas.microsoft.com/office/drawing/2014/main" xmlns="" id="{8A290C8E-7589-400C-9595-1E7D05623DE2}"/>
+                <a16:creationId xmlns="" xmlns:a16="http://schemas.microsoft.com/office/drawing/2014/main" id="{8A290C8E-7589-400C-9595-1E7D05623DE2}"/>
               </a:ext>
             </a:extLst>
           </p:cNvPr>
@@ -46535,7 +46518,7 @@
           <p:cNvPr id="23" name="Tekstvak 62">
             <a:extLst>
               <a:ext uri="{FF2B5EF4-FFF2-40B4-BE49-F238E27FC236}">
-                <a16:creationId xmlns:a16="http://schemas.microsoft.com/office/drawing/2014/main" xmlns="" id="{06857F55-522B-4B48-90E8-81D28DF8093C}"/>
+                <a16:creationId xmlns="" xmlns:a16="http://schemas.microsoft.com/office/drawing/2014/main" id="{06857F55-522B-4B48-90E8-81D28DF8093C}"/>
               </a:ext>
             </a:extLst>
           </p:cNvPr>
@@ -46668,7 +46651,7 @@
     </p:spTree>
     <p:extLst>
       <p:ext uri="{BB962C8B-B14F-4D97-AF65-F5344CB8AC3E}">
-        <p14:creationId xmlns:p14="http://schemas.microsoft.com/office/powerpoint/2010/main" xmlns="" val="187580692"/>
+        <p14:creationId xmlns:p14="http://schemas.microsoft.com/office/powerpoint/2010/main" val="187580692"/>
       </p:ext>
     </p:extLst>
   </p:cSld>
@@ -46707,7 +46690,7 @@
           <p:cNvPr id="77" name="Rechte verbindingslijn 76">
             <a:extLst>
               <a:ext uri="{FF2B5EF4-FFF2-40B4-BE49-F238E27FC236}">
-                <a16:creationId xmlns:a16="http://schemas.microsoft.com/office/drawing/2014/main" xmlns="" id="{9812B259-9D26-437C-888D-12FD41E09E12}"/>
+                <a16:creationId xmlns="" xmlns:a16="http://schemas.microsoft.com/office/drawing/2014/main" id="{9812B259-9D26-437C-888D-12FD41E09E12}"/>
               </a:ext>
             </a:extLst>
           </p:cNvPr>
@@ -46754,7 +46737,7 @@
           <p:cNvPr id="9" name="Rechthoek 8">
             <a:extLst>
               <a:ext uri="{FF2B5EF4-FFF2-40B4-BE49-F238E27FC236}">
-                <a16:creationId xmlns:a16="http://schemas.microsoft.com/office/drawing/2014/main" xmlns="" id="{2EF3A218-A581-4942-95E5-912DA50B7BC2}"/>
+                <a16:creationId xmlns="" xmlns:a16="http://schemas.microsoft.com/office/drawing/2014/main" id="{2EF3A218-A581-4942-95E5-912DA50B7BC2}"/>
               </a:ext>
             </a:extLst>
           </p:cNvPr>
@@ -46809,7 +46792,7 @@
           <p:cNvPr id="3077" name="Rechte verbindingslijn 3076">
             <a:extLst>
               <a:ext uri="{FF2B5EF4-FFF2-40B4-BE49-F238E27FC236}">
-                <a16:creationId xmlns:a16="http://schemas.microsoft.com/office/drawing/2014/main" xmlns="" id="{B4AE7606-D7E8-456C-BC2D-43AAEEADF2E0}"/>
+                <a16:creationId xmlns="" xmlns:a16="http://schemas.microsoft.com/office/drawing/2014/main" id="{B4AE7606-D7E8-456C-BC2D-43AAEEADF2E0}"/>
               </a:ext>
             </a:extLst>
           </p:cNvPr>
@@ -46857,7 +46840,7 @@
           <p:cNvPr id="2" name="Titel 1">
             <a:extLst>
               <a:ext uri="{FF2B5EF4-FFF2-40B4-BE49-F238E27FC236}">
-                <a16:creationId xmlns:a16="http://schemas.microsoft.com/office/drawing/2014/main" xmlns="" id="{28AC7F7A-EB5E-48A2-A178-02E17BA194BE}"/>
+                <a16:creationId xmlns="" xmlns:a16="http://schemas.microsoft.com/office/drawing/2014/main" id="{28AC7F7A-EB5E-48A2-A178-02E17BA194BE}"/>
               </a:ext>
             </a:extLst>
           </p:cNvPr>
@@ -46902,7 +46885,7 @@
           <p:cNvPr id="6" name="Tijdelijke aanduiding voor inhoud 2">
             <a:extLst>
               <a:ext uri="{FF2B5EF4-FFF2-40B4-BE49-F238E27FC236}">
-                <a16:creationId xmlns:a16="http://schemas.microsoft.com/office/drawing/2014/main" xmlns="" id="{39CCA8EE-4DBA-4295-92E6-76021C7C2316}"/>
+                <a16:creationId xmlns="" xmlns:a16="http://schemas.microsoft.com/office/drawing/2014/main" id="{39CCA8EE-4DBA-4295-92E6-76021C7C2316}"/>
               </a:ext>
             </a:extLst>
           </p:cNvPr>
@@ -47255,7 +47238,7 @@
           <p:cNvPr id="8" name="Ovaal 7">
             <a:extLst>
               <a:ext uri="{FF2B5EF4-FFF2-40B4-BE49-F238E27FC236}">
-                <a16:creationId xmlns:a16="http://schemas.microsoft.com/office/drawing/2014/main" xmlns="" id="{38308C4F-DC89-4634-9368-D4F9CB002622}"/>
+                <a16:creationId xmlns="" xmlns:a16="http://schemas.microsoft.com/office/drawing/2014/main" id="{38308C4F-DC89-4634-9368-D4F9CB002622}"/>
               </a:ext>
             </a:extLst>
           </p:cNvPr>
@@ -47311,7 +47294,7 @@
           <p:cNvPr id="11" name="Ovaal 10">
             <a:extLst>
               <a:ext uri="{FF2B5EF4-FFF2-40B4-BE49-F238E27FC236}">
-                <a16:creationId xmlns:a16="http://schemas.microsoft.com/office/drawing/2014/main" xmlns="" id="{76118200-467E-411D-B321-86BB0FE072CE}"/>
+                <a16:creationId xmlns="" xmlns:a16="http://schemas.microsoft.com/office/drawing/2014/main" id="{76118200-467E-411D-B321-86BB0FE072CE}"/>
               </a:ext>
             </a:extLst>
           </p:cNvPr>
@@ -47367,7 +47350,7 @@
           <p:cNvPr id="12" name="Ovaal 11">
             <a:extLst>
               <a:ext uri="{FF2B5EF4-FFF2-40B4-BE49-F238E27FC236}">
-                <a16:creationId xmlns:a16="http://schemas.microsoft.com/office/drawing/2014/main" xmlns="" id="{B4EEB698-4C31-4D93-8C78-6012417B26A0}"/>
+                <a16:creationId xmlns="" xmlns:a16="http://schemas.microsoft.com/office/drawing/2014/main" id="{B4EEB698-4C31-4D93-8C78-6012417B26A0}"/>
               </a:ext>
             </a:extLst>
           </p:cNvPr>
@@ -47423,7 +47406,7 @@
           <p:cNvPr id="13" name="Ovaal 12">
             <a:extLst>
               <a:ext uri="{FF2B5EF4-FFF2-40B4-BE49-F238E27FC236}">
-                <a16:creationId xmlns:a16="http://schemas.microsoft.com/office/drawing/2014/main" xmlns="" id="{500F1BCE-C77A-473B-9DF0-77E083596602}"/>
+                <a16:creationId xmlns="" xmlns:a16="http://schemas.microsoft.com/office/drawing/2014/main" id="{500F1BCE-C77A-473B-9DF0-77E083596602}"/>
               </a:ext>
             </a:extLst>
           </p:cNvPr>
@@ -47479,7 +47462,7 @@
           <p:cNvPr id="15" name="Ovaal 14">
             <a:extLst>
               <a:ext uri="{FF2B5EF4-FFF2-40B4-BE49-F238E27FC236}">
-                <a16:creationId xmlns:a16="http://schemas.microsoft.com/office/drawing/2014/main" xmlns="" id="{898E8221-649B-44A2-BF29-42FCCC5B3A20}"/>
+                <a16:creationId xmlns="" xmlns:a16="http://schemas.microsoft.com/office/drawing/2014/main" id="{898E8221-649B-44A2-BF29-42FCCC5B3A20}"/>
               </a:ext>
             </a:extLst>
           </p:cNvPr>
@@ -47535,7 +47518,7 @@
           <p:cNvPr id="16" name="Ovaal 15">
             <a:extLst>
               <a:ext uri="{FF2B5EF4-FFF2-40B4-BE49-F238E27FC236}">
-                <a16:creationId xmlns:a16="http://schemas.microsoft.com/office/drawing/2014/main" xmlns="" id="{99C9B94C-2898-44AA-B541-6046F39910EF}"/>
+                <a16:creationId xmlns="" xmlns:a16="http://schemas.microsoft.com/office/drawing/2014/main" id="{99C9B94C-2898-44AA-B541-6046F39910EF}"/>
               </a:ext>
             </a:extLst>
           </p:cNvPr>
@@ -47591,7 +47574,7 @@
           <p:cNvPr id="17" name="Ovaal 16">
             <a:extLst>
               <a:ext uri="{FF2B5EF4-FFF2-40B4-BE49-F238E27FC236}">
-                <a16:creationId xmlns:a16="http://schemas.microsoft.com/office/drawing/2014/main" xmlns="" id="{9A22B3EA-9F59-408E-B98F-D4E72457B6E8}"/>
+                <a16:creationId xmlns="" xmlns:a16="http://schemas.microsoft.com/office/drawing/2014/main" id="{9A22B3EA-9F59-408E-B98F-D4E72457B6E8}"/>
               </a:ext>
             </a:extLst>
           </p:cNvPr>
@@ -47647,7 +47630,7 @@
           <p:cNvPr id="18" name="Ovaal 17">
             <a:extLst>
               <a:ext uri="{FF2B5EF4-FFF2-40B4-BE49-F238E27FC236}">
-                <a16:creationId xmlns:a16="http://schemas.microsoft.com/office/drawing/2014/main" xmlns="" id="{973C7420-39A6-4941-8754-ED28969BAABD}"/>
+                <a16:creationId xmlns="" xmlns:a16="http://schemas.microsoft.com/office/drawing/2014/main" id="{973C7420-39A6-4941-8754-ED28969BAABD}"/>
               </a:ext>
             </a:extLst>
           </p:cNvPr>
@@ -47703,7 +47686,7 @@
           <p:cNvPr id="21" name="Rechte verbindingslijn 20">
             <a:extLst>
               <a:ext uri="{FF2B5EF4-FFF2-40B4-BE49-F238E27FC236}">
-                <a16:creationId xmlns:a16="http://schemas.microsoft.com/office/drawing/2014/main" xmlns="" id="{059EA362-83D0-42A6-BF5A-015D3190823C}"/>
+                <a16:creationId xmlns="" xmlns:a16="http://schemas.microsoft.com/office/drawing/2014/main" id="{059EA362-83D0-42A6-BF5A-015D3190823C}"/>
               </a:ext>
             </a:extLst>
           </p:cNvPr>
@@ -47743,7 +47726,7 @@
           <p:cNvPr id="29" name="Rechte verbindingslijn 28">
             <a:extLst>
               <a:ext uri="{FF2B5EF4-FFF2-40B4-BE49-F238E27FC236}">
-                <a16:creationId xmlns:a16="http://schemas.microsoft.com/office/drawing/2014/main" xmlns="" id="{00D294FB-389A-4E37-B884-C5612071181C}"/>
+                <a16:creationId xmlns="" xmlns:a16="http://schemas.microsoft.com/office/drawing/2014/main" id="{00D294FB-389A-4E37-B884-C5612071181C}"/>
               </a:ext>
             </a:extLst>
           </p:cNvPr>
@@ -47784,7 +47767,7 @@
           <p:cNvPr id="33" name="Rechte verbindingslijn 32">
             <a:extLst>
               <a:ext uri="{FF2B5EF4-FFF2-40B4-BE49-F238E27FC236}">
-                <a16:creationId xmlns:a16="http://schemas.microsoft.com/office/drawing/2014/main" xmlns="" id="{DF3DBED6-FC8C-40FB-B1CD-C2007EED090F}"/>
+                <a16:creationId xmlns="" xmlns:a16="http://schemas.microsoft.com/office/drawing/2014/main" id="{DF3DBED6-FC8C-40FB-B1CD-C2007EED090F}"/>
               </a:ext>
             </a:extLst>
           </p:cNvPr>
@@ -47821,7 +47804,7 @@
           <p:cNvPr id="35" name="Rechte verbindingslijn 34">
             <a:extLst>
               <a:ext uri="{FF2B5EF4-FFF2-40B4-BE49-F238E27FC236}">
-                <a16:creationId xmlns:a16="http://schemas.microsoft.com/office/drawing/2014/main" xmlns="" id="{34FE5152-64F3-4C8E-9330-4577813E9279}"/>
+                <a16:creationId xmlns="" xmlns:a16="http://schemas.microsoft.com/office/drawing/2014/main" id="{34FE5152-64F3-4C8E-9330-4577813E9279}"/>
               </a:ext>
             </a:extLst>
           </p:cNvPr>
@@ -47858,7 +47841,7 @@
           <p:cNvPr id="36" name="Rechte verbindingslijn 35">
             <a:extLst>
               <a:ext uri="{FF2B5EF4-FFF2-40B4-BE49-F238E27FC236}">
-                <a16:creationId xmlns:a16="http://schemas.microsoft.com/office/drawing/2014/main" xmlns="" id="{889A6001-E0D2-4C60-9308-23164EED59AE}"/>
+                <a16:creationId xmlns="" xmlns:a16="http://schemas.microsoft.com/office/drawing/2014/main" id="{889A6001-E0D2-4C60-9308-23164EED59AE}"/>
               </a:ext>
             </a:extLst>
           </p:cNvPr>
@@ -47897,7 +47880,7 @@
           <p:cNvPr id="40" name="Rechte verbindingslijn 39">
             <a:extLst>
               <a:ext uri="{FF2B5EF4-FFF2-40B4-BE49-F238E27FC236}">
-                <a16:creationId xmlns:a16="http://schemas.microsoft.com/office/drawing/2014/main" xmlns="" id="{FCEDDA5F-A1B0-4DB3-80CB-FE29668E206A}"/>
+                <a16:creationId xmlns="" xmlns:a16="http://schemas.microsoft.com/office/drawing/2014/main" id="{FCEDDA5F-A1B0-4DB3-80CB-FE29668E206A}"/>
               </a:ext>
             </a:extLst>
           </p:cNvPr>
@@ -47936,7 +47919,7 @@
           <p:cNvPr id="43" name="Rechte verbindingslijn 42">
             <a:extLst>
               <a:ext uri="{FF2B5EF4-FFF2-40B4-BE49-F238E27FC236}">
-                <a16:creationId xmlns:a16="http://schemas.microsoft.com/office/drawing/2014/main" xmlns="" id="{B7D431BF-07EE-4352-A0B1-C2E7F18E4560}"/>
+                <a16:creationId xmlns="" xmlns:a16="http://schemas.microsoft.com/office/drawing/2014/main" id="{B7D431BF-07EE-4352-A0B1-C2E7F18E4560}"/>
               </a:ext>
             </a:extLst>
           </p:cNvPr>
@@ -47976,7 +47959,7 @@
           <p:cNvPr id="45" name="Ovaal 44">
             <a:extLst>
               <a:ext uri="{FF2B5EF4-FFF2-40B4-BE49-F238E27FC236}">
-                <a16:creationId xmlns:a16="http://schemas.microsoft.com/office/drawing/2014/main" xmlns="" id="{57529141-7330-4247-8686-99CD5E35686F}"/>
+                <a16:creationId xmlns="" xmlns:a16="http://schemas.microsoft.com/office/drawing/2014/main" id="{57529141-7330-4247-8686-99CD5E35686F}"/>
               </a:ext>
             </a:extLst>
           </p:cNvPr>
@@ -48032,7 +48015,7 @@
           <p:cNvPr id="46" name="Ovaal 45">
             <a:extLst>
               <a:ext uri="{FF2B5EF4-FFF2-40B4-BE49-F238E27FC236}">
-                <a16:creationId xmlns:a16="http://schemas.microsoft.com/office/drawing/2014/main" xmlns="" id="{3B79EEF7-DC2A-40D1-A77A-3567AF6FB04E}"/>
+                <a16:creationId xmlns="" xmlns:a16="http://schemas.microsoft.com/office/drawing/2014/main" id="{3B79EEF7-DC2A-40D1-A77A-3567AF6FB04E}"/>
               </a:ext>
             </a:extLst>
           </p:cNvPr>
@@ -48088,7 +48071,7 @@
           <p:cNvPr id="47" name="Ovaal 46">
             <a:extLst>
               <a:ext uri="{FF2B5EF4-FFF2-40B4-BE49-F238E27FC236}">
-                <a16:creationId xmlns:a16="http://schemas.microsoft.com/office/drawing/2014/main" xmlns="" id="{11A247D9-9223-4775-8D01-3DAB7B8E8D4D}"/>
+                <a16:creationId xmlns="" xmlns:a16="http://schemas.microsoft.com/office/drawing/2014/main" id="{11A247D9-9223-4775-8D01-3DAB7B8E8D4D}"/>
               </a:ext>
             </a:extLst>
           </p:cNvPr>
@@ -48144,7 +48127,7 @@
           <p:cNvPr id="49" name="Ovaal 48">
             <a:extLst>
               <a:ext uri="{FF2B5EF4-FFF2-40B4-BE49-F238E27FC236}">
-                <a16:creationId xmlns:a16="http://schemas.microsoft.com/office/drawing/2014/main" xmlns="" id="{B954B904-B0E0-41EA-AE6A-7C4FE2E08A6B}"/>
+                <a16:creationId xmlns="" xmlns:a16="http://schemas.microsoft.com/office/drawing/2014/main" id="{B954B904-B0E0-41EA-AE6A-7C4FE2E08A6B}"/>
               </a:ext>
             </a:extLst>
           </p:cNvPr>
@@ -48200,7 +48183,7 @@
           <p:cNvPr id="50" name="Ovaal 49">
             <a:extLst>
               <a:ext uri="{FF2B5EF4-FFF2-40B4-BE49-F238E27FC236}">
-                <a16:creationId xmlns:a16="http://schemas.microsoft.com/office/drawing/2014/main" xmlns="" id="{FFB398A4-3B9A-4B53-9B10-3BADE25E9832}"/>
+                <a16:creationId xmlns="" xmlns:a16="http://schemas.microsoft.com/office/drawing/2014/main" id="{FFB398A4-3B9A-4B53-9B10-3BADE25E9832}"/>
               </a:ext>
             </a:extLst>
           </p:cNvPr>
@@ -48256,7 +48239,7 @@
           <p:cNvPr id="52" name="Ovaal 51">
             <a:extLst>
               <a:ext uri="{FF2B5EF4-FFF2-40B4-BE49-F238E27FC236}">
-                <a16:creationId xmlns:a16="http://schemas.microsoft.com/office/drawing/2014/main" xmlns="" id="{DE621220-FF0D-4C01-8E25-53B2CDA747CD}"/>
+                <a16:creationId xmlns="" xmlns:a16="http://schemas.microsoft.com/office/drawing/2014/main" id="{DE621220-FF0D-4C01-8E25-53B2CDA747CD}"/>
               </a:ext>
             </a:extLst>
           </p:cNvPr>
@@ -48312,7 +48295,7 @@
           <p:cNvPr id="53" name="Rechte verbindingslijn 52">
             <a:extLst>
               <a:ext uri="{FF2B5EF4-FFF2-40B4-BE49-F238E27FC236}">
-                <a16:creationId xmlns:a16="http://schemas.microsoft.com/office/drawing/2014/main" xmlns="" id="{5A724333-08C2-4B29-ACA7-A817F61C1DD9}"/>
+                <a16:creationId xmlns="" xmlns:a16="http://schemas.microsoft.com/office/drawing/2014/main" id="{5A724333-08C2-4B29-ACA7-A817F61C1DD9}"/>
               </a:ext>
             </a:extLst>
           </p:cNvPr>
@@ -48352,7 +48335,7 @@
           <p:cNvPr id="54" name="Rechte verbindingslijn 53">
             <a:extLst>
               <a:ext uri="{FF2B5EF4-FFF2-40B4-BE49-F238E27FC236}">
-                <a16:creationId xmlns:a16="http://schemas.microsoft.com/office/drawing/2014/main" xmlns="" id="{50AD91D4-B66C-4F18-86F0-99D578BEBE2D}"/>
+                <a16:creationId xmlns="" xmlns:a16="http://schemas.microsoft.com/office/drawing/2014/main" id="{50AD91D4-B66C-4F18-86F0-99D578BEBE2D}"/>
               </a:ext>
             </a:extLst>
           </p:cNvPr>
@@ -48393,7 +48376,7 @@
           <p:cNvPr id="55" name="Rechte verbindingslijn 54">
             <a:extLst>
               <a:ext uri="{FF2B5EF4-FFF2-40B4-BE49-F238E27FC236}">
-                <a16:creationId xmlns:a16="http://schemas.microsoft.com/office/drawing/2014/main" xmlns="" id="{BA10A45E-DDFC-4DB2-BF69-1AED5BD23B1F}"/>
+                <a16:creationId xmlns="" xmlns:a16="http://schemas.microsoft.com/office/drawing/2014/main" id="{BA10A45E-DDFC-4DB2-BF69-1AED5BD23B1F}"/>
               </a:ext>
             </a:extLst>
           </p:cNvPr>
@@ -48433,7 +48416,7 @@
           <p:cNvPr id="56" name="Rechte verbindingslijn 55">
             <a:extLst>
               <a:ext uri="{FF2B5EF4-FFF2-40B4-BE49-F238E27FC236}">
-                <a16:creationId xmlns:a16="http://schemas.microsoft.com/office/drawing/2014/main" xmlns="" id="{68548DB6-31EB-4F34-BE86-59E578FB704C}"/>
+                <a16:creationId xmlns="" xmlns:a16="http://schemas.microsoft.com/office/drawing/2014/main" id="{68548DB6-31EB-4F34-BE86-59E578FB704C}"/>
               </a:ext>
             </a:extLst>
           </p:cNvPr>
@@ -48474,7 +48457,7 @@
           <p:cNvPr id="57" name="Rechte verbindingslijn 56">
             <a:extLst>
               <a:ext uri="{FF2B5EF4-FFF2-40B4-BE49-F238E27FC236}">
-                <a16:creationId xmlns:a16="http://schemas.microsoft.com/office/drawing/2014/main" xmlns="" id="{E49FBC19-232E-45AC-A754-4A2A738BDD0C}"/>
+                <a16:creationId xmlns="" xmlns:a16="http://schemas.microsoft.com/office/drawing/2014/main" id="{E49FBC19-232E-45AC-A754-4A2A738BDD0C}"/>
               </a:ext>
             </a:extLst>
           </p:cNvPr>
@@ -48513,7 +48496,7 @@
           <p:cNvPr id="58" name="Rechte verbindingslijn 57">
             <a:extLst>
               <a:ext uri="{FF2B5EF4-FFF2-40B4-BE49-F238E27FC236}">
-                <a16:creationId xmlns:a16="http://schemas.microsoft.com/office/drawing/2014/main" xmlns="" id="{956CD048-46B5-4A02-8B4A-57A482A18A4D}"/>
+                <a16:creationId xmlns="" xmlns:a16="http://schemas.microsoft.com/office/drawing/2014/main" id="{956CD048-46B5-4A02-8B4A-57A482A18A4D}"/>
               </a:ext>
             </a:extLst>
           </p:cNvPr>
@@ -48552,7 +48535,7 @@
           <p:cNvPr id="60" name="Ovaal 59">
             <a:extLst>
               <a:ext uri="{FF2B5EF4-FFF2-40B4-BE49-F238E27FC236}">
-                <a16:creationId xmlns:a16="http://schemas.microsoft.com/office/drawing/2014/main" xmlns="" id="{459D5B8B-C55B-4223-9D74-2ED75784865C}"/>
+                <a16:creationId xmlns="" xmlns:a16="http://schemas.microsoft.com/office/drawing/2014/main" id="{459D5B8B-C55B-4223-9D74-2ED75784865C}"/>
               </a:ext>
             </a:extLst>
           </p:cNvPr>
@@ -48608,7 +48591,7 @@
           <p:cNvPr id="61" name="Rechte verbindingslijn 60">
             <a:extLst>
               <a:ext uri="{FF2B5EF4-FFF2-40B4-BE49-F238E27FC236}">
-                <a16:creationId xmlns:a16="http://schemas.microsoft.com/office/drawing/2014/main" xmlns="" id="{5817B409-1972-4E7A-A346-42EBBDDBBDA2}"/>
+                <a16:creationId xmlns="" xmlns:a16="http://schemas.microsoft.com/office/drawing/2014/main" id="{5817B409-1972-4E7A-A346-42EBBDDBBDA2}"/>
               </a:ext>
             </a:extLst>
           </p:cNvPr>
@@ -48648,7 +48631,7 @@
           <p:cNvPr id="48" name="Ovaal 47">
             <a:extLst>
               <a:ext uri="{FF2B5EF4-FFF2-40B4-BE49-F238E27FC236}">
-                <a16:creationId xmlns:a16="http://schemas.microsoft.com/office/drawing/2014/main" xmlns="" id="{07340632-A551-4C79-BC3F-21604B6D2546}"/>
+                <a16:creationId xmlns="" xmlns:a16="http://schemas.microsoft.com/office/drawing/2014/main" id="{07340632-A551-4C79-BC3F-21604B6D2546}"/>
               </a:ext>
             </a:extLst>
           </p:cNvPr>
@@ -48704,7 +48687,7 @@
           <p:cNvPr id="3079" name="Tekstvak 3078">
             <a:extLst>
               <a:ext uri="{FF2B5EF4-FFF2-40B4-BE49-F238E27FC236}">
-                <a16:creationId xmlns:a16="http://schemas.microsoft.com/office/drawing/2014/main" xmlns="" id="{1CC6BB25-A5A7-44C5-9F4C-33310C0BF2AD}"/>
+                <a16:creationId xmlns="" xmlns:a16="http://schemas.microsoft.com/office/drawing/2014/main" id="{1CC6BB25-A5A7-44C5-9F4C-33310C0BF2AD}"/>
               </a:ext>
             </a:extLst>
           </p:cNvPr>
@@ -48739,7 +48722,7 @@
           <p:cNvPr id="73" name="Tekstvak 72">
             <a:extLst>
               <a:ext uri="{FF2B5EF4-FFF2-40B4-BE49-F238E27FC236}">
-                <a16:creationId xmlns:a16="http://schemas.microsoft.com/office/drawing/2014/main" xmlns="" id="{92032B10-6061-46D9-B7A2-4230E679EB5C}"/>
+                <a16:creationId xmlns="" xmlns:a16="http://schemas.microsoft.com/office/drawing/2014/main" id="{92032B10-6061-46D9-B7A2-4230E679EB5C}"/>
               </a:ext>
             </a:extLst>
           </p:cNvPr>
@@ -48774,7 +48757,7 @@
           <p:cNvPr id="3084" name="Tekstvak 3083">
             <a:extLst>
               <a:ext uri="{FF2B5EF4-FFF2-40B4-BE49-F238E27FC236}">
-                <a16:creationId xmlns:a16="http://schemas.microsoft.com/office/drawing/2014/main" xmlns="" id="{8FB3793C-CCE6-4A47-8745-0B71859B0AE9}"/>
+                <a16:creationId xmlns="" xmlns:a16="http://schemas.microsoft.com/office/drawing/2014/main" id="{8FB3793C-CCE6-4A47-8745-0B71859B0AE9}"/>
               </a:ext>
             </a:extLst>
           </p:cNvPr>
@@ -48814,7 +48797,7 @@
           <p:cNvPr id="80" name="Tekstvak 79">
             <a:extLst>
               <a:ext uri="{FF2B5EF4-FFF2-40B4-BE49-F238E27FC236}">
-                <a16:creationId xmlns:a16="http://schemas.microsoft.com/office/drawing/2014/main" xmlns="" id="{3F06DDFE-C025-43B6-895C-A2DCB23DF547}"/>
+                <a16:creationId xmlns="" xmlns:a16="http://schemas.microsoft.com/office/drawing/2014/main" id="{3F06DDFE-C025-43B6-895C-A2DCB23DF547}"/>
               </a:ext>
             </a:extLst>
           </p:cNvPr>
@@ -48849,7 +48832,7 @@
           <p:cNvPr id="42" name="Ovaal 41">
             <a:extLst>
               <a:ext uri="{FF2B5EF4-FFF2-40B4-BE49-F238E27FC236}">
-                <a16:creationId xmlns:a16="http://schemas.microsoft.com/office/drawing/2014/main" xmlns="" id="{72D56CA8-60C5-45EC-8F1B-B1093445083D}"/>
+                <a16:creationId xmlns="" xmlns:a16="http://schemas.microsoft.com/office/drawing/2014/main" id="{72D56CA8-60C5-45EC-8F1B-B1093445083D}"/>
               </a:ext>
             </a:extLst>
           </p:cNvPr>
@@ -48903,7 +48886,7 @@
           <p:cNvPr id="44" name="Ovaal 43">
             <a:extLst>
               <a:ext uri="{FF2B5EF4-FFF2-40B4-BE49-F238E27FC236}">
-                <a16:creationId xmlns:a16="http://schemas.microsoft.com/office/drawing/2014/main" xmlns="" id="{7CF4FCBC-648B-4EB1-93CE-BA029036C0CC}"/>
+                <a16:creationId xmlns="" xmlns:a16="http://schemas.microsoft.com/office/drawing/2014/main" id="{7CF4FCBC-648B-4EB1-93CE-BA029036C0CC}"/>
               </a:ext>
             </a:extLst>
           </p:cNvPr>
@@ -48957,7 +48940,7 @@
           <p:cNvPr id="51" name="Tekstvak 50">
             <a:extLst>
               <a:ext uri="{FF2B5EF4-FFF2-40B4-BE49-F238E27FC236}">
-                <a16:creationId xmlns:a16="http://schemas.microsoft.com/office/drawing/2014/main" xmlns="" id="{36AF06F7-C7AC-406C-827D-CBD749238E27}"/>
+                <a16:creationId xmlns="" xmlns:a16="http://schemas.microsoft.com/office/drawing/2014/main" id="{36AF06F7-C7AC-406C-827D-CBD749238E27}"/>
               </a:ext>
             </a:extLst>
           </p:cNvPr>
@@ -48992,7 +48975,7 @@
           <p:cNvPr id="59" name="Tekstvak 58">
             <a:extLst>
               <a:ext uri="{FF2B5EF4-FFF2-40B4-BE49-F238E27FC236}">
-                <a16:creationId xmlns:a16="http://schemas.microsoft.com/office/drawing/2014/main" xmlns="" id="{F0657E35-0C81-4AF8-BA44-4F33F5AF6613}"/>
+                <a16:creationId xmlns="" xmlns:a16="http://schemas.microsoft.com/office/drawing/2014/main" id="{F0657E35-0C81-4AF8-BA44-4F33F5AF6613}"/>
               </a:ext>
             </a:extLst>
           </p:cNvPr>
@@ -49027,7 +49010,7 @@
           <p:cNvPr id="62" name="Ovaal 61">
             <a:extLst>
               <a:ext uri="{FF2B5EF4-FFF2-40B4-BE49-F238E27FC236}">
-                <a16:creationId xmlns:a16="http://schemas.microsoft.com/office/drawing/2014/main" xmlns="" id="{8A290C8E-7589-400C-9595-1E7D05623DE2}"/>
+                <a16:creationId xmlns="" xmlns:a16="http://schemas.microsoft.com/office/drawing/2014/main" id="{8A290C8E-7589-400C-9595-1E7D05623DE2}"/>
               </a:ext>
             </a:extLst>
           </p:cNvPr>
@@ -49081,7 +49064,7 @@
           <p:cNvPr id="63" name="Tekstvak 62">
             <a:extLst>
               <a:ext uri="{FF2B5EF4-FFF2-40B4-BE49-F238E27FC236}">
-                <a16:creationId xmlns:a16="http://schemas.microsoft.com/office/drawing/2014/main" xmlns="" id="{06857F55-522B-4B48-90E8-81D28DF8093C}"/>
+                <a16:creationId xmlns="" xmlns:a16="http://schemas.microsoft.com/office/drawing/2014/main" id="{06857F55-522B-4B48-90E8-81D28DF8093C}"/>
               </a:ext>
             </a:extLst>
           </p:cNvPr>
@@ -49117,7 +49100,7 @@
           <p:cNvPr id="64" name="Rechte verbindingslijn 63">
             <a:extLst>
               <a:ext uri="{FF2B5EF4-FFF2-40B4-BE49-F238E27FC236}">
-                <a16:creationId xmlns:a16="http://schemas.microsoft.com/office/drawing/2014/main" xmlns="" id="{2A1E1318-9A67-4611-B0A0-4362ECD938B1}"/>
+                <a16:creationId xmlns="" xmlns:a16="http://schemas.microsoft.com/office/drawing/2014/main" id="{2A1E1318-9A67-4611-B0A0-4362ECD938B1}"/>
               </a:ext>
             </a:extLst>
           </p:cNvPr>
@@ -49164,7 +49147,7 @@
           <p:cNvPr id="67" name="Ovaal 66">
             <a:extLst>
               <a:ext uri="{FF2B5EF4-FFF2-40B4-BE49-F238E27FC236}">
-                <a16:creationId xmlns:a16="http://schemas.microsoft.com/office/drawing/2014/main" xmlns="" id="{5326C679-220C-466C-9BBF-F5AA10F9F4E8}"/>
+                <a16:creationId xmlns="" xmlns:a16="http://schemas.microsoft.com/office/drawing/2014/main" id="{5326C679-220C-466C-9BBF-F5AA10F9F4E8}"/>
               </a:ext>
             </a:extLst>
           </p:cNvPr>
@@ -49216,7 +49199,7 @@
           <p:cNvPr id="68" name="Ovaal 67">
             <a:extLst>
               <a:ext uri="{FF2B5EF4-FFF2-40B4-BE49-F238E27FC236}">
-                <a16:creationId xmlns:a16="http://schemas.microsoft.com/office/drawing/2014/main" xmlns="" id="{CC3AD218-E8A2-4218-9791-5E2039A02C7E}"/>
+                <a16:creationId xmlns="" xmlns:a16="http://schemas.microsoft.com/office/drawing/2014/main" id="{CC3AD218-E8A2-4218-9791-5E2039A02C7E}"/>
               </a:ext>
             </a:extLst>
           </p:cNvPr>
@@ -49268,7 +49251,7 @@
           <p:cNvPr id="74" name="Tekstvak 73">
             <a:extLst>
               <a:ext uri="{FF2B5EF4-FFF2-40B4-BE49-F238E27FC236}">
-                <a16:creationId xmlns:a16="http://schemas.microsoft.com/office/drawing/2014/main" xmlns="" id="{0E4E67D1-74C1-4108-991F-23EBF8206C06}"/>
+                <a16:creationId xmlns="" xmlns:a16="http://schemas.microsoft.com/office/drawing/2014/main" id="{0E4E67D1-74C1-4108-991F-23EBF8206C06}"/>
               </a:ext>
             </a:extLst>
           </p:cNvPr>
@@ -49303,7 +49286,7 @@
           <p:cNvPr id="65" name="Tekstvak 12">
             <a:extLst>
               <a:ext uri="{FF2B5EF4-FFF2-40B4-BE49-F238E27FC236}">
-                <a16:creationId xmlns:a16="http://schemas.microsoft.com/office/drawing/2014/main" xmlns="" id="{35AAEF8A-1E8B-4134-8FA6-762EB3980799}"/>
+                <a16:creationId xmlns="" xmlns:a16="http://schemas.microsoft.com/office/drawing/2014/main" id="{35AAEF8A-1E8B-4134-8FA6-762EB3980799}"/>
               </a:ext>
             </a:extLst>
           </p:cNvPr>
@@ -49385,7 +49368,7 @@
     </p:spTree>
     <p:extLst>
       <p:ext uri="{BB962C8B-B14F-4D97-AF65-F5344CB8AC3E}">
-        <p14:creationId xmlns:p14="http://schemas.microsoft.com/office/powerpoint/2010/main" xmlns="" val="2460963347"/>
+        <p14:creationId xmlns:p14="http://schemas.microsoft.com/office/powerpoint/2010/main" val="2460963347"/>
       </p:ext>
     </p:extLst>
   </p:cSld>
@@ -49424,7 +49407,7 @@
           <p:cNvPr id="77" name="Rechte verbindingslijn 76">
             <a:extLst>
               <a:ext uri="{FF2B5EF4-FFF2-40B4-BE49-F238E27FC236}">
-                <a16:creationId xmlns:a16="http://schemas.microsoft.com/office/drawing/2014/main" xmlns="" id="{9812B259-9D26-437C-888D-12FD41E09E12}"/>
+                <a16:creationId xmlns="" xmlns:a16="http://schemas.microsoft.com/office/drawing/2014/main" id="{9812B259-9D26-437C-888D-12FD41E09E12}"/>
               </a:ext>
             </a:extLst>
           </p:cNvPr>
@@ -49471,7 +49454,7 @@
           <p:cNvPr id="9" name="Rechthoek 8">
             <a:extLst>
               <a:ext uri="{FF2B5EF4-FFF2-40B4-BE49-F238E27FC236}">
-                <a16:creationId xmlns:a16="http://schemas.microsoft.com/office/drawing/2014/main" xmlns="" id="{2EF3A218-A581-4942-95E5-912DA50B7BC2}"/>
+                <a16:creationId xmlns="" xmlns:a16="http://schemas.microsoft.com/office/drawing/2014/main" id="{2EF3A218-A581-4942-95E5-912DA50B7BC2}"/>
               </a:ext>
             </a:extLst>
           </p:cNvPr>
@@ -49526,7 +49509,7 @@
           <p:cNvPr id="3077" name="Rechte verbindingslijn 3076">
             <a:extLst>
               <a:ext uri="{FF2B5EF4-FFF2-40B4-BE49-F238E27FC236}">
-                <a16:creationId xmlns:a16="http://schemas.microsoft.com/office/drawing/2014/main" xmlns="" id="{B4AE7606-D7E8-456C-BC2D-43AAEEADF2E0}"/>
+                <a16:creationId xmlns="" xmlns:a16="http://schemas.microsoft.com/office/drawing/2014/main" id="{B4AE7606-D7E8-456C-BC2D-43AAEEADF2E0}"/>
               </a:ext>
             </a:extLst>
           </p:cNvPr>
@@ -49574,7 +49557,7 @@
           <p:cNvPr id="2" name="Titel 1">
             <a:extLst>
               <a:ext uri="{FF2B5EF4-FFF2-40B4-BE49-F238E27FC236}">
-                <a16:creationId xmlns:a16="http://schemas.microsoft.com/office/drawing/2014/main" xmlns="" id="{28AC7F7A-EB5E-48A2-A178-02E17BA194BE}"/>
+                <a16:creationId xmlns="" xmlns:a16="http://schemas.microsoft.com/office/drawing/2014/main" id="{28AC7F7A-EB5E-48A2-A178-02E17BA194BE}"/>
               </a:ext>
             </a:extLst>
           </p:cNvPr>
@@ -49619,7 +49602,7 @@
           <p:cNvPr id="6" name="Tijdelijke aanduiding voor inhoud 2">
             <a:extLst>
               <a:ext uri="{FF2B5EF4-FFF2-40B4-BE49-F238E27FC236}">
-                <a16:creationId xmlns:a16="http://schemas.microsoft.com/office/drawing/2014/main" xmlns="" id="{39CCA8EE-4DBA-4295-92E6-76021C7C2316}"/>
+                <a16:creationId xmlns="" xmlns:a16="http://schemas.microsoft.com/office/drawing/2014/main" id="{39CCA8EE-4DBA-4295-92E6-76021C7C2316}"/>
               </a:ext>
             </a:extLst>
           </p:cNvPr>
@@ -49972,7 +49955,7 @@
           <p:cNvPr id="8" name="Ovaal 7">
             <a:extLst>
               <a:ext uri="{FF2B5EF4-FFF2-40B4-BE49-F238E27FC236}">
-                <a16:creationId xmlns:a16="http://schemas.microsoft.com/office/drawing/2014/main" xmlns="" id="{38308C4F-DC89-4634-9368-D4F9CB002622}"/>
+                <a16:creationId xmlns="" xmlns:a16="http://schemas.microsoft.com/office/drawing/2014/main" id="{38308C4F-DC89-4634-9368-D4F9CB002622}"/>
               </a:ext>
             </a:extLst>
           </p:cNvPr>
@@ -50028,7 +50011,7 @@
           <p:cNvPr id="11" name="Ovaal 10">
             <a:extLst>
               <a:ext uri="{FF2B5EF4-FFF2-40B4-BE49-F238E27FC236}">
-                <a16:creationId xmlns:a16="http://schemas.microsoft.com/office/drawing/2014/main" xmlns="" id="{76118200-467E-411D-B321-86BB0FE072CE}"/>
+                <a16:creationId xmlns="" xmlns:a16="http://schemas.microsoft.com/office/drawing/2014/main" id="{76118200-467E-411D-B321-86BB0FE072CE}"/>
               </a:ext>
             </a:extLst>
           </p:cNvPr>
@@ -50084,7 +50067,7 @@
           <p:cNvPr id="12" name="Ovaal 11">
             <a:extLst>
               <a:ext uri="{FF2B5EF4-FFF2-40B4-BE49-F238E27FC236}">
-                <a16:creationId xmlns:a16="http://schemas.microsoft.com/office/drawing/2014/main" xmlns="" id="{B4EEB698-4C31-4D93-8C78-6012417B26A0}"/>
+                <a16:creationId xmlns="" xmlns:a16="http://schemas.microsoft.com/office/drawing/2014/main" id="{B4EEB698-4C31-4D93-8C78-6012417B26A0}"/>
               </a:ext>
             </a:extLst>
           </p:cNvPr>
@@ -50140,7 +50123,7 @@
           <p:cNvPr id="13" name="Ovaal 12">
             <a:extLst>
               <a:ext uri="{FF2B5EF4-FFF2-40B4-BE49-F238E27FC236}">
-                <a16:creationId xmlns:a16="http://schemas.microsoft.com/office/drawing/2014/main" xmlns="" id="{500F1BCE-C77A-473B-9DF0-77E083596602}"/>
+                <a16:creationId xmlns="" xmlns:a16="http://schemas.microsoft.com/office/drawing/2014/main" id="{500F1BCE-C77A-473B-9DF0-77E083596602}"/>
               </a:ext>
             </a:extLst>
           </p:cNvPr>
@@ -50196,7 +50179,7 @@
           <p:cNvPr id="15" name="Ovaal 14">
             <a:extLst>
               <a:ext uri="{FF2B5EF4-FFF2-40B4-BE49-F238E27FC236}">
-                <a16:creationId xmlns:a16="http://schemas.microsoft.com/office/drawing/2014/main" xmlns="" id="{898E8221-649B-44A2-BF29-42FCCC5B3A20}"/>
+                <a16:creationId xmlns="" xmlns:a16="http://schemas.microsoft.com/office/drawing/2014/main" id="{898E8221-649B-44A2-BF29-42FCCC5B3A20}"/>
               </a:ext>
             </a:extLst>
           </p:cNvPr>
@@ -50252,7 +50235,7 @@
           <p:cNvPr id="16" name="Ovaal 15">
             <a:extLst>
               <a:ext uri="{FF2B5EF4-FFF2-40B4-BE49-F238E27FC236}">
-                <a16:creationId xmlns:a16="http://schemas.microsoft.com/office/drawing/2014/main" xmlns="" id="{99C9B94C-2898-44AA-B541-6046F39910EF}"/>
+                <a16:creationId xmlns="" xmlns:a16="http://schemas.microsoft.com/office/drawing/2014/main" id="{99C9B94C-2898-44AA-B541-6046F39910EF}"/>
               </a:ext>
             </a:extLst>
           </p:cNvPr>
@@ -50308,7 +50291,7 @@
           <p:cNvPr id="17" name="Ovaal 16">
             <a:extLst>
               <a:ext uri="{FF2B5EF4-FFF2-40B4-BE49-F238E27FC236}">
-                <a16:creationId xmlns:a16="http://schemas.microsoft.com/office/drawing/2014/main" xmlns="" id="{9A22B3EA-9F59-408E-B98F-D4E72457B6E8}"/>
+                <a16:creationId xmlns="" xmlns:a16="http://schemas.microsoft.com/office/drawing/2014/main" id="{9A22B3EA-9F59-408E-B98F-D4E72457B6E8}"/>
               </a:ext>
             </a:extLst>
           </p:cNvPr>
@@ -50364,7 +50347,7 @@
           <p:cNvPr id="18" name="Ovaal 17">
             <a:extLst>
               <a:ext uri="{FF2B5EF4-FFF2-40B4-BE49-F238E27FC236}">
-                <a16:creationId xmlns:a16="http://schemas.microsoft.com/office/drawing/2014/main" xmlns="" id="{973C7420-39A6-4941-8754-ED28969BAABD}"/>
+                <a16:creationId xmlns="" xmlns:a16="http://schemas.microsoft.com/office/drawing/2014/main" id="{973C7420-39A6-4941-8754-ED28969BAABD}"/>
               </a:ext>
             </a:extLst>
           </p:cNvPr>
@@ -50420,7 +50403,7 @@
           <p:cNvPr id="21" name="Rechte verbindingslijn 20">
             <a:extLst>
               <a:ext uri="{FF2B5EF4-FFF2-40B4-BE49-F238E27FC236}">
-                <a16:creationId xmlns:a16="http://schemas.microsoft.com/office/drawing/2014/main" xmlns="" id="{059EA362-83D0-42A6-BF5A-015D3190823C}"/>
+                <a16:creationId xmlns="" xmlns:a16="http://schemas.microsoft.com/office/drawing/2014/main" id="{059EA362-83D0-42A6-BF5A-015D3190823C}"/>
               </a:ext>
             </a:extLst>
           </p:cNvPr>
@@ -50460,7 +50443,7 @@
           <p:cNvPr id="29" name="Rechte verbindingslijn 28">
             <a:extLst>
               <a:ext uri="{FF2B5EF4-FFF2-40B4-BE49-F238E27FC236}">
-                <a16:creationId xmlns:a16="http://schemas.microsoft.com/office/drawing/2014/main" xmlns="" id="{00D294FB-389A-4E37-B884-C5612071181C}"/>
+                <a16:creationId xmlns="" xmlns:a16="http://schemas.microsoft.com/office/drawing/2014/main" id="{00D294FB-389A-4E37-B884-C5612071181C}"/>
               </a:ext>
             </a:extLst>
           </p:cNvPr>
@@ -50501,7 +50484,7 @@
           <p:cNvPr id="33" name="Rechte verbindingslijn 32">
             <a:extLst>
               <a:ext uri="{FF2B5EF4-FFF2-40B4-BE49-F238E27FC236}">
-                <a16:creationId xmlns:a16="http://schemas.microsoft.com/office/drawing/2014/main" xmlns="" id="{DF3DBED6-FC8C-40FB-B1CD-C2007EED090F}"/>
+                <a16:creationId xmlns="" xmlns:a16="http://schemas.microsoft.com/office/drawing/2014/main" id="{DF3DBED6-FC8C-40FB-B1CD-C2007EED090F}"/>
               </a:ext>
             </a:extLst>
           </p:cNvPr>
@@ -50538,7 +50521,7 @@
           <p:cNvPr id="35" name="Rechte verbindingslijn 34">
             <a:extLst>
               <a:ext uri="{FF2B5EF4-FFF2-40B4-BE49-F238E27FC236}">
-                <a16:creationId xmlns:a16="http://schemas.microsoft.com/office/drawing/2014/main" xmlns="" id="{34FE5152-64F3-4C8E-9330-4577813E9279}"/>
+                <a16:creationId xmlns="" xmlns:a16="http://schemas.microsoft.com/office/drawing/2014/main" id="{34FE5152-64F3-4C8E-9330-4577813E9279}"/>
               </a:ext>
             </a:extLst>
           </p:cNvPr>
@@ -50575,7 +50558,7 @@
           <p:cNvPr id="36" name="Rechte verbindingslijn 35">
             <a:extLst>
               <a:ext uri="{FF2B5EF4-FFF2-40B4-BE49-F238E27FC236}">
-                <a16:creationId xmlns:a16="http://schemas.microsoft.com/office/drawing/2014/main" xmlns="" id="{889A6001-E0D2-4C60-9308-23164EED59AE}"/>
+                <a16:creationId xmlns="" xmlns:a16="http://schemas.microsoft.com/office/drawing/2014/main" id="{889A6001-E0D2-4C60-9308-23164EED59AE}"/>
               </a:ext>
             </a:extLst>
           </p:cNvPr>
@@ -50614,7 +50597,7 @@
           <p:cNvPr id="40" name="Rechte verbindingslijn 39">
             <a:extLst>
               <a:ext uri="{FF2B5EF4-FFF2-40B4-BE49-F238E27FC236}">
-                <a16:creationId xmlns:a16="http://schemas.microsoft.com/office/drawing/2014/main" xmlns="" id="{FCEDDA5F-A1B0-4DB3-80CB-FE29668E206A}"/>
+                <a16:creationId xmlns="" xmlns:a16="http://schemas.microsoft.com/office/drawing/2014/main" id="{FCEDDA5F-A1B0-4DB3-80CB-FE29668E206A}"/>
               </a:ext>
             </a:extLst>
           </p:cNvPr>
@@ -50653,7 +50636,7 @@
           <p:cNvPr id="43" name="Rechte verbindingslijn 42">
             <a:extLst>
               <a:ext uri="{FF2B5EF4-FFF2-40B4-BE49-F238E27FC236}">
-                <a16:creationId xmlns:a16="http://schemas.microsoft.com/office/drawing/2014/main" xmlns="" id="{B7D431BF-07EE-4352-A0B1-C2E7F18E4560}"/>
+                <a16:creationId xmlns="" xmlns:a16="http://schemas.microsoft.com/office/drawing/2014/main" id="{B7D431BF-07EE-4352-A0B1-C2E7F18E4560}"/>
               </a:ext>
             </a:extLst>
           </p:cNvPr>
@@ -50693,7 +50676,7 @@
           <p:cNvPr id="45" name="Ovaal 44">
             <a:extLst>
               <a:ext uri="{FF2B5EF4-FFF2-40B4-BE49-F238E27FC236}">
-                <a16:creationId xmlns:a16="http://schemas.microsoft.com/office/drawing/2014/main" xmlns="" id="{57529141-7330-4247-8686-99CD5E35686F}"/>
+                <a16:creationId xmlns="" xmlns:a16="http://schemas.microsoft.com/office/drawing/2014/main" id="{57529141-7330-4247-8686-99CD5E35686F}"/>
               </a:ext>
             </a:extLst>
           </p:cNvPr>
@@ -50749,7 +50732,7 @@
           <p:cNvPr id="46" name="Ovaal 45">
             <a:extLst>
               <a:ext uri="{FF2B5EF4-FFF2-40B4-BE49-F238E27FC236}">
-                <a16:creationId xmlns:a16="http://schemas.microsoft.com/office/drawing/2014/main" xmlns="" id="{3B79EEF7-DC2A-40D1-A77A-3567AF6FB04E}"/>
+                <a16:creationId xmlns="" xmlns:a16="http://schemas.microsoft.com/office/drawing/2014/main" id="{3B79EEF7-DC2A-40D1-A77A-3567AF6FB04E}"/>
               </a:ext>
             </a:extLst>
           </p:cNvPr>
@@ -50805,7 +50788,7 @@
           <p:cNvPr id="47" name="Ovaal 46">
             <a:extLst>
               <a:ext uri="{FF2B5EF4-FFF2-40B4-BE49-F238E27FC236}">
-                <a16:creationId xmlns:a16="http://schemas.microsoft.com/office/drawing/2014/main" xmlns="" id="{11A247D9-9223-4775-8D01-3DAB7B8E8D4D}"/>
+                <a16:creationId xmlns="" xmlns:a16="http://schemas.microsoft.com/office/drawing/2014/main" id="{11A247D9-9223-4775-8D01-3DAB7B8E8D4D}"/>
               </a:ext>
             </a:extLst>
           </p:cNvPr>
@@ -50861,7 +50844,7 @@
           <p:cNvPr id="49" name="Ovaal 48">
             <a:extLst>
               <a:ext uri="{FF2B5EF4-FFF2-40B4-BE49-F238E27FC236}">
-                <a16:creationId xmlns:a16="http://schemas.microsoft.com/office/drawing/2014/main" xmlns="" id="{B954B904-B0E0-41EA-AE6A-7C4FE2E08A6B}"/>
+                <a16:creationId xmlns="" xmlns:a16="http://schemas.microsoft.com/office/drawing/2014/main" id="{B954B904-B0E0-41EA-AE6A-7C4FE2E08A6B}"/>
               </a:ext>
             </a:extLst>
           </p:cNvPr>
@@ -50917,7 +50900,7 @@
           <p:cNvPr id="50" name="Ovaal 49">
             <a:extLst>
               <a:ext uri="{FF2B5EF4-FFF2-40B4-BE49-F238E27FC236}">
-                <a16:creationId xmlns:a16="http://schemas.microsoft.com/office/drawing/2014/main" xmlns="" id="{FFB398A4-3B9A-4B53-9B10-3BADE25E9832}"/>
+                <a16:creationId xmlns="" xmlns:a16="http://schemas.microsoft.com/office/drawing/2014/main" id="{FFB398A4-3B9A-4B53-9B10-3BADE25E9832}"/>
               </a:ext>
             </a:extLst>
           </p:cNvPr>
@@ -50973,7 +50956,7 @@
           <p:cNvPr id="52" name="Ovaal 51">
             <a:extLst>
               <a:ext uri="{FF2B5EF4-FFF2-40B4-BE49-F238E27FC236}">
-                <a16:creationId xmlns:a16="http://schemas.microsoft.com/office/drawing/2014/main" xmlns="" id="{DE621220-FF0D-4C01-8E25-53B2CDA747CD}"/>
+                <a16:creationId xmlns="" xmlns:a16="http://schemas.microsoft.com/office/drawing/2014/main" id="{DE621220-FF0D-4C01-8E25-53B2CDA747CD}"/>
               </a:ext>
             </a:extLst>
           </p:cNvPr>
@@ -51029,7 +51012,7 @@
           <p:cNvPr id="53" name="Rechte verbindingslijn 52">
             <a:extLst>
               <a:ext uri="{FF2B5EF4-FFF2-40B4-BE49-F238E27FC236}">
-                <a16:creationId xmlns:a16="http://schemas.microsoft.com/office/drawing/2014/main" xmlns="" id="{5A724333-08C2-4B29-ACA7-A817F61C1DD9}"/>
+                <a16:creationId xmlns="" xmlns:a16="http://schemas.microsoft.com/office/drawing/2014/main" id="{5A724333-08C2-4B29-ACA7-A817F61C1DD9}"/>
               </a:ext>
             </a:extLst>
           </p:cNvPr>
@@ -51069,7 +51052,7 @@
           <p:cNvPr id="54" name="Rechte verbindingslijn 53">
             <a:extLst>
               <a:ext uri="{FF2B5EF4-FFF2-40B4-BE49-F238E27FC236}">
-                <a16:creationId xmlns:a16="http://schemas.microsoft.com/office/drawing/2014/main" xmlns="" id="{50AD91D4-B66C-4F18-86F0-99D578BEBE2D}"/>
+                <a16:creationId xmlns="" xmlns:a16="http://schemas.microsoft.com/office/drawing/2014/main" id="{50AD91D4-B66C-4F18-86F0-99D578BEBE2D}"/>
               </a:ext>
             </a:extLst>
           </p:cNvPr>
@@ -51110,7 +51093,7 @@
           <p:cNvPr id="55" name="Rechte verbindingslijn 54">
             <a:extLst>
               <a:ext uri="{FF2B5EF4-FFF2-40B4-BE49-F238E27FC236}">
-                <a16:creationId xmlns:a16="http://schemas.microsoft.com/office/drawing/2014/main" xmlns="" id="{BA10A45E-DDFC-4DB2-BF69-1AED5BD23B1F}"/>
+                <a16:creationId xmlns="" xmlns:a16="http://schemas.microsoft.com/office/drawing/2014/main" id="{BA10A45E-DDFC-4DB2-BF69-1AED5BD23B1F}"/>
               </a:ext>
             </a:extLst>
           </p:cNvPr>
@@ -51150,7 +51133,7 @@
           <p:cNvPr id="56" name="Rechte verbindingslijn 55">
             <a:extLst>
               <a:ext uri="{FF2B5EF4-FFF2-40B4-BE49-F238E27FC236}">
-                <a16:creationId xmlns:a16="http://schemas.microsoft.com/office/drawing/2014/main" xmlns="" id="{68548DB6-31EB-4F34-BE86-59E578FB704C}"/>
+                <a16:creationId xmlns="" xmlns:a16="http://schemas.microsoft.com/office/drawing/2014/main" id="{68548DB6-31EB-4F34-BE86-59E578FB704C}"/>
               </a:ext>
             </a:extLst>
           </p:cNvPr>
@@ -51191,7 +51174,7 @@
           <p:cNvPr id="57" name="Rechte verbindingslijn 56">
             <a:extLst>
               <a:ext uri="{FF2B5EF4-FFF2-40B4-BE49-F238E27FC236}">
-                <a16:creationId xmlns:a16="http://schemas.microsoft.com/office/drawing/2014/main" xmlns="" id="{E49FBC19-232E-45AC-A754-4A2A738BDD0C}"/>
+                <a16:creationId xmlns="" xmlns:a16="http://schemas.microsoft.com/office/drawing/2014/main" id="{E49FBC19-232E-45AC-A754-4A2A738BDD0C}"/>
               </a:ext>
             </a:extLst>
           </p:cNvPr>
@@ -51230,7 +51213,7 @@
           <p:cNvPr id="58" name="Rechte verbindingslijn 57">
             <a:extLst>
               <a:ext uri="{FF2B5EF4-FFF2-40B4-BE49-F238E27FC236}">
-                <a16:creationId xmlns:a16="http://schemas.microsoft.com/office/drawing/2014/main" xmlns="" id="{956CD048-46B5-4A02-8B4A-57A482A18A4D}"/>
+                <a16:creationId xmlns="" xmlns:a16="http://schemas.microsoft.com/office/drawing/2014/main" id="{956CD048-46B5-4A02-8B4A-57A482A18A4D}"/>
               </a:ext>
             </a:extLst>
           </p:cNvPr>
@@ -51269,7 +51252,7 @@
           <p:cNvPr id="60" name="Ovaal 59">
             <a:extLst>
               <a:ext uri="{FF2B5EF4-FFF2-40B4-BE49-F238E27FC236}">
-                <a16:creationId xmlns:a16="http://schemas.microsoft.com/office/drawing/2014/main" xmlns="" id="{459D5B8B-C55B-4223-9D74-2ED75784865C}"/>
+                <a16:creationId xmlns="" xmlns:a16="http://schemas.microsoft.com/office/drawing/2014/main" id="{459D5B8B-C55B-4223-9D74-2ED75784865C}"/>
               </a:ext>
             </a:extLst>
           </p:cNvPr>
@@ -51325,7 +51308,7 @@
           <p:cNvPr id="61" name="Rechte verbindingslijn 60">
             <a:extLst>
               <a:ext uri="{FF2B5EF4-FFF2-40B4-BE49-F238E27FC236}">
-                <a16:creationId xmlns:a16="http://schemas.microsoft.com/office/drawing/2014/main" xmlns="" id="{5817B409-1972-4E7A-A346-42EBBDDBBDA2}"/>
+                <a16:creationId xmlns="" xmlns:a16="http://schemas.microsoft.com/office/drawing/2014/main" id="{5817B409-1972-4E7A-A346-42EBBDDBBDA2}"/>
               </a:ext>
             </a:extLst>
           </p:cNvPr>
@@ -51365,7 +51348,7 @@
           <p:cNvPr id="48" name="Ovaal 47">
             <a:extLst>
               <a:ext uri="{FF2B5EF4-FFF2-40B4-BE49-F238E27FC236}">
-                <a16:creationId xmlns:a16="http://schemas.microsoft.com/office/drawing/2014/main" xmlns="" id="{07340632-A551-4C79-BC3F-21604B6D2546}"/>
+                <a16:creationId xmlns="" xmlns:a16="http://schemas.microsoft.com/office/drawing/2014/main" id="{07340632-A551-4C79-BC3F-21604B6D2546}"/>
               </a:ext>
             </a:extLst>
           </p:cNvPr>
@@ -51421,7 +51404,7 @@
           <p:cNvPr id="3079" name="Tekstvak 3078">
             <a:extLst>
               <a:ext uri="{FF2B5EF4-FFF2-40B4-BE49-F238E27FC236}">
-                <a16:creationId xmlns:a16="http://schemas.microsoft.com/office/drawing/2014/main" xmlns="" id="{1CC6BB25-A5A7-44C5-9F4C-33310C0BF2AD}"/>
+                <a16:creationId xmlns="" xmlns:a16="http://schemas.microsoft.com/office/drawing/2014/main" id="{1CC6BB25-A5A7-44C5-9F4C-33310C0BF2AD}"/>
               </a:ext>
             </a:extLst>
           </p:cNvPr>
@@ -51456,7 +51439,7 @@
           <p:cNvPr id="73" name="Tekstvak 72">
             <a:extLst>
               <a:ext uri="{FF2B5EF4-FFF2-40B4-BE49-F238E27FC236}">
-                <a16:creationId xmlns:a16="http://schemas.microsoft.com/office/drawing/2014/main" xmlns="" id="{92032B10-6061-46D9-B7A2-4230E679EB5C}"/>
+                <a16:creationId xmlns="" xmlns:a16="http://schemas.microsoft.com/office/drawing/2014/main" id="{92032B10-6061-46D9-B7A2-4230E679EB5C}"/>
               </a:ext>
             </a:extLst>
           </p:cNvPr>
@@ -51491,7 +51474,7 @@
           <p:cNvPr id="3084" name="Tekstvak 3083">
             <a:extLst>
               <a:ext uri="{FF2B5EF4-FFF2-40B4-BE49-F238E27FC236}">
-                <a16:creationId xmlns:a16="http://schemas.microsoft.com/office/drawing/2014/main" xmlns="" id="{8FB3793C-CCE6-4A47-8745-0B71859B0AE9}"/>
+                <a16:creationId xmlns="" xmlns:a16="http://schemas.microsoft.com/office/drawing/2014/main" id="{8FB3793C-CCE6-4A47-8745-0B71859B0AE9}"/>
               </a:ext>
             </a:extLst>
           </p:cNvPr>
@@ -51531,7 +51514,7 @@
           <p:cNvPr id="80" name="Tekstvak 79">
             <a:extLst>
               <a:ext uri="{FF2B5EF4-FFF2-40B4-BE49-F238E27FC236}">
-                <a16:creationId xmlns:a16="http://schemas.microsoft.com/office/drawing/2014/main" xmlns="" id="{3F06DDFE-C025-43B6-895C-A2DCB23DF547}"/>
+                <a16:creationId xmlns="" xmlns:a16="http://schemas.microsoft.com/office/drawing/2014/main" id="{3F06DDFE-C025-43B6-895C-A2DCB23DF547}"/>
               </a:ext>
             </a:extLst>
           </p:cNvPr>
@@ -51566,7 +51549,7 @@
           <p:cNvPr id="42" name="Ovaal 41">
             <a:extLst>
               <a:ext uri="{FF2B5EF4-FFF2-40B4-BE49-F238E27FC236}">
-                <a16:creationId xmlns:a16="http://schemas.microsoft.com/office/drawing/2014/main" xmlns="" id="{72D56CA8-60C5-45EC-8F1B-B1093445083D}"/>
+                <a16:creationId xmlns="" xmlns:a16="http://schemas.microsoft.com/office/drawing/2014/main" id="{72D56CA8-60C5-45EC-8F1B-B1093445083D}"/>
               </a:ext>
             </a:extLst>
           </p:cNvPr>
@@ -51620,7 +51603,7 @@
           <p:cNvPr id="44" name="Ovaal 43">
             <a:extLst>
               <a:ext uri="{FF2B5EF4-FFF2-40B4-BE49-F238E27FC236}">
-                <a16:creationId xmlns:a16="http://schemas.microsoft.com/office/drawing/2014/main" xmlns="" id="{7CF4FCBC-648B-4EB1-93CE-BA029036C0CC}"/>
+                <a16:creationId xmlns="" xmlns:a16="http://schemas.microsoft.com/office/drawing/2014/main" id="{7CF4FCBC-648B-4EB1-93CE-BA029036C0CC}"/>
               </a:ext>
             </a:extLst>
           </p:cNvPr>
@@ -51674,7 +51657,7 @@
           <p:cNvPr id="51" name="Tekstvak 50">
             <a:extLst>
               <a:ext uri="{FF2B5EF4-FFF2-40B4-BE49-F238E27FC236}">
-                <a16:creationId xmlns:a16="http://schemas.microsoft.com/office/drawing/2014/main" xmlns="" id="{36AF06F7-C7AC-406C-827D-CBD749238E27}"/>
+                <a16:creationId xmlns="" xmlns:a16="http://schemas.microsoft.com/office/drawing/2014/main" id="{36AF06F7-C7AC-406C-827D-CBD749238E27}"/>
               </a:ext>
             </a:extLst>
           </p:cNvPr>
@@ -51709,7 +51692,7 @@
           <p:cNvPr id="59" name="Tekstvak 58">
             <a:extLst>
               <a:ext uri="{FF2B5EF4-FFF2-40B4-BE49-F238E27FC236}">
-                <a16:creationId xmlns:a16="http://schemas.microsoft.com/office/drawing/2014/main" xmlns="" id="{F0657E35-0C81-4AF8-BA44-4F33F5AF6613}"/>
+                <a16:creationId xmlns="" xmlns:a16="http://schemas.microsoft.com/office/drawing/2014/main" id="{F0657E35-0C81-4AF8-BA44-4F33F5AF6613}"/>
               </a:ext>
             </a:extLst>
           </p:cNvPr>
@@ -51744,7 +51727,7 @@
           <p:cNvPr id="62" name="Ovaal 61">
             <a:extLst>
               <a:ext uri="{FF2B5EF4-FFF2-40B4-BE49-F238E27FC236}">
-                <a16:creationId xmlns:a16="http://schemas.microsoft.com/office/drawing/2014/main" xmlns="" id="{8A290C8E-7589-400C-9595-1E7D05623DE2}"/>
+                <a16:creationId xmlns="" xmlns:a16="http://schemas.microsoft.com/office/drawing/2014/main" id="{8A290C8E-7589-400C-9595-1E7D05623DE2}"/>
               </a:ext>
             </a:extLst>
           </p:cNvPr>
@@ -51798,7 +51781,7 @@
           <p:cNvPr id="63" name="Tekstvak 62">
             <a:extLst>
               <a:ext uri="{FF2B5EF4-FFF2-40B4-BE49-F238E27FC236}">
-                <a16:creationId xmlns:a16="http://schemas.microsoft.com/office/drawing/2014/main" xmlns="" id="{06857F55-522B-4B48-90E8-81D28DF8093C}"/>
+                <a16:creationId xmlns="" xmlns:a16="http://schemas.microsoft.com/office/drawing/2014/main" id="{06857F55-522B-4B48-90E8-81D28DF8093C}"/>
               </a:ext>
             </a:extLst>
           </p:cNvPr>
@@ -51834,7 +51817,7 @@
           <p:cNvPr id="65" name="Tekstvak 12">
             <a:extLst>
               <a:ext uri="{FF2B5EF4-FFF2-40B4-BE49-F238E27FC236}">
-                <a16:creationId xmlns:a16="http://schemas.microsoft.com/office/drawing/2014/main" xmlns="" id="{35AAEF8A-1E8B-4134-8FA6-762EB3980799}"/>
+                <a16:creationId xmlns="" xmlns:a16="http://schemas.microsoft.com/office/drawing/2014/main" id="{35AAEF8A-1E8B-4134-8FA6-762EB3980799}"/>
               </a:ext>
             </a:extLst>
           </p:cNvPr>
@@ -51918,7 +51901,7 @@
           <p:cNvPr id="66" name="Rechte verbindingslijn 85">
             <a:extLst>
               <a:ext uri="{FF2B5EF4-FFF2-40B4-BE49-F238E27FC236}">
-                <a16:creationId xmlns:a16="http://schemas.microsoft.com/office/drawing/2014/main" xmlns="" id="{233F8FFE-DA65-4AFF-8FA0-D96234AD3B8E}"/>
+                <a16:creationId xmlns="" xmlns:a16="http://schemas.microsoft.com/office/drawing/2014/main" id="{233F8FFE-DA65-4AFF-8FA0-D96234AD3B8E}"/>
               </a:ext>
             </a:extLst>
           </p:cNvPr>
@@ -51957,7 +51940,7 @@
           <p:cNvPr id="69" name="Rechte verbindingslijn 77">
             <a:extLst>
               <a:ext uri="{FF2B5EF4-FFF2-40B4-BE49-F238E27FC236}">
-                <a16:creationId xmlns:a16="http://schemas.microsoft.com/office/drawing/2014/main" xmlns="" id="{94949F35-13CD-4462-8671-AA729FC40F2F}"/>
+                <a16:creationId xmlns="" xmlns:a16="http://schemas.microsoft.com/office/drawing/2014/main" id="{94949F35-13CD-4462-8671-AA729FC40F2F}"/>
               </a:ext>
             </a:extLst>
           </p:cNvPr>
@@ -51996,7 +51979,7 @@
           <p:cNvPr id="70" name="Rechte verbindingslijn 75">
             <a:extLst>
               <a:ext uri="{FF2B5EF4-FFF2-40B4-BE49-F238E27FC236}">
-                <a16:creationId xmlns:a16="http://schemas.microsoft.com/office/drawing/2014/main" xmlns="" id="{1AE33C59-CF0D-4A0F-B4FB-DDC705D34306}"/>
+                <a16:creationId xmlns="" xmlns:a16="http://schemas.microsoft.com/office/drawing/2014/main" id="{1AE33C59-CF0D-4A0F-B4FB-DDC705D34306}"/>
               </a:ext>
             </a:extLst>
           </p:cNvPr>
@@ -52035,7 +52018,7 @@
           <p:cNvPr id="71" name="Rechte verbindingslijn 74">
             <a:extLst>
               <a:ext uri="{FF2B5EF4-FFF2-40B4-BE49-F238E27FC236}">
-                <a16:creationId xmlns:a16="http://schemas.microsoft.com/office/drawing/2014/main" xmlns="" id="{5BB30579-FE9A-49B0-8879-B51A3D476E19}"/>
+                <a16:creationId xmlns="" xmlns:a16="http://schemas.microsoft.com/office/drawing/2014/main" id="{5BB30579-FE9A-49B0-8879-B51A3D476E19}"/>
               </a:ext>
             </a:extLst>
           </p:cNvPr>
@@ -52074,7 +52057,7 @@
           <p:cNvPr id="72" name="Rechte verbindingslijn 73">
             <a:extLst>
               <a:ext uri="{FF2B5EF4-FFF2-40B4-BE49-F238E27FC236}">
-                <a16:creationId xmlns:a16="http://schemas.microsoft.com/office/drawing/2014/main" xmlns="" id="{3396BCA6-67E4-4D9F-8138-A2B5DF39B9F9}"/>
+                <a16:creationId xmlns="" xmlns:a16="http://schemas.microsoft.com/office/drawing/2014/main" id="{3396BCA6-67E4-4D9F-8138-A2B5DF39B9F9}"/>
               </a:ext>
             </a:extLst>
           </p:cNvPr>
@@ -52113,7 +52096,7 @@
           <p:cNvPr id="75" name="Rechte verbindingslijn 71">
             <a:extLst>
               <a:ext uri="{FF2B5EF4-FFF2-40B4-BE49-F238E27FC236}">
-                <a16:creationId xmlns:a16="http://schemas.microsoft.com/office/drawing/2014/main" xmlns="" id="{4F4359EC-BE16-4414-8A14-1B87FE568389}"/>
+                <a16:creationId xmlns="" xmlns:a16="http://schemas.microsoft.com/office/drawing/2014/main" id="{4F4359EC-BE16-4414-8A14-1B87FE568389}"/>
               </a:ext>
             </a:extLst>
           </p:cNvPr>
@@ -52152,7 +52135,7 @@
           <p:cNvPr id="76" name="Rechte verbindingslijn 70">
             <a:extLst>
               <a:ext uri="{FF2B5EF4-FFF2-40B4-BE49-F238E27FC236}">
-                <a16:creationId xmlns:a16="http://schemas.microsoft.com/office/drawing/2014/main" xmlns="" id="{53DD4BF0-831E-4E41-8515-B95A47DA264C}"/>
+                <a16:creationId xmlns="" xmlns:a16="http://schemas.microsoft.com/office/drawing/2014/main" id="{53DD4BF0-831E-4E41-8515-B95A47DA264C}"/>
               </a:ext>
             </a:extLst>
           </p:cNvPr>
@@ -52191,7 +52174,7 @@
           <p:cNvPr id="78" name="Rechte verbindingslijn 69">
             <a:extLst>
               <a:ext uri="{FF2B5EF4-FFF2-40B4-BE49-F238E27FC236}">
-                <a16:creationId xmlns:a16="http://schemas.microsoft.com/office/drawing/2014/main" xmlns="" id="{CD200730-6A4F-4D56-9D4A-A7DCABC41062}"/>
+                <a16:creationId xmlns="" xmlns:a16="http://schemas.microsoft.com/office/drawing/2014/main" id="{CD200730-6A4F-4D56-9D4A-A7DCABC41062}"/>
               </a:ext>
             </a:extLst>
           </p:cNvPr>
@@ -52230,7 +52213,7 @@
           <p:cNvPr id="79" name="Ovaal 80">
             <a:extLst>
               <a:ext uri="{FF2B5EF4-FFF2-40B4-BE49-F238E27FC236}">
-                <a16:creationId xmlns:a16="http://schemas.microsoft.com/office/drawing/2014/main" xmlns="" id="{B6D52C3C-D101-4713-80EB-45ECC6805022}"/>
+                <a16:creationId xmlns="" xmlns:a16="http://schemas.microsoft.com/office/drawing/2014/main" id="{B6D52C3C-D101-4713-80EB-45ECC6805022}"/>
               </a:ext>
             </a:extLst>
           </p:cNvPr>
@@ -52286,7 +52269,7 @@
           <p:cNvPr id="82" name="Ovaal 82">
             <a:extLst>
               <a:ext uri="{FF2B5EF4-FFF2-40B4-BE49-F238E27FC236}">
-                <a16:creationId xmlns:a16="http://schemas.microsoft.com/office/drawing/2014/main" xmlns="" id="{EB1E14F6-5869-4F8C-A769-DEAE9E843AD3}"/>
+                <a16:creationId xmlns="" xmlns:a16="http://schemas.microsoft.com/office/drawing/2014/main" id="{EB1E14F6-5869-4F8C-A769-DEAE9E843AD3}"/>
               </a:ext>
             </a:extLst>
           </p:cNvPr>
@@ -52342,7 +52325,7 @@
           <p:cNvPr id="83" name="Ovaal 83">
             <a:extLst>
               <a:ext uri="{FF2B5EF4-FFF2-40B4-BE49-F238E27FC236}">
-                <a16:creationId xmlns:a16="http://schemas.microsoft.com/office/drawing/2014/main" xmlns="" id="{94A31125-972F-41D2-86FF-019157557615}"/>
+                <a16:creationId xmlns="" xmlns:a16="http://schemas.microsoft.com/office/drawing/2014/main" id="{94A31125-972F-41D2-86FF-019157557615}"/>
               </a:ext>
             </a:extLst>
           </p:cNvPr>
@@ -52398,7 +52381,7 @@
           <p:cNvPr id="84" name="Ovaal 50">
             <a:extLst>
               <a:ext uri="{FF2B5EF4-FFF2-40B4-BE49-F238E27FC236}">
-                <a16:creationId xmlns:a16="http://schemas.microsoft.com/office/drawing/2014/main" xmlns="" id="{707BC7F0-6C92-462B-B7C5-48996CBCE849}"/>
+                <a16:creationId xmlns="" xmlns:a16="http://schemas.microsoft.com/office/drawing/2014/main" id="{707BC7F0-6C92-462B-B7C5-48996CBCE849}"/>
               </a:ext>
             </a:extLst>
           </p:cNvPr>
@@ -52454,7 +52437,7 @@
           <p:cNvPr id="85" name="Ovaal 58">
             <a:extLst>
               <a:ext uri="{FF2B5EF4-FFF2-40B4-BE49-F238E27FC236}">
-                <a16:creationId xmlns:a16="http://schemas.microsoft.com/office/drawing/2014/main" xmlns="" id="{BDF04C24-7043-4AC5-AB99-122E404481F3}"/>
+                <a16:creationId xmlns="" xmlns:a16="http://schemas.microsoft.com/office/drawing/2014/main" id="{BDF04C24-7043-4AC5-AB99-122E404481F3}"/>
               </a:ext>
             </a:extLst>
           </p:cNvPr>
@@ -52510,7 +52493,7 @@
           <p:cNvPr id="86" name="Ovaal 61">
             <a:extLst>
               <a:ext uri="{FF2B5EF4-FFF2-40B4-BE49-F238E27FC236}">
-                <a16:creationId xmlns:a16="http://schemas.microsoft.com/office/drawing/2014/main" xmlns="" id="{8CA8F803-D45C-48EC-9B2D-418CBCCADA7D}"/>
+                <a16:creationId xmlns="" xmlns:a16="http://schemas.microsoft.com/office/drawing/2014/main" id="{8CA8F803-D45C-48EC-9B2D-418CBCCADA7D}"/>
               </a:ext>
             </a:extLst>
           </p:cNvPr>
@@ -52566,7 +52549,7 @@
           <p:cNvPr id="88" name="Ovaal 63">
             <a:extLst>
               <a:ext uri="{FF2B5EF4-FFF2-40B4-BE49-F238E27FC236}">
-                <a16:creationId xmlns:a16="http://schemas.microsoft.com/office/drawing/2014/main" xmlns="" id="{E30861C9-E701-457A-9ADD-FD473D13DC19}"/>
+                <a16:creationId xmlns="" xmlns:a16="http://schemas.microsoft.com/office/drawing/2014/main" id="{E30861C9-E701-457A-9ADD-FD473D13DC19}"/>
               </a:ext>
             </a:extLst>
           </p:cNvPr>
@@ -52622,7 +52605,7 @@
           <p:cNvPr id="89" name="Ovaal 64">
             <a:extLst>
               <a:ext uri="{FF2B5EF4-FFF2-40B4-BE49-F238E27FC236}">
-                <a16:creationId xmlns:a16="http://schemas.microsoft.com/office/drawing/2014/main" xmlns="" id="{7694F619-4560-4CA0-8C3F-9CE354949DD7}"/>
+                <a16:creationId xmlns="" xmlns:a16="http://schemas.microsoft.com/office/drawing/2014/main" id="{7694F619-4560-4CA0-8C3F-9CE354949DD7}"/>
               </a:ext>
             </a:extLst>
           </p:cNvPr>
@@ -52678,7 +52661,7 @@
           <p:cNvPr id="90" name="Ovaal 65">
             <a:extLst>
               <a:ext uri="{FF2B5EF4-FFF2-40B4-BE49-F238E27FC236}">
-                <a16:creationId xmlns:a16="http://schemas.microsoft.com/office/drawing/2014/main" xmlns="" id="{76ED20CE-9A09-47D5-AD5D-B6914B1244BD}"/>
+                <a16:creationId xmlns="" xmlns:a16="http://schemas.microsoft.com/office/drawing/2014/main" id="{76ED20CE-9A09-47D5-AD5D-B6914B1244BD}"/>
               </a:ext>
             </a:extLst>
           </p:cNvPr>
@@ -52734,7 +52717,7 @@
           <p:cNvPr id="91" name="Rechte verbindingslijn 66">
             <a:extLst>
               <a:ext uri="{FF2B5EF4-FFF2-40B4-BE49-F238E27FC236}">
-                <a16:creationId xmlns:a16="http://schemas.microsoft.com/office/drawing/2014/main" xmlns="" id="{ACABCC08-6C54-4571-BA63-A3391FAD693F}"/>
+                <a16:creationId xmlns="" xmlns:a16="http://schemas.microsoft.com/office/drawing/2014/main" id="{ACABCC08-6C54-4571-BA63-A3391FAD693F}"/>
               </a:ext>
             </a:extLst>
           </p:cNvPr>
@@ -52771,7 +52754,7 @@
           <p:cNvPr id="92" name="Rechte verbindingslijn 67">
             <a:extLst>
               <a:ext uri="{FF2B5EF4-FFF2-40B4-BE49-F238E27FC236}">
-                <a16:creationId xmlns:a16="http://schemas.microsoft.com/office/drawing/2014/main" xmlns="" id="{0060E518-3BDF-4EA8-A53E-C17B733E439A}"/>
+                <a16:creationId xmlns="" xmlns:a16="http://schemas.microsoft.com/office/drawing/2014/main" id="{0060E518-3BDF-4EA8-A53E-C17B733E439A}"/>
               </a:ext>
             </a:extLst>
           </p:cNvPr>
@@ -52808,7 +52791,7 @@
           <p:cNvPr id="93" name="Rechte verbindingslijn 68">
             <a:extLst>
               <a:ext uri="{FF2B5EF4-FFF2-40B4-BE49-F238E27FC236}">
-                <a16:creationId xmlns:a16="http://schemas.microsoft.com/office/drawing/2014/main" xmlns="" id="{D7023744-8344-4060-9C17-515FE654C080}"/>
+                <a16:creationId xmlns="" xmlns:a16="http://schemas.microsoft.com/office/drawing/2014/main" id="{D7023744-8344-4060-9C17-515FE654C080}"/>
               </a:ext>
             </a:extLst>
           </p:cNvPr>
@@ -52847,7 +52830,7 @@
           <p:cNvPr id="94" name="Rechte verbindingslijn 87">
             <a:extLst>
               <a:ext uri="{FF2B5EF4-FFF2-40B4-BE49-F238E27FC236}">
-                <a16:creationId xmlns:a16="http://schemas.microsoft.com/office/drawing/2014/main" xmlns="" id="{BAB3E189-5853-4663-BB53-511805FA0ECE}"/>
+                <a16:creationId xmlns="" xmlns:a16="http://schemas.microsoft.com/office/drawing/2014/main" id="{BAB3E189-5853-4663-BB53-511805FA0ECE}"/>
               </a:ext>
             </a:extLst>
           </p:cNvPr>
@@ -52894,7 +52877,7 @@
           <p:cNvPr id="95" name="Rechte verbindingslijn 88">
             <a:extLst>
               <a:ext uri="{FF2B5EF4-FFF2-40B4-BE49-F238E27FC236}">
-                <a16:creationId xmlns:a16="http://schemas.microsoft.com/office/drawing/2014/main" xmlns="" id="{8380A2EE-8F41-4709-A39E-4EF5FFD77DD9}"/>
+                <a16:creationId xmlns="" xmlns:a16="http://schemas.microsoft.com/office/drawing/2014/main" id="{8380A2EE-8F41-4709-A39E-4EF5FFD77DD9}"/>
               </a:ext>
             </a:extLst>
           </p:cNvPr>
@@ -52941,7 +52924,7 @@
           <p:cNvPr id="96" name="Rechte verbindingslijn 89">
             <a:extLst>
               <a:ext uri="{FF2B5EF4-FFF2-40B4-BE49-F238E27FC236}">
-                <a16:creationId xmlns:a16="http://schemas.microsoft.com/office/drawing/2014/main" xmlns="" id="{4458915A-A76D-4E40-B17A-9643F15DAF1C}"/>
+                <a16:creationId xmlns="" xmlns:a16="http://schemas.microsoft.com/office/drawing/2014/main" id="{4458915A-A76D-4E40-B17A-9643F15DAF1C}"/>
               </a:ext>
             </a:extLst>
           </p:cNvPr>
@@ -52988,7 +52971,7 @@
           <p:cNvPr id="97" name="Ovaal 84">
             <a:extLst>
               <a:ext uri="{FF2B5EF4-FFF2-40B4-BE49-F238E27FC236}">
-                <a16:creationId xmlns:a16="http://schemas.microsoft.com/office/drawing/2014/main" xmlns="" id="{63C2733A-BC30-4E73-B22A-1DA5B9FF500C}"/>
+                <a16:creationId xmlns="" xmlns:a16="http://schemas.microsoft.com/office/drawing/2014/main" id="{63C2733A-BC30-4E73-B22A-1DA5B9FF500C}"/>
               </a:ext>
             </a:extLst>
           </p:cNvPr>
@@ -53044,7 +53027,7 @@
           <p:cNvPr id="98" name="Tekstvak 90">
             <a:extLst>
               <a:ext uri="{FF2B5EF4-FFF2-40B4-BE49-F238E27FC236}">
-                <a16:creationId xmlns:a16="http://schemas.microsoft.com/office/drawing/2014/main" xmlns="" id="{1AF90014-E86B-4132-BA37-BE47E76EB450}"/>
+                <a16:creationId xmlns="" xmlns:a16="http://schemas.microsoft.com/office/drawing/2014/main" id="{1AF90014-E86B-4132-BA37-BE47E76EB450}"/>
               </a:ext>
             </a:extLst>
           </p:cNvPr>
@@ -53079,7 +53062,7 @@
           <p:cNvPr id="99" name="Tekstvak 91">
             <a:extLst>
               <a:ext uri="{FF2B5EF4-FFF2-40B4-BE49-F238E27FC236}">
-                <a16:creationId xmlns:a16="http://schemas.microsoft.com/office/drawing/2014/main" xmlns="" id="{356CE19B-5AE0-4962-8AA5-326778CE1335}"/>
+                <a16:creationId xmlns="" xmlns:a16="http://schemas.microsoft.com/office/drawing/2014/main" id="{356CE19B-5AE0-4962-8AA5-326778CE1335}"/>
               </a:ext>
             </a:extLst>
           </p:cNvPr>
@@ -53114,7 +53097,7 @@
           <p:cNvPr id="100" name="Tekstvak 92">
             <a:extLst>
               <a:ext uri="{FF2B5EF4-FFF2-40B4-BE49-F238E27FC236}">
-                <a16:creationId xmlns:a16="http://schemas.microsoft.com/office/drawing/2014/main" xmlns="" id="{B779E149-7ACE-4CB2-AAFC-1EABE0BD3FB5}"/>
+                <a16:creationId xmlns="" xmlns:a16="http://schemas.microsoft.com/office/drawing/2014/main" id="{B779E149-7ACE-4CB2-AAFC-1EABE0BD3FB5}"/>
               </a:ext>
             </a:extLst>
           </p:cNvPr>
@@ -53149,7 +53132,7 @@
           <p:cNvPr id="101" name="Tekstvak 97">
             <a:extLst>
               <a:ext uri="{FF2B5EF4-FFF2-40B4-BE49-F238E27FC236}">
-                <a16:creationId xmlns:a16="http://schemas.microsoft.com/office/drawing/2014/main" xmlns="" id="{DCA805F2-2AA9-45A5-BBE9-77F3F4FA3C01}"/>
+                <a16:creationId xmlns="" xmlns:a16="http://schemas.microsoft.com/office/drawing/2014/main" id="{DCA805F2-2AA9-45A5-BBE9-77F3F4FA3C01}"/>
               </a:ext>
             </a:extLst>
           </p:cNvPr>
@@ -53184,7 +53167,7 @@
           <p:cNvPr id="87" name="Ovaal 62">
             <a:extLst>
               <a:ext uri="{FF2B5EF4-FFF2-40B4-BE49-F238E27FC236}">
-                <a16:creationId xmlns:a16="http://schemas.microsoft.com/office/drawing/2014/main" xmlns="" id="{2105E35A-45AC-45D0-B895-5008A8284DFC}"/>
+                <a16:creationId xmlns="" xmlns:a16="http://schemas.microsoft.com/office/drawing/2014/main" id="{2105E35A-45AC-45D0-B895-5008A8284DFC}"/>
               </a:ext>
             </a:extLst>
           </p:cNvPr>
@@ -53240,7 +53223,7 @@
           <p:cNvPr id="102" name="Rechte verbindingslijn 98">
             <a:extLst>
               <a:ext uri="{FF2B5EF4-FFF2-40B4-BE49-F238E27FC236}">
-                <a16:creationId xmlns:a16="http://schemas.microsoft.com/office/drawing/2014/main" xmlns="" id="{8933D257-39AC-4550-8CB2-BBBA4DD4C235}"/>
+                <a16:creationId xmlns="" xmlns:a16="http://schemas.microsoft.com/office/drawing/2014/main" id="{8933D257-39AC-4550-8CB2-BBBA4DD4C235}"/>
               </a:ext>
             </a:extLst>
           </p:cNvPr>
@@ -53287,7 +53270,7 @@
           <p:cNvPr id="103" name="Rechte verbindingslijn 99">
             <a:extLst>
               <a:ext uri="{FF2B5EF4-FFF2-40B4-BE49-F238E27FC236}">
-                <a16:creationId xmlns:a16="http://schemas.microsoft.com/office/drawing/2014/main" xmlns="" id="{298EB332-2E2A-42F4-B606-6BEF9C4DE1AD}"/>
+                <a16:creationId xmlns="" xmlns:a16="http://schemas.microsoft.com/office/drawing/2014/main" id="{298EB332-2E2A-42F4-B606-6BEF9C4DE1AD}"/>
               </a:ext>
             </a:extLst>
           </p:cNvPr>
@@ -53334,7 +53317,7 @@
           <p:cNvPr id="104" name="Rechte verbindingslijn 100">
             <a:extLst>
               <a:ext uri="{FF2B5EF4-FFF2-40B4-BE49-F238E27FC236}">
-                <a16:creationId xmlns:a16="http://schemas.microsoft.com/office/drawing/2014/main" xmlns="" id="{8245BD2D-D643-4C6E-9801-75B66F9BDC0D}"/>
+                <a16:creationId xmlns="" xmlns:a16="http://schemas.microsoft.com/office/drawing/2014/main" id="{8245BD2D-D643-4C6E-9801-75B66F9BDC0D}"/>
               </a:ext>
             </a:extLst>
           </p:cNvPr>
@@ -53381,7 +53364,7 @@
           <p:cNvPr id="105" name="Ovaal 101">
             <a:extLst>
               <a:ext uri="{FF2B5EF4-FFF2-40B4-BE49-F238E27FC236}">
-                <a16:creationId xmlns:a16="http://schemas.microsoft.com/office/drawing/2014/main" xmlns="" id="{59BD3DCF-812B-4AED-B869-81C89EC1E0F6}"/>
+                <a16:creationId xmlns="" xmlns:a16="http://schemas.microsoft.com/office/drawing/2014/main" id="{59BD3DCF-812B-4AED-B869-81C89EC1E0F6}"/>
               </a:ext>
             </a:extLst>
           </p:cNvPr>
@@ -53433,7 +53416,7 @@
           <p:cNvPr id="106" name="Ovaal 102">
             <a:extLst>
               <a:ext uri="{FF2B5EF4-FFF2-40B4-BE49-F238E27FC236}">
-                <a16:creationId xmlns:a16="http://schemas.microsoft.com/office/drawing/2014/main" xmlns="" id="{33370757-B0BE-491F-B077-9B6F3B6AD4F6}"/>
+                <a16:creationId xmlns="" xmlns:a16="http://schemas.microsoft.com/office/drawing/2014/main" id="{33370757-B0BE-491F-B077-9B6F3B6AD4F6}"/>
               </a:ext>
             </a:extLst>
           </p:cNvPr>
@@ -53485,7 +53468,7 @@
           <p:cNvPr id="107" name="Ovaal 103">
             <a:extLst>
               <a:ext uri="{FF2B5EF4-FFF2-40B4-BE49-F238E27FC236}">
-                <a16:creationId xmlns:a16="http://schemas.microsoft.com/office/drawing/2014/main" xmlns="" id="{0DA7E5DC-0BFD-41F2-BEB7-43BD5599F478}"/>
+                <a16:creationId xmlns="" xmlns:a16="http://schemas.microsoft.com/office/drawing/2014/main" id="{0DA7E5DC-0BFD-41F2-BEB7-43BD5599F478}"/>
               </a:ext>
             </a:extLst>
           </p:cNvPr>
@@ -53537,7 +53520,7 @@
           <p:cNvPr id="108" name="Ovaal 104">
             <a:extLst>
               <a:ext uri="{FF2B5EF4-FFF2-40B4-BE49-F238E27FC236}">
-                <a16:creationId xmlns:a16="http://schemas.microsoft.com/office/drawing/2014/main" xmlns="" id="{532B518A-01E8-4A4D-9011-1D1B5D7CEDCF}"/>
+                <a16:creationId xmlns="" xmlns:a16="http://schemas.microsoft.com/office/drawing/2014/main" id="{532B518A-01E8-4A4D-9011-1D1B5D7CEDCF}"/>
               </a:ext>
             </a:extLst>
           </p:cNvPr>
@@ -53589,7 +53572,7 @@
           <p:cNvPr id="109" name="Ovaal 105">
             <a:extLst>
               <a:ext uri="{FF2B5EF4-FFF2-40B4-BE49-F238E27FC236}">
-                <a16:creationId xmlns:a16="http://schemas.microsoft.com/office/drawing/2014/main" xmlns="" id="{0A876060-BCCA-457F-A6D8-25568C52E9F5}"/>
+                <a16:creationId xmlns="" xmlns:a16="http://schemas.microsoft.com/office/drawing/2014/main" id="{0A876060-BCCA-457F-A6D8-25568C52E9F5}"/>
               </a:ext>
             </a:extLst>
           </p:cNvPr>
@@ -53641,7 +53624,7 @@
           <p:cNvPr id="110" name="Ovaal 106">
             <a:extLst>
               <a:ext uri="{FF2B5EF4-FFF2-40B4-BE49-F238E27FC236}">
-                <a16:creationId xmlns:a16="http://schemas.microsoft.com/office/drawing/2014/main" xmlns="" id="{98A3F5F6-54F0-4819-AD92-620CA6F3839F}"/>
+                <a16:creationId xmlns="" xmlns:a16="http://schemas.microsoft.com/office/drawing/2014/main" id="{98A3F5F6-54F0-4819-AD92-620CA6F3839F}"/>
               </a:ext>
             </a:extLst>
           </p:cNvPr>
@@ -53693,7 +53676,7 @@
           <p:cNvPr id="111" name="Tekstvak 107">
             <a:extLst>
               <a:ext uri="{FF2B5EF4-FFF2-40B4-BE49-F238E27FC236}">
-                <a16:creationId xmlns:a16="http://schemas.microsoft.com/office/drawing/2014/main" xmlns="" id="{2A9DFB8F-281B-4531-B7A6-009D5C0637E2}"/>
+                <a16:creationId xmlns="" xmlns:a16="http://schemas.microsoft.com/office/drawing/2014/main" id="{2A9DFB8F-281B-4531-B7A6-009D5C0637E2}"/>
               </a:ext>
             </a:extLst>
           </p:cNvPr>
@@ -53728,7 +53711,7 @@
           <p:cNvPr id="112" name="Tekstvak 108">
             <a:extLst>
               <a:ext uri="{FF2B5EF4-FFF2-40B4-BE49-F238E27FC236}">
-                <a16:creationId xmlns:a16="http://schemas.microsoft.com/office/drawing/2014/main" xmlns="" id="{40EAEA5E-0A80-49F3-870F-DD0DB8105F9C}"/>
+                <a16:creationId xmlns="" xmlns:a16="http://schemas.microsoft.com/office/drawing/2014/main" id="{40EAEA5E-0A80-49F3-870F-DD0DB8105F9C}"/>
               </a:ext>
             </a:extLst>
           </p:cNvPr>
@@ -53763,7 +53746,7 @@
           <p:cNvPr id="113" name="Tekstvak 109">
             <a:extLst>
               <a:ext uri="{FF2B5EF4-FFF2-40B4-BE49-F238E27FC236}">
-                <a16:creationId xmlns:a16="http://schemas.microsoft.com/office/drawing/2014/main" xmlns="" id="{11D0C918-AE1D-4138-9F41-726A114D9B32}"/>
+                <a16:creationId xmlns="" xmlns:a16="http://schemas.microsoft.com/office/drawing/2014/main" id="{11D0C918-AE1D-4138-9F41-726A114D9B32}"/>
               </a:ext>
             </a:extLst>
           </p:cNvPr>
@@ -53798,7 +53781,7 @@
           <p:cNvPr id="81" name="Ovaal 81">
             <a:extLst>
               <a:ext uri="{FF2B5EF4-FFF2-40B4-BE49-F238E27FC236}">
-                <a16:creationId xmlns:a16="http://schemas.microsoft.com/office/drawing/2014/main" xmlns="" id="{576C6162-04A3-46DE-9845-2B9B0585572B}"/>
+                <a16:creationId xmlns="" xmlns:a16="http://schemas.microsoft.com/office/drawing/2014/main" id="{576C6162-04A3-46DE-9845-2B9B0585572B}"/>
               </a:ext>
             </a:extLst>
           </p:cNvPr>
@@ -53852,7 +53835,7 @@
     </p:spTree>
     <p:extLst>
       <p:ext uri="{BB962C8B-B14F-4D97-AF65-F5344CB8AC3E}">
-        <p14:creationId xmlns:p14="http://schemas.microsoft.com/office/powerpoint/2010/main" xmlns="" val="2290929099"/>
+        <p14:creationId xmlns:p14="http://schemas.microsoft.com/office/powerpoint/2010/main" val="2290929099"/>
       </p:ext>
     </p:extLst>
   </p:cSld>
@@ -54092,7 +54075,7 @@
   <a:extraClrSchemeLst/>
   <a:extLst>
     <a:ext uri="{05A4C25C-085E-4340-85A3-A5531E510DB2}">
-      <thm15:themeFamily xmlns:thm15="http://schemas.microsoft.com/office/thememl/2012/main" xmlns="" name="Wood Type" id="{7ACABC62-BF99-48CF-A9DC-4DB89C7B13DC}" vid="{142A1326-48AB-42A9-8428-CB14AA30176D}"/>
+      <thm15:themeFamily xmlns="" xmlns:thm15="http://schemas.microsoft.com/office/thememl/2012/main" name="Wood Type" id="{7ACABC62-BF99-48CF-A9DC-4DB89C7B13DC}" vid="{142A1326-48AB-42A9-8428-CB14AA30176D}"/>
     </a:ext>
   </a:extLst>
 </a:theme>

</xml_diff>